<commit_message>
docs:avance del plantamiento de problema.v3
avance hasta requisitos
</commit_message>
<xml_diff>
--- a/PLANTEAMIENTO_DEL_PROBLEMA.pptx
+++ b/PLANTEAMIENTO_DEL_PROBLEMA.pptx
@@ -33,6 +33,11 @@
     <p:sldId id="282" r:id="rId27"/>
     <p:sldId id="283" r:id="rId28"/>
     <p:sldId id="284" r:id="rId29"/>
+    <p:sldId id="285" r:id="rId30"/>
+    <p:sldId id="286" r:id="rId31"/>
+    <p:sldId id="287" r:id="rId32"/>
+    <p:sldId id="288" r:id="rId33"/>
+    <p:sldId id="289" r:id="rId34"/>
   </p:sldIdLst>
   <p:sldSz cx="12192000" cy="6858000"/>
   <p:notesSz cx="6858000" cy="9144000"/>
@@ -1548,7 +1553,7 @@
           <a:p>
             <a:fld id="{D253BB75-C9F5-8342-9D8A-C2F31092015F}" type="datetimeFigureOut">
               <a:rPr lang="es-CO" smtClean="0"/>
-              <a:t>08/03/2021</a:t>
+              <a:t>8/03/2021</a:t>
             </a:fld>
             <a:endParaRPr lang="es-CO"/>
           </a:p>
@@ -3007,7 +3012,7 @@
           <a:p>
             <a:fld id="{D253BB75-C9F5-8342-9D8A-C2F31092015F}" type="datetimeFigureOut">
               <a:rPr lang="es-CO" smtClean="0"/>
-              <a:t>08/03/2021</a:t>
+              <a:t>8/03/2021</a:t>
             </a:fld>
             <a:endParaRPr lang="es-CO"/>
           </a:p>
@@ -4460,7 +4465,7 @@
           <a:p>
             <a:fld id="{D253BB75-C9F5-8342-9D8A-C2F31092015F}" type="datetimeFigureOut">
               <a:rPr lang="es-CO" smtClean="0"/>
-              <a:t>08/03/2021</a:t>
+              <a:t>8/03/2021</a:t>
             </a:fld>
             <a:endParaRPr lang="es-CO"/>
           </a:p>
@@ -5915,7 +5920,7 @@
           <a:p>
             <a:fld id="{D253BB75-C9F5-8342-9D8A-C2F31092015F}" type="datetimeFigureOut">
               <a:rPr lang="es-CO" smtClean="0"/>
-              <a:t>08/03/2021</a:t>
+              <a:t>8/03/2021</a:t>
             </a:fld>
             <a:endParaRPr lang="es-CO"/>
           </a:p>
@@ -7423,7 +7428,7 @@
           <a:p>
             <a:fld id="{D253BB75-C9F5-8342-9D8A-C2F31092015F}" type="datetimeFigureOut">
               <a:rPr lang="es-CO" smtClean="0"/>
-              <a:t>08/03/2021</a:t>
+              <a:t>8/03/2021</a:t>
             </a:fld>
             <a:endParaRPr lang="es-CO"/>
           </a:p>
@@ -8944,7 +8949,7 @@
           <a:p>
             <a:fld id="{D253BB75-C9F5-8342-9D8A-C2F31092015F}" type="datetimeFigureOut">
               <a:rPr lang="es-CO" smtClean="0"/>
-              <a:t>08/03/2021</a:t>
+              <a:t>8/03/2021</a:t>
             </a:fld>
             <a:endParaRPr lang="es-CO"/>
           </a:p>
@@ -10609,7 +10614,7 @@
           <a:p>
             <a:fld id="{D253BB75-C9F5-8342-9D8A-C2F31092015F}" type="datetimeFigureOut">
               <a:rPr lang="es-CO" smtClean="0"/>
-              <a:t>08/03/2021</a:t>
+              <a:t>8/03/2021</a:t>
             </a:fld>
             <a:endParaRPr lang="es-CO"/>
           </a:p>
@@ -12007,7 +12012,7 @@
           <a:p>
             <a:fld id="{D253BB75-C9F5-8342-9D8A-C2F31092015F}" type="datetimeFigureOut">
               <a:rPr lang="es-CO" smtClean="0"/>
-              <a:t>08/03/2021</a:t>
+              <a:t>8/03/2021</a:t>
             </a:fld>
             <a:endParaRPr lang="es-CO"/>
           </a:p>
@@ -12107,7 +12112,7 @@
           <a:p>
             <a:fld id="{D253BB75-C9F5-8342-9D8A-C2F31092015F}" type="datetimeFigureOut">
               <a:rPr lang="es-CO" smtClean="0"/>
-              <a:t>08/03/2021</a:t>
+              <a:t>8/03/2021</a:t>
             </a:fld>
             <a:endParaRPr lang="es-CO"/>
           </a:p>
@@ -13633,7 +13638,7 @@
           <a:p>
             <a:fld id="{D253BB75-C9F5-8342-9D8A-C2F31092015F}" type="datetimeFigureOut">
               <a:rPr lang="es-CO" smtClean="0"/>
-              <a:t>08/03/2021</a:t>
+              <a:t>8/03/2021</a:t>
             </a:fld>
             <a:endParaRPr lang="es-CO"/>
           </a:p>
@@ -15169,7 +15174,7 @@
           <a:p>
             <a:fld id="{D253BB75-C9F5-8342-9D8A-C2F31092015F}" type="datetimeFigureOut">
               <a:rPr lang="es-CO" smtClean="0"/>
-              <a:t>08/03/2021</a:t>
+              <a:t>8/03/2021</a:t>
             </a:fld>
             <a:endParaRPr lang="es-CO"/>
           </a:p>
@@ -15392,7 +15397,7 @@
           <a:p>
             <a:fld id="{D253BB75-C9F5-8342-9D8A-C2F31092015F}" type="datetimeFigureOut">
               <a:rPr lang="es-CO" smtClean="0"/>
-              <a:t>08/03/2021</a:t>
+              <a:t>8/03/2021</a:t>
             </a:fld>
             <a:endParaRPr lang="es-CO"/>
           </a:p>
@@ -17604,6 +17609,103 @@
 </p:sld>
 </file>
 
+<file path=ppt/slides/slide29.xml><?xml version="1.0" encoding="utf-8"?>
+<p:sld xmlns:a="http://schemas.openxmlformats.org/drawingml/2006/main" xmlns:r="http://schemas.openxmlformats.org/officeDocument/2006/relationships" xmlns:p="http://schemas.openxmlformats.org/presentationml/2006/main">
+  <p:cSld>
+    <p:spTree>
+      <p:nvGrpSpPr>
+        <p:cNvPr id="1" name=""/>
+        <p:cNvGrpSpPr/>
+        <p:nvPr/>
+      </p:nvGrpSpPr>
+      <p:grpSpPr>
+        <a:xfrm>
+          <a:off x="0" y="0"/>
+          <a:ext cx="0" cy="0"/>
+          <a:chOff x="0" y="0"/>
+          <a:chExt cx="0" cy="0"/>
+        </a:xfrm>
+      </p:grpSpPr>
+      <p:sp>
+        <p:nvSpPr>
+          <p:cNvPr id="2" name="Título 1">
+            <a:extLst>
+              <a:ext uri="{FF2B5EF4-FFF2-40B4-BE49-F238E27FC236}">
+                <a16:creationId xmlns:a16="http://schemas.microsoft.com/office/drawing/2014/main" id="{D6C951AD-ADB4-4520-8EF2-0D457F9FBAEC}"/>
+              </a:ext>
+            </a:extLst>
+          </p:cNvPr>
+          <p:cNvSpPr>
+            <a:spLocks noGrp="1"/>
+          </p:cNvSpPr>
+          <p:nvPr>
+            <p:ph type="title"/>
+          </p:nvPr>
+        </p:nvSpPr>
+        <p:spPr/>
+        <p:txBody>
+          <a:bodyPr/>
+          <a:lstStyle/>
+          <a:p>
+            <a:r>
+              <a:rPr lang="es-CO" dirty="0"/>
+              <a:t>Requerimientos funcionales</a:t>
+            </a:r>
+          </a:p>
+        </p:txBody>
+      </p:sp>
+      <p:sp>
+        <p:nvSpPr>
+          <p:cNvPr id="3" name="Marcador de contenido 2">
+            <a:extLst>
+              <a:ext uri="{FF2B5EF4-FFF2-40B4-BE49-F238E27FC236}">
+                <a16:creationId xmlns:a16="http://schemas.microsoft.com/office/drawing/2014/main" id="{62BA3D85-AA1B-4109-8A32-FC0B1A31E18F}"/>
+              </a:ext>
+            </a:extLst>
+          </p:cNvPr>
+          <p:cNvSpPr>
+            <a:spLocks noGrp="1"/>
+          </p:cNvSpPr>
+          <p:nvPr>
+            <p:ph idx="1"/>
+          </p:nvPr>
+        </p:nvSpPr>
+        <p:spPr/>
+        <p:txBody>
+          <a:bodyPr/>
+          <a:lstStyle/>
+          <a:p>
+            <a:r>
+              <a:rPr lang="es-CO" dirty="0"/>
+              <a:t>Son la definición de las funciones que el sistema será capaz de  realizar. Estos requerimientos describen las transformaciones que el sistema realiza sobre las entradas para producir las salidas (</a:t>
+            </a:r>
+            <a:r>
+              <a:rPr lang="es-CO" dirty="0" err="1"/>
+              <a:t>Árias</a:t>
+            </a:r>
+            <a:r>
+              <a:rPr lang="es-CO" dirty="0"/>
+              <a:t> Chaves, 2005).</a:t>
+            </a:r>
+          </a:p>
+          <a:p>
+            <a:endParaRPr lang="es-CO" dirty="0"/>
+          </a:p>
+        </p:txBody>
+      </p:sp>
+    </p:spTree>
+    <p:extLst>
+      <p:ext uri="{BB962C8B-B14F-4D97-AF65-F5344CB8AC3E}">
+        <p14:creationId xmlns:p14="http://schemas.microsoft.com/office/powerpoint/2010/main" val="717805033"/>
+      </p:ext>
+    </p:extLst>
+  </p:cSld>
+  <p:clrMapOvr>
+    <a:masterClrMapping/>
+  </p:clrMapOvr>
+</p:sld>
+</file>
+
 <file path=ppt/slides/slide3.xml><?xml version="1.0" encoding="utf-8"?>
 <p:sld xmlns:a="http://schemas.openxmlformats.org/drawingml/2006/main" xmlns:r="http://schemas.openxmlformats.org/officeDocument/2006/relationships" xmlns:p="http://schemas.openxmlformats.org/presentationml/2006/main">
   <p:cSld>
@@ -17693,6 +17795,1134 @@
     <p:extLst>
       <p:ext uri="{BB962C8B-B14F-4D97-AF65-F5344CB8AC3E}">
         <p14:creationId xmlns:p14="http://schemas.microsoft.com/office/powerpoint/2010/main" val="1642990584"/>
+      </p:ext>
+    </p:extLst>
+  </p:cSld>
+  <p:clrMapOvr>
+    <a:masterClrMapping/>
+  </p:clrMapOvr>
+</p:sld>
+</file>
+
+<file path=ppt/slides/slide30.xml><?xml version="1.0" encoding="utf-8"?>
+<p:sld xmlns:a="http://schemas.openxmlformats.org/drawingml/2006/main" xmlns:r="http://schemas.openxmlformats.org/officeDocument/2006/relationships" xmlns:p="http://schemas.openxmlformats.org/presentationml/2006/main">
+  <p:cSld>
+    <p:spTree>
+      <p:nvGrpSpPr>
+        <p:cNvPr id="1" name=""/>
+        <p:cNvGrpSpPr/>
+        <p:nvPr/>
+      </p:nvGrpSpPr>
+      <p:grpSpPr>
+        <a:xfrm>
+          <a:off x="0" y="0"/>
+          <a:ext cx="0" cy="0"/>
+          <a:chOff x="0" y="0"/>
+          <a:chExt cx="0" cy="0"/>
+        </a:xfrm>
+      </p:grpSpPr>
+      <p:sp>
+        <p:nvSpPr>
+          <p:cNvPr id="2" name="Título 1">
+            <a:extLst>
+              <a:ext uri="{FF2B5EF4-FFF2-40B4-BE49-F238E27FC236}">
+                <a16:creationId xmlns:a16="http://schemas.microsoft.com/office/drawing/2014/main" id="{B996C622-08C3-4F53-8B6B-78DB5136EE39}"/>
+              </a:ext>
+            </a:extLst>
+          </p:cNvPr>
+          <p:cNvSpPr>
+            <a:spLocks noGrp="1"/>
+          </p:cNvSpPr>
+          <p:nvPr>
+            <p:ph type="title"/>
+          </p:nvPr>
+        </p:nvSpPr>
+        <p:spPr/>
+        <p:txBody>
+          <a:bodyPr/>
+          <a:lstStyle/>
+          <a:p>
+            <a:r>
+              <a:rPr lang="es-CO" dirty="0"/>
+              <a:t>Requerimientos funcionales</a:t>
+            </a:r>
+          </a:p>
+        </p:txBody>
+      </p:sp>
+      <p:graphicFrame>
+        <p:nvGraphicFramePr>
+          <p:cNvPr id="6" name="Tabla 4">
+            <a:extLst>
+              <a:ext uri="{FF2B5EF4-FFF2-40B4-BE49-F238E27FC236}">
+                <a16:creationId xmlns:a16="http://schemas.microsoft.com/office/drawing/2014/main" id="{72043CEB-92A8-4602-84EB-7871C514A403}"/>
+              </a:ext>
+            </a:extLst>
+          </p:cNvPr>
+          <p:cNvGraphicFramePr>
+            <a:graphicFrameLocks noGrp="1"/>
+          </p:cNvGraphicFramePr>
+          <p:nvPr>
+            <p:ph idx="1"/>
+            <p:extLst>
+              <p:ext uri="{D42A27DB-BD31-4B8C-83A1-F6EECF244321}">
+                <p14:modId xmlns:p14="http://schemas.microsoft.com/office/powerpoint/2010/main" val="2096897839"/>
+              </p:ext>
+            </p:extLst>
+          </p:nvPr>
+        </p:nvGraphicFramePr>
+        <p:xfrm>
+          <a:off x="5074725" y="1225306"/>
+          <a:ext cx="6281738" cy="3733800"/>
+        </p:xfrm>
+        <a:graphic>
+          <a:graphicData uri="http://schemas.openxmlformats.org/drawingml/2006/table">
+            <a:tbl>
+              <a:tblPr firstRow="1" bandRow="1">
+                <a:tableStyleId>{5C22544A-7EE6-4342-B048-85BDC9FD1C3A}</a:tableStyleId>
+              </a:tblPr>
+              <a:tblGrid>
+                <a:gridCol w="3140869">
+                  <a:extLst>
+                    <a:ext uri="{9D8B030D-6E8A-4147-A177-3AD203B41FA5}">
+                      <a16:colId xmlns:a16="http://schemas.microsoft.com/office/drawing/2014/main" val="4051387547"/>
+                    </a:ext>
+                  </a:extLst>
+                </a:gridCol>
+                <a:gridCol w="3140869">
+                  <a:extLst>
+                    <a:ext uri="{9D8B030D-6E8A-4147-A177-3AD203B41FA5}">
+                      <a16:colId xmlns:a16="http://schemas.microsoft.com/office/drawing/2014/main" val="4188552159"/>
+                    </a:ext>
+                  </a:extLst>
+                </a:gridCol>
+              </a:tblGrid>
+              <a:tr h="370840">
+                <a:tc>
+                  <a:txBody>
+                    <a:bodyPr/>
+                    <a:lstStyle/>
+                    <a:p>
+                      <a:r>
+                        <a:rPr lang="es-CO" sz="1400" dirty="0"/>
+                        <a:t>Identificación del requerimiento</a:t>
+                      </a:r>
+                    </a:p>
+                  </a:txBody>
+                  <a:tcPr/>
+                </a:tc>
+                <a:tc>
+                  <a:txBody>
+                    <a:bodyPr/>
+                    <a:lstStyle/>
+                    <a:p>
+                      <a:r>
+                        <a:rPr lang="es-CO" sz="1400" dirty="0"/>
+                        <a:t>RF01</a:t>
+                      </a:r>
+                    </a:p>
+                  </a:txBody>
+                  <a:tcPr/>
+                </a:tc>
+                <a:extLst>
+                  <a:ext uri="{0D108BD9-81ED-4DB2-BD59-A6C34878D82A}">
+                    <a16:rowId xmlns:a16="http://schemas.microsoft.com/office/drawing/2014/main" val="637406872"/>
+                  </a:ext>
+                </a:extLst>
+              </a:tr>
+              <a:tr h="370840">
+                <a:tc>
+                  <a:txBody>
+                    <a:bodyPr/>
+                    <a:lstStyle/>
+                    <a:p>
+                      <a:r>
+                        <a:rPr lang="es-CO" sz="1400" dirty="0"/>
+                        <a:t>Nombre del requerimiento</a:t>
+                      </a:r>
+                    </a:p>
+                  </a:txBody>
+                  <a:tcPr/>
+                </a:tc>
+                <a:tc>
+                  <a:txBody>
+                    <a:bodyPr/>
+                    <a:lstStyle/>
+                    <a:p>
+                      <a:r>
+                        <a:rPr lang="es-CO" sz="1400" dirty="0"/>
+                        <a:t>Loguear  usuario</a:t>
+                      </a:r>
+                    </a:p>
+                  </a:txBody>
+                  <a:tcPr/>
+                </a:tc>
+                <a:extLst>
+                  <a:ext uri="{0D108BD9-81ED-4DB2-BD59-A6C34878D82A}">
+                    <a16:rowId xmlns:a16="http://schemas.microsoft.com/office/drawing/2014/main" val="185286241"/>
+                  </a:ext>
+                </a:extLst>
+              </a:tr>
+              <a:tr h="370840">
+                <a:tc>
+                  <a:txBody>
+                    <a:bodyPr/>
+                    <a:lstStyle/>
+                    <a:p>
+                      <a:r>
+                        <a:rPr lang="es-CO" sz="1400" dirty="0"/>
+                        <a:t>Características</a:t>
+                      </a:r>
+                    </a:p>
+                  </a:txBody>
+                  <a:tcPr/>
+                </a:tc>
+                <a:tc>
+                  <a:txBody>
+                    <a:bodyPr/>
+                    <a:lstStyle/>
+                    <a:p>
+                      <a:r>
+                        <a:rPr lang="es-CO" sz="1400" dirty="0"/>
+                        <a:t>Los usuarios deben poder inscribirse en el sistema</a:t>
+                      </a:r>
+                    </a:p>
+                  </a:txBody>
+                  <a:tcPr/>
+                </a:tc>
+                <a:extLst>
+                  <a:ext uri="{0D108BD9-81ED-4DB2-BD59-A6C34878D82A}">
+                    <a16:rowId xmlns:a16="http://schemas.microsoft.com/office/drawing/2014/main" val="4023864318"/>
+                  </a:ext>
+                </a:extLst>
+              </a:tr>
+              <a:tr h="370840">
+                <a:tc>
+                  <a:txBody>
+                    <a:bodyPr/>
+                    <a:lstStyle/>
+                    <a:p>
+                      <a:r>
+                        <a:rPr lang="es-CO" sz="1400" dirty="0"/>
+                        <a:t>Descripción del requerimiento</a:t>
+                      </a:r>
+                    </a:p>
+                  </a:txBody>
+                  <a:tcPr/>
+                </a:tc>
+                <a:tc>
+                  <a:txBody>
+                    <a:bodyPr/>
+                    <a:lstStyle/>
+                    <a:p>
+                      <a:r>
+                        <a:rPr lang="es-CO" sz="1400" dirty="0"/>
+                        <a:t>El sistema podrá habilitar la creación de usuarios</a:t>
+                      </a:r>
+                    </a:p>
+                  </a:txBody>
+                  <a:tcPr/>
+                </a:tc>
+                <a:extLst>
+                  <a:ext uri="{0D108BD9-81ED-4DB2-BD59-A6C34878D82A}">
+                    <a16:rowId xmlns:a16="http://schemas.microsoft.com/office/drawing/2014/main" val="821924514"/>
+                  </a:ext>
+                </a:extLst>
+              </a:tr>
+              <a:tr h="565590">
+                <a:tc>
+                  <a:txBody>
+                    <a:bodyPr/>
+                    <a:lstStyle/>
+                    <a:p>
+                      <a:r>
+                        <a:rPr lang="es-CO" sz="1400" dirty="0"/>
+                        <a:t>Requerimientos no funcionales</a:t>
+                      </a:r>
+                    </a:p>
+                  </a:txBody>
+                  <a:tcPr/>
+                </a:tc>
+                <a:tc>
+                  <a:txBody>
+                    <a:bodyPr/>
+                    <a:lstStyle/>
+                    <a:p>
+                      <a:r>
+                        <a:rPr lang="es-CO" sz="1400" dirty="0"/>
+                        <a:t>RNF06</a:t>
+                      </a:r>
+                    </a:p>
+                    <a:p>
+                      <a:r>
+                        <a:rPr lang="es-CO" sz="1400" dirty="0"/>
+                        <a:t>RNF08</a:t>
+                      </a:r>
+                    </a:p>
+                    <a:p>
+                      <a:r>
+                        <a:rPr lang="es-CO" sz="1400" dirty="0"/>
+                        <a:t>RNF09</a:t>
+                      </a:r>
+                    </a:p>
+                    <a:p>
+                      <a:r>
+                        <a:rPr lang="es-CO" sz="1400" dirty="0"/>
+                        <a:t>RNF13</a:t>
+                      </a:r>
+                    </a:p>
+                    <a:p>
+                      <a:r>
+                        <a:rPr lang="es-CO" sz="1400" dirty="0"/>
+                        <a:t>RNF14</a:t>
+                      </a:r>
+                    </a:p>
+                    <a:p>
+                      <a:r>
+                        <a:rPr lang="es-CO" sz="1400" dirty="0"/>
+                        <a:t>RNF15</a:t>
+                      </a:r>
+                    </a:p>
+                    <a:p>
+                      <a:r>
+                        <a:rPr lang="es-CO" sz="1400" dirty="0"/>
+                        <a:t>RNF16</a:t>
+                      </a:r>
+                    </a:p>
+                  </a:txBody>
+                  <a:tcPr/>
+                </a:tc>
+                <a:extLst>
+                  <a:ext uri="{0D108BD9-81ED-4DB2-BD59-A6C34878D82A}">
+                    <a16:rowId xmlns:a16="http://schemas.microsoft.com/office/drawing/2014/main" val="2890632905"/>
+                  </a:ext>
+                </a:extLst>
+              </a:tr>
+              <a:tr h="370840">
+                <a:tc>
+                  <a:txBody>
+                    <a:bodyPr/>
+                    <a:lstStyle/>
+                    <a:p>
+                      <a:r>
+                        <a:rPr lang="es-CO" sz="1400" dirty="0"/>
+                        <a:t>Prioridad del requerimiento</a:t>
+                      </a:r>
+                    </a:p>
+                  </a:txBody>
+                  <a:tcPr/>
+                </a:tc>
+                <a:tc>
+                  <a:txBody>
+                    <a:bodyPr/>
+                    <a:lstStyle/>
+                    <a:p>
+                      <a:r>
+                        <a:rPr lang="es-CO" sz="1400" dirty="0"/>
+                        <a:t>Alta</a:t>
+                      </a:r>
+                    </a:p>
+                  </a:txBody>
+                  <a:tcPr/>
+                </a:tc>
+                <a:extLst>
+                  <a:ext uri="{0D108BD9-81ED-4DB2-BD59-A6C34878D82A}">
+                    <a16:rowId xmlns:a16="http://schemas.microsoft.com/office/drawing/2014/main" val="1092200181"/>
+                  </a:ext>
+                </a:extLst>
+              </a:tr>
+            </a:tbl>
+          </a:graphicData>
+        </a:graphic>
+      </p:graphicFrame>
+    </p:spTree>
+    <p:extLst>
+      <p:ext uri="{BB962C8B-B14F-4D97-AF65-F5344CB8AC3E}">
+        <p14:creationId xmlns:p14="http://schemas.microsoft.com/office/powerpoint/2010/main" val="831625336"/>
+      </p:ext>
+    </p:extLst>
+  </p:cSld>
+  <p:clrMapOvr>
+    <a:masterClrMapping/>
+  </p:clrMapOvr>
+</p:sld>
+</file>
+
+<file path=ppt/slides/slide31.xml><?xml version="1.0" encoding="utf-8"?>
+<p:sld xmlns:a="http://schemas.openxmlformats.org/drawingml/2006/main" xmlns:r="http://schemas.openxmlformats.org/officeDocument/2006/relationships" xmlns:p="http://schemas.openxmlformats.org/presentationml/2006/main">
+  <p:cSld>
+    <p:spTree>
+      <p:nvGrpSpPr>
+        <p:cNvPr id="1" name=""/>
+        <p:cNvGrpSpPr/>
+        <p:nvPr/>
+      </p:nvGrpSpPr>
+      <p:grpSpPr>
+        <a:xfrm>
+          <a:off x="0" y="0"/>
+          <a:ext cx="0" cy="0"/>
+          <a:chOff x="0" y="0"/>
+          <a:chExt cx="0" cy="0"/>
+        </a:xfrm>
+      </p:grpSpPr>
+      <p:sp>
+        <p:nvSpPr>
+          <p:cNvPr id="2" name="Título 1">
+            <a:extLst>
+              <a:ext uri="{FF2B5EF4-FFF2-40B4-BE49-F238E27FC236}">
+                <a16:creationId xmlns:a16="http://schemas.microsoft.com/office/drawing/2014/main" id="{82EB4807-D4D5-4B69-A2BE-268A2CD72095}"/>
+              </a:ext>
+            </a:extLst>
+          </p:cNvPr>
+          <p:cNvSpPr>
+            <a:spLocks noGrp="1"/>
+          </p:cNvSpPr>
+          <p:nvPr>
+            <p:ph type="title"/>
+          </p:nvPr>
+        </p:nvSpPr>
+        <p:spPr/>
+        <p:txBody>
+          <a:bodyPr/>
+          <a:lstStyle/>
+          <a:p>
+            <a:r>
+              <a:rPr lang="es-CO" dirty="0"/>
+              <a:t>Requerimientos funcionales</a:t>
+            </a:r>
+          </a:p>
+        </p:txBody>
+      </p:sp>
+      <p:graphicFrame>
+        <p:nvGraphicFramePr>
+          <p:cNvPr id="4" name="Tabla 4">
+            <a:extLst>
+              <a:ext uri="{FF2B5EF4-FFF2-40B4-BE49-F238E27FC236}">
+                <a16:creationId xmlns:a16="http://schemas.microsoft.com/office/drawing/2014/main" id="{F8977ED4-9D94-469E-96C2-AA9246A30004}"/>
+              </a:ext>
+            </a:extLst>
+          </p:cNvPr>
+          <p:cNvGraphicFramePr>
+            <a:graphicFrameLocks noGrp="1"/>
+          </p:cNvGraphicFramePr>
+          <p:nvPr>
+            <p:ph idx="1"/>
+            <p:extLst>
+              <p:ext uri="{D42A27DB-BD31-4B8C-83A1-F6EECF244321}">
+                <p14:modId xmlns:p14="http://schemas.microsoft.com/office/powerpoint/2010/main" val="3859166619"/>
+              </p:ext>
+            </p:extLst>
+          </p:nvPr>
+        </p:nvGraphicFramePr>
+        <p:xfrm>
+          <a:off x="5118100" y="958020"/>
+          <a:ext cx="6281738" cy="3947160"/>
+        </p:xfrm>
+        <a:graphic>
+          <a:graphicData uri="http://schemas.openxmlformats.org/drawingml/2006/table">
+            <a:tbl>
+              <a:tblPr firstRow="1" bandRow="1">
+                <a:tableStyleId>{5C22544A-7EE6-4342-B048-85BDC9FD1C3A}</a:tableStyleId>
+              </a:tblPr>
+              <a:tblGrid>
+                <a:gridCol w="3140869">
+                  <a:extLst>
+                    <a:ext uri="{9D8B030D-6E8A-4147-A177-3AD203B41FA5}">
+                      <a16:colId xmlns:a16="http://schemas.microsoft.com/office/drawing/2014/main" val="4051387547"/>
+                    </a:ext>
+                  </a:extLst>
+                </a:gridCol>
+                <a:gridCol w="3140869">
+                  <a:extLst>
+                    <a:ext uri="{9D8B030D-6E8A-4147-A177-3AD203B41FA5}">
+                      <a16:colId xmlns:a16="http://schemas.microsoft.com/office/drawing/2014/main" val="4188552159"/>
+                    </a:ext>
+                  </a:extLst>
+                </a:gridCol>
+              </a:tblGrid>
+              <a:tr h="370840">
+                <a:tc>
+                  <a:txBody>
+                    <a:bodyPr/>
+                    <a:lstStyle/>
+                    <a:p>
+                      <a:r>
+                        <a:rPr lang="es-CO" sz="1400" dirty="0"/>
+                        <a:t>Identificación del requerimiento</a:t>
+                      </a:r>
+                    </a:p>
+                  </a:txBody>
+                  <a:tcPr/>
+                </a:tc>
+                <a:tc>
+                  <a:txBody>
+                    <a:bodyPr/>
+                    <a:lstStyle/>
+                    <a:p>
+                      <a:r>
+                        <a:rPr lang="es-CO" sz="1400" dirty="0"/>
+                        <a:t>RF02</a:t>
+                      </a:r>
+                    </a:p>
+                  </a:txBody>
+                  <a:tcPr/>
+                </a:tc>
+                <a:extLst>
+                  <a:ext uri="{0D108BD9-81ED-4DB2-BD59-A6C34878D82A}">
+                    <a16:rowId xmlns:a16="http://schemas.microsoft.com/office/drawing/2014/main" val="637406872"/>
+                  </a:ext>
+                </a:extLst>
+              </a:tr>
+              <a:tr h="370840">
+                <a:tc>
+                  <a:txBody>
+                    <a:bodyPr/>
+                    <a:lstStyle/>
+                    <a:p>
+                      <a:r>
+                        <a:rPr lang="es-CO" sz="1400" dirty="0"/>
+                        <a:t>Nombre del requerimiento</a:t>
+                      </a:r>
+                    </a:p>
+                  </a:txBody>
+                  <a:tcPr/>
+                </a:tc>
+                <a:tc>
+                  <a:txBody>
+                    <a:bodyPr/>
+                    <a:lstStyle/>
+                    <a:p>
+                      <a:r>
+                        <a:rPr lang="es-CO" sz="1400" dirty="0"/>
+                        <a:t>Identificar  usuario</a:t>
+                      </a:r>
+                    </a:p>
+                  </a:txBody>
+                  <a:tcPr/>
+                </a:tc>
+                <a:extLst>
+                  <a:ext uri="{0D108BD9-81ED-4DB2-BD59-A6C34878D82A}">
+                    <a16:rowId xmlns:a16="http://schemas.microsoft.com/office/drawing/2014/main" val="185286241"/>
+                  </a:ext>
+                </a:extLst>
+              </a:tr>
+              <a:tr h="370840">
+                <a:tc>
+                  <a:txBody>
+                    <a:bodyPr/>
+                    <a:lstStyle/>
+                    <a:p>
+                      <a:r>
+                        <a:rPr lang="es-CO" sz="1400" dirty="0"/>
+                        <a:t>Características</a:t>
+                      </a:r>
+                    </a:p>
+                  </a:txBody>
+                  <a:tcPr/>
+                </a:tc>
+                <a:tc>
+                  <a:txBody>
+                    <a:bodyPr/>
+                    <a:lstStyle/>
+                    <a:p>
+                      <a:r>
+                        <a:rPr lang="es-CO" sz="1400" dirty="0"/>
+                        <a:t>Los usuarios deben ingresar a la página con una clave y un nombre de usuario.</a:t>
+                      </a:r>
+                    </a:p>
+                  </a:txBody>
+                  <a:tcPr/>
+                </a:tc>
+                <a:extLst>
+                  <a:ext uri="{0D108BD9-81ED-4DB2-BD59-A6C34878D82A}">
+                    <a16:rowId xmlns:a16="http://schemas.microsoft.com/office/drawing/2014/main" val="4023864318"/>
+                  </a:ext>
+                </a:extLst>
+              </a:tr>
+              <a:tr h="370840">
+                <a:tc>
+                  <a:txBody>
+                    <a:bodyPr/>
+                    <a:lstStyle/>
+                    <a:p>
+                      <a:r>
+                        <a:rPr lang="es-CO" sz="1400" dirty="0"/>
+                        <a:t>Descripción del requerimiento</a:t>
+                      </a:r>
+                    </a:p>
+                  </a:txBody>
+                  <a:tcPr/>
+                </a:tc>
+                <a:tc>
+                  <a:txBody>
+                    <a:bodyPr/>
+                    <a:lstStyle/>
+                    <a:p>
+                      <a:r>
+                        <a:rPr lang="es-CO" sz="1400" dirty="0"/>
+                        <a:t>El sistema podrá ser consultado de acuerdo al rol de cada usuario.</a:t>
+                      </a:r>
+                    </a:p>
+                  </a:txBody>
+                  <a:tcPr/>
+                </a:tc>
+                <a:extLst>
+                  <a:ext uri="{0D108BD9-81ED-4DB2-BD59-A6C34878D82A}">
+                    <a16:rowId xmlns:a16="http://schemas.microsoft.com/office/drawing/2014/main" val="821924514"/>
+                  </a:ext>
+                </a:extLst>
+              </a:tr>
+              <a:tr h="370840">
+                <a:tc>
+                  <a:txBody>
+                    <a:bodyPr/>
+                    <a:lstStyle/>
+                    <a:p>
+                      <a:r>
+                        <a:rPr lang="es-CO" sz="1400" dirty="0"/>
+                        <a:t>Requerimientos no funcionales</a:t>
+                      </a:r>
+                    </a:p>
+                  </a:txBody>
+                  <a:tcPr/>
+                </a:tc>
+                <a:tc>
+                  <a:txBody>
+                    <a:bodyPr/>
+                    <a:lstStyle/>
+                    <a:p>
+                      <a:r>
+                        <a:rPr lang="es-CO" sz="1400" dirty="0"/>
+                        <a:t>RNF06</a:t>
+                      </a:r>
+                    </a:p>
+                    <a:p>
+                      <a:r>
+                        <a:rPr lang="es-CO" sz="1400" dirty="0"/>
+                        <a:t>RNF08</a:t>
+                      </a:r>
+                    </a:p>
+                    <a:p>
+                      <a:r>
+                        <a:rPr lang="es-CO" sz="1400" dirty="0"/>
+                        <a:t>RNF09</a:t>
+                      </a:r>
+                    </a:p>
+                    <a:p>
+                      <a:r>
+                        <a:rPr lang="es-CO" sz="1400" dirty="0"/>
+                        <a:t>RNF13</a:t>
+                      </a:r>
+                    </a:p>
+                    <a:p>
+                      <a:r>
+                        <a:rPr lang="es-CO" sz="1400" dirty="0"/>
+                        <a:t>RNF14</a:t>
+                      </a:r>
+                    </a:p>
+                    <a:p>
+                      <a:r>
+                        <a:rPr lang="es-CO" sz="1400" dirty="0"/>
+                        <a:t>RNF15</a:t>
+                      </a:r>
+                    </a:p>
+                    <a:p>
+                      <a:r>
+                        <a:rPr lang="es-CO" sz="1400" dirty="0"/>
+                        <a:t>RNF16</a:t>
+                      </a:r>
+                    </a:p>
+                  </a:txBody>
+                  <a:tcPr/>
+                </a:tc>
+                <a:extLst>
+                  <a:ext uri="{0D108BD9-81ED-4DB2-BD59-A6C34878D82A}">
+                    <a16:rowId xmlns:a16="http://schemas.microsoft.com/office/drawing/2014/main" val="2890632905"/>
+                  </a:ext>
+                </a:extLst>
+              </a:tr>
+              <a:tr h="370840">
+                <a:tc>
+                  <a:txBody>
+                    <a:bodyPr/>
+                    <a:lstStyle/>
+                    <a:p>
+                      <a:r>
+                        <a:rPr lang="es-CO" sz="1400" dirty="0"/>
+                        <a:t>Prioridad del requerimiento</a:t>
+                      </a:r>
+                    </a:p>
+                  </a:txBody>
+                  <a:tcPr/>
+                </a:tc>
+                <a:tc>
+                  <a:txBody>
+                    <a:bodyPr/>
+                    <a:lstStyle/>
+                    <a:p>
+                      <a:r>
+                        <a:rPr lang="es-CO" sz="1400" dirty="0"/>
+                        <a:t>Alta</a:t>
+                      </a:r>
+                    </a:p>
+                  </a:txBody>
+                  <a:tcPr/>
+                </a:tc>
+                <a:extLst>
+                  <a:ext uri="{0D108BD9-81ED-4DB2-BD59-A6C34878D82A}">
+                    <a16:rowId xmlns:a16="http://schemas.microsoft.com/office/drawing/2014/main" val="1092200181"/>
+                  </a:ext>
+                </a:extLst>
+              </a:tr>
+            </a:tbl>
+          </a:graphicData>
+        </a:graphic>
+      </p:graphicFrame>
+    </p:spTree>
+    <p:extLst>
+      <p:ext uri="{BB962C8B-B14F-4D97-AF65-F5344CB8AC3E}">
+        <p14:creationId xmlns:p14="http://schemas.microsoft.com/office/powerpoint/2010/main" val="2724888028"/>
+      </p:ext>
+    </p:extLst>
+  </p:cSld>
+  <p:clrMapOvr>
+    <a:masterClrMapping/>
+  </p:clrMapOvr>
+</p:sld>
+</file>
+
+<file path=ppt/slides/slide32.xml><?xml version="1.0" encoding="utf-8"?>
+<p:sld xmlns:a="http://schemas.openxmlformats.org/drawingml/2006/main" xmlns:r="http://schemas.openxmlformats.org/officeDocument/2006/relationships" xmlns:p="http://schemas.openxmlformats.org/presentationml/2006/main">
+  <p:cSld>
+    <p:spTree>
+      <p:nvGrpSpPr>
+        <p:cNvPr id="1" name=""/>
+        <p:cNvGrpSpPr/>
+        <p:nvPr/>
+      </p:nvGrpSpPr>
+      <p:grpSpPr>
+        <a:xfrm>
+          <a:off x="0" y="0"/>
+          <a:ext cx="0" cy="0"/>
+          <a:chOff x="0" y="0"/>
+          <a:chExt cx="0" cy="0"/>
+        </a:xfrm>
+      </p:grpSpPr>
+      <p:sp>
+        <p:nvSpPr>
+          <p:cNvPr id="2" name="Título 1">
+            <a:extLst>
+              <a:ext uri="{FF2B5EF4-FFF2-40B4-BE49-F238E27FC236}">
+                <a16:creationId xmlns:a16="http://schemas.microsoft.com/office/drawing/2014/main" id="{D808FD72-459F-47C9-8B0A-62419C5C4325}"/>
+              </a:ext>
+            </a:extLst>
+          </p:cNvPr>
+          <p:cNvSpPr>
+            <a:spLocks noGrp="1"/>
+          </p:cNvSpPr>
+          <p:nvPr>
+            <p:ph type="title"/>
+          </p:nvPr>
+        </p:nvSpPr>
+        <p:spPr/>
+        <p:txBody>
+          <a:bodyPr/>
+          <a:lstStyle/>
+          <a:p>
+            <a:r>
+              <a:rPr lang="es-CO" dirty="0"/>
+              <a:t>Requerimientos funcionales</a:t>
+            </a:r>
+          </a:p>
+        </p:txBody>
+      </p:sp>
+      <p:pic>
+        <p:nvPicPr>
+          <p:cNvPr id="10" name="Imagen 9">
+            <a:extLst>
+              <a:ext uri="{FF2B5EF4-FFF2-40B4-BE49-F238E27FC236}">
+                <a16:creationId xmlns:a16="http://schemas.microsoft.com/office/drawing/2014/main" id="{46F7A5B9-D044-4380-8B8B-88FE77E60109}"/>
+              </a:ext>
+            </a:extLst>
+          </p:cNvPr>
+          <p:cNvPicPr>
+            <a:picLocks noChangeAspect="1"/>
+          </p:cNvPicPr>
+          <p:nvPr/>
+        </p:nvPicPr>
+        <p:blipFill rotWithShape="1">
+          <a:blip r:embed="rId2"/>
+          <a:srcRect l="52137" t="34257" r="14839" b="26225"/>
+          <a:stretch/>
+        </p:blipFill>
+        <p:spPr>
+          <a:xfrm>
+            <a:off x="5540514" y="1273291"/>
+            <a:ext cx="5648534" cy="3800153"/>
+          </a:xfrm>
+          <a:prstGeom prst="rect">
+            <a:avLst/>
+          </a:prstGeom>
+        </p:spPr>
+      </p:pic>
+    </p:spTree>
+    <p:extLst>
+      <p:ext uri="{BB962C8B-B14F-4D97-AF65-F5344CB8AC3E}">
+        <p14:creationId xmlns:p14="http://schemas.microsoft.com/office/powerpoint/2010/main" val="1700628346"/>
+      </p:ext>
+    </p:extLst>
+  </p:cSld>
+  <p:clrMapOvr>
+    <a:masterClrMapping/>
+  </p:clrMapOvr>
+</p:sld>
+</file>
+
+<file path=ppt/slides/slide33.xml><?xml version="1.0" encoding="utf-8"?>
+<p:sld xmlns:a="http://schemas.openxmlformats.org/drawingml/2006/main" xmlns:r="http://schemas.openxmlformats.org/officeDocument/2006/relationships" xmlns:p="http://schemas.openxmlformats.org/presentationml/2006/main">
+  <p:cSld>
+    <p:spTree>
+      <p:nvGrpSpPr>
+        <p:cNvPr id="1" name=""/>
+        <p:cNvGrpSpPr/>
+        <p:nvPr/>
+      </p:nvGrpSpPr>
+      <p:grpSpPr>
+        <a:xfrm>
+          <a:off x="0" y="0"/>
+          <a:ext cx="0" cy="0"/>
+          <a:chOff x="0" y="0"/>
+          <a:chExt cx="0" cy="0"/>
+        </a:xfrm>
+      </p:grpSpPr>
+      <p:sp>
+        <p:nvSpPr>
+          <p:cNvPr id="2" name="Título 1">
+            <a:extLst>
+              <a:ext uri="{FF2B5EF4-FFF2-40B4-BE49-F238E27FC236}">
+                <a16:creationId xmlns:a16="http://schemas.microsoft.com/office/drawing/2014/main" id="{3FD9E7C9-B08E-4678-9410-6655D811302D}"/>
+              </a:ext>
+            </a:extLst>
+          </p:cNvPr>
+          <p:cNvSpPr>
+            <a:spLocks noGrp="1"/>
+          </p:cNvSpPr>
+          <p:nvPr>
+            <p:ph type="title"/>
+          </p:nvPr>
+        </p:nvSpPr>
+        <p:spPr/>
+        <p:txBody>
+          <a:bodyPr/>
+          <a:lstStyle/>
+          <a:p>
+            <a:r>
+              <a:rPr lang="es-CO" dirty="0"/>
+              <a:t>Requerimientos funcionales</a:t>
+            </a:r>
+          </a:p>
+        </p:txBody>
+      </p:sp>
+      <p:graphicFrame>
+        <p:nvGraphicFramePr>
+          <p:cNvPr id="12" name="Tabla 4">
+            <a:extLst>
+              <a:ext uri="{FF2B5EF4-FFF2-40B4-BE49-F238E27FC236}">
+                <a16:creationId xmlns:a16="http://schemas.microsoft.com/office/drawing/2014/main" id="{14B94452-F3D0-4381-8012-5A34351EEF19}"/>
+              </a:ext>
+            </a:extLst>
+          </p:cNvPr>
+          <p:cNvGraphicFramePr>
+            <a:graphicFrameLocks noGrp="1"/>
+          </p:cNvGraphicFramePr>
+          <p:nvPr>
+            <p:ph idx="1"/>
+            <p:extLst>
+              <p:ext uri="{D42A27DB-BD31-4B8C-83A1-F6EECF244321}">
+                <p14:modId xmlns:p14="http://schemas.microsoft.com/office/powerpoint/2010/main" val="1118360086"/>
+              </p:ext>
+            </p:extLst>
+          </p:nvPr>
+        </p:nvGraphicFramePr>
+        <p:xfrm>
+          <a:off x="5118100" y="803275"/>
+          <a:ext cx="6281738" cy="4587240"/>
+        </p:xfrm>
+        <a:graphic>
+          <a:graphicData uri="http://schemas.openxmlformats.org/drawingml/2006/table">
+            <a:tbl>
+              <a:tblPr firstRow="1" bandRow="1">
+                <a:tableStyleId>{5C22544A-7EE6-4342-B048-85BDC9FD1C3A}</a:tableStyleId>
+              </a:tblPr>
+              <a:tblGrid>
+                <a:gridCol w="3140869">
+                  <a:extLst>
+                    <a:ext uri="{9D8B030D-6E8A-4147-A177-3AD203B41FA5}">
+                      <a16:colId xmlns:a16="http://schemas.microsoft.com/office/drawing/2014/main" val="1956061622"/>
+                    </a:ext>
+                  </a:extLst>
+                </a:gridCol>
+                <a:gridCol w="3140869">
+                  <a:extLst>
+                    <a:ext uri="{9D8B030D-6E8A-4147-A177-3AD203B41FA5}">
+                      <a16:colId xmlns:a16="http://schemas.microsoft.com/office/drawing/2014/main" val="2936552865"/>
+                    </a:ext>
+                  </a:extLst>
+                </a:gridCol>
+              </a:tblGrid>
+              <a:tr h="370840">
+                <a:tc>
+                  <a:txBody>
+                    <a:bodyPr/>
+                    <a:lstStyle/>
+                    <a:p>
+                      <a:r>
+                        <a:rPr lang="es-CO" sz="1400" dirty="0"/>
+                        <a:t>Identificación del requerimiento</a:t>
+                      </a:r>
+                    </a:p>
+                  </a:txBody>
+                  <a:tcPr/>
+                </a:tc>
+                <a:tc>
+                  <a:txBody>
+                    <a:bodyPr/>
+                    <a:lstStyle/>
+                    <a:p>
+                      <a:r>
+                        <a:rPr lang="es-CO" sz="1400" dirty="0"/>
+                        <a:t>RF04</a:t>
+                      </a:r>
+                    </a:p>
+                  </a:txBody>
+                  <a:tcPr/>
+                </a:tc>
+                <a:extLst>
+                  <a:ext uri="{0D108BD9-81ED-4DB2-BD59-A6C34878D82A}">
+                    <a16:rowId xmlns:a16="http://schemas.microsoft.com/office/drawing/2014/main" val="1125974093"/>
+                  </a:ext>
+                </a:extLst>
+              </a:tr>
+              <a:tr h="370840">
+                <a:tc>
+                  <a:txBody>
+                    <a:bodyPr/>
+                    <a:lstStyle/>
+                    <a:p>
+                      <a:r>
+                        <a:rPr lang="es-CO" sz="1400" dirty="0"/>
+                        <a:t>Nombre del requerimiento</a:t>
+                      </a:r>
+                    </a:p>
+                  </a:txBody>
+                  <a:tcPr/>
+                </a:tc>
+                <a:tc>
+                  <a:txBody>
+                    <a:bodyPr/>
+                    <a:lstStyle/>
+                    <a:p>
+                      <a:r>
+                        <a:rPr lang="es-CO" sz="1400" dirty="0"/>
+                        <a:t>Cargar notas</a:t>
+                      </a:r>
+                    </a:p>
+                  </a:txBody>
+                  <a:tcPr/>
+                </a:tc>
+                <a:extLst>
+                  <a:ext uri="{0D108BD9-81ED-4DB2-BD59-A6C34878D82A}">
+                    <a16:rowId xmlns:a16="http://schemas.microsoft.com/office/drawing/2014/main" val="174785449"/>
+                  </a:ext>
+                </a:extLst>
+              </a:tr>
+              <a:tr h="370840">
+                <a:tc>
+                  <a:txBody>
+                    <a:bodyPr/>
+                    <a:lstStyle/>
+                    <a:p>
+                      <a:r>
+                        <a:rPr lang="es-CO" sz="1400" dirty="0"/>
+                        <a:t>Características</a:t>
+                      </a:r>
+                    </a:p>
+                  </a:txBody>
+                  <a:tcPr/>
+                </a:tc>
+                <a:tc>
+                  <a:txBody>
+                    <a:bodyPr/>
+                    <a:lstStyle/>
+                    <a:p>
+                      <a:r>
+                        <a:rPr lang="es-CO" sz="1400" dirty="0"/>
+                        <a:t>Los usuarios podrán subir las notas parciales de cada bimestre.</a:t>
+                      </a:r>
+                    </a:p>
+                  </a:txBody>
+                  <a:tcPr/>
+                </a:tc>
+                <a:extLst>
+                  <a:ext uri="{0D108BD9-81ED-4DB2-BD59-A6C34878D82A}">
+                    <a16:rowId xmlns:a16="http://schemas.microsoft.com/office/drawing/2014/main" val="4070051422"/>
+                  </a:ext>
+                </a:extLst>
+              </a:tr>
+              <a:tr h="370840">
+                <a:tc>
+                  <a:txBody>
+                    <a:bodyPr/>
+                    <a:lstStyle/>
+                    <a:p>
+                      <a:r>
+                        <a:rPr lang="es-CO" sz="1400" dirty="0"/>
+                        <a:t>Descripción del requerimiento</a:t>
+                      </a:r>
+                    </a:p>
+                  </a:txBody>
+                  <a:tcPr/>
+                </a:tc>
+                <a:tc>
+                  <a:txBody>
+                    <a:bodyPr/>
+                    <a:lstStyle/>
+                    <a:p>
+                      <a:r>
+                        <a:rPr lang="es-CO" sz="1400" dirty="0"/>
+                        <a:t>El sistema permitirá al usuario docente cargar las notas respectivas de cada parcial y el sistema sacará la definitiva.</a:t>
+                      </a:r>
+                    </a:p>
+                  </a:txBody>
+                  <a:tcPr/>
+                </a:tc>
+                <a:extLst>
+                  <a:ext uri="{0D108BD9-81ED-4DB2-BD59-A6C34878D82A}">
+                    <a16:rowId xmlns:a16="http://schemas.microsoft.com/office/drawing/2014/main" val="1259768691"/>
+                  </a:ext>
+                </a:extLst>
+              </a:tr>
+              <a:tr h="370840">
+                <a:tc>
+                  <a:txBody>
+                    <a:bodyPr/>
+                    <a:lstStyle/>
+                    <a:p>
+                      <a:r>
+                        <a:rPr lang="es-CO" sz="1400" dirty="0"/>
+                        <a:t>Requerimientos no funcionales</a:t>
+                      </a:r>
+                    </a:p>
+                  </a:txBody>
+                  <a:tcPr/>
+                </a:tc>
+                <a:tc>
+                  <a:txBody>
+                    <a:bodyPr/>
+                    <a:lstStyle/>
+                    <a:p>
+                      <a:r>
+                        <a:rPr lang="es-CO" sz="1400" dirty="0"/>
+                        <a:t>RNF04</a:t>
+                      </a:r>
+                    </a:p>
+                    <a:p>
+                      <a:r>
+                        <a:rPr lang="es-CO" sz="1400" dirty="0"/>
+                        <a:t>RNF01</a:t>
+                      </a:r>
+                    </a:p>
+                    <a:p>
+                      <a:r>
+                        <a:rPr lang="es-CO" sz="1400" dirty="0"/>
+                        <a:t>RNF06</a:t>
+                      </a:r>
+                    </a:p>
+                    <a:p>
+                      <a:r>
+                        <a:rPr lang="es-CO" sz="1400" dirty="0"/>
+                        <a:t>RNF08</a:t>
+                      </a:r>
+                    </a:p>
+                    <a:p>
+                      <a:r>
+                        <a:rPr lang="es-CO" sz="1400" dirty="0"/>
+                        <a:t>RNF09</a:t>
+                      </a:r>
+                    </a:p>
+                    <a:p>
+                      <a:r>
+                        <a:rPr lang="es-CO" sz="1400" dirty="0"/>
+                        <a:t>RNF13</a:t>
+                      </a:r>
+                    </a:p>
+                    <a:p>
+                      <a:r>
+                        <a:rPr lang="es-CO" sz="1400" dirty="0"/>
+                        <a:t>RNF14</a:t>
+                      </a:r>
+                    </a:p>
+                    <a:p>
+                      <a:r>
+                        <a:rPr lang="es-CO" sz="1400" dirty="0"/>
+                        <a:t>RNF15</a:t>
+                      </a:r>
+                    </a:p>
+                    <a:p>
+                      <a:r>
+                        <a:rPr lang="es-CO" sz="1400" dirty="0"/>
+                        <a:t>RNF16</a:t>
+                      </a:r>
+                    </a:p>
+                  </a:txBody>
+                  <a:tcPr/>
+                </a:tc>
+                <a:extLst>
+                  <a:ext uri="{0D108BD9-81ED-4DB2-BD59-A6C34878D82A}">
+                    <a16:rowId xmlns:a16="http://schemas.microsoft.com/office/drawing/2014/main" val="1297520108"/>
+                  </a:ext>
+                </a:extLst>
+              </a:tr>
+              <a:tr h="370840">
+                <a:tc>
+                  <a:txBody>
+                    <a:bodyPr/>
+                    <a:lstStyle/>
+                    <a:p>
+                      <a:r>
+                        <a:rPr lang="es-CO" sz="1400" dirty="0"/>
+                        <a:t>Prioridad del requerimiento</a:t>
+                      </a:r>
+                    </a:p>
+                  </a:txBody>
+                  <a:tcPr/>
+                </a:tc>
+                <a:tc>
+                  <a:txBody>
+                    <a:bodyPr/>
+                    <a:lstStyle/>
+                    <a:p>
+                      <a:r>
+                        <a:rPr lang="es-CO" sz="1400" dirty="0"/>
+                        <a:t>Alta</a:t>
+                      </a:r>
+                    </a:p>
+                  </a:txBody>
+                  <a:tcPr/>
+                </a:tc>
+                <a:extLst>
+                  <a:ext uri="{0D108BD9-81ED-4DB2-BD59-A6C34878D82A}">
+                    <a16:rowId xmlns:a16="http://schemas.microsoft.com/office/drawing/2014/main" val="3969001885"/>
+                  </a:ext>
+                </a:extLst>
+              </a:tr>
+            </a:tbl>
+          </a:graphicData>
+        </a:graphic>
+      </p:graphicFrame>
+    </p:spTree>
+    <p:extLst>
+      <p:ext uri="{BB962C8B-B14F-4D97-AF65-F5344CB8AC3E}">
+        <p14:creationId xmlns:p14="http://schemas.microsoft.com/office/powerpoint/2010/main" val="2413226412"/>
       </p:ext>
     </p:extLst>
   </p:cSld>

</xml_diff>

<commit_message>
Docs: Requerimientos no funcionales. Power_Point-v7
Se agregaron dos cuadros de requerimientos no funcionales al final de las diapositivas.
</commit_message>
<xml_diff>
--- a/PLANTEAMIENTO_DEL_PROBLEMA.pptx
+++ b/PLANTEAMIENTO_DEL_PROBLEMA.pptx
@@ -44,6 +44,9 @@
     <p:sldId id="294" r:id="rId38"/>
     <p:sldId id="295" r:id="rId39"/>
     <p:sldId id="296" r:id="rId40"/>
+    <p:sldId id="297" r:id="rId41"/>
+    <p:sldId id="298" r:id="rId42"/>
+    <p:sldId id="299" r:id="rId43"/>
   </p:sldIdLst>
   <p:sldSz cx="12192000" cy="6858000"/>
   <p:notesSz cx="6858000" cy="9144000"/>
@@ -1559,7 +1562,7 @@
           <a:p>
             <a:fld id="{D253BB75-C9F5-8342-9D8A-C2F31092015F}" type="datetimeFigureOut">
               <a:rPr lang="es-CO" smtClean="0"/>
-              <a:t>8/03/2021</a:t>
+              <a:t>08/03/2021</a:t>
             </a:fld>
             <a:endParaRPr lang="es-CO"/>
           </a:p>
@@ -3018,7 +3021,7 @@
           <a:p>
             <a:fld id="{D253BB75-C9F5-8342-9D8A-C2F31092015F}" type="datetimeFigureOut">
               <a:rPr lang="es-CO" smtClean="0"/>
-              <a:t>8/03/2021</a:t>
+              <a:t>08/03/2021</a:t>
             </a:fld>
             <a:endParaRPr lang="es-CO"/>
           </a:p>
@@ -4471,7 +4474,7 @@
           <a:p>
             <a:fld id="{D253BB75-C9F5-8342-9D8A-C2F31092015F}" type="datetimeFigureOut">
               <a:rPr lang="es-CO" smtClean="0"/>
-              <a:t>8/03/2021</a:t>
+              <a:t>08/03/2021</a:t>
             </a:fld>
             <a:endParaRPr lang="es-CO"/>
           </a:p>
@@ -5926,7 +5929,7 @@
           <a:p>
             <a:fld id="{D253BB75-C9F5-8342-9D8A-C2F31092015F}" type="datetimeFigureOut">
               <a:rPr lang="es-CO" smtClean="0"/>
-              <a:t>8/03/2021</a:t>
+              <a:t>08/03/2021</a:t>
             </a:fld>
             <a:endParaRPr lang="es-CO"/>
           </a:p>
@@ -7434,7 +7437,7 @@
           <a:p>
             <a:fld id="{D253BB75-C9F5-8342-9D8A-C2F31092015F}" type="datetimeFigureOut">
               <a:rPr lang="es-CO" smtClean="0"/>
-              <a:t>8/03/2021</a:t>
+              <a:t>08/03/2021</a:t>
             </a:fld>
             <a:endParaRPr lang="es-CO"/>
           </a:p>
@@ -8955,7 +8958,7 @@
           <a:p>
             <a:fld id="{D253BB75-C9F5-8342-9D8A-C2F31092015F}" type="datetimeFigureOut">
               <a:rPr lang="es-CO" smtClean="0"/>
-              <a:t>8/03/2021</a:t>
+              <a:t>08/03/2021</a:t>
             </a:fld>
             <a:endParaRPr lang="es-CO"/>
           </a:p>
@@ -10620,7 +10623,7 @@
           <a:p>
             <a:fld id="{D253BB75-C9F5-8342-9D8A-C2F31092015F}" type="datetimeFigureOut">
               <a:rPr lang="es-CO" smtClean="0"/>
-              <a:t>8/03/2021</a:t>
+              <a:t>08/03/2021</a:t>
             </a:fld>
             <a:endParaRPr lang="es-CO"/>
           </a:p>
@@ -12018,7 +12021,7 @@
           <a:p>
             <a:fld id="{D253BB75-C9F5-8342-9D8A-C2F31092015F}" type="datetimeFigureOut">
               <a:rPr lang="es-CO" smtClean="0"/>
-              <a:t>8/03/2021</a:t>
+              <a:t>08/03/2021</a:t>
             </a:fld>
             <a:endParaRPr lang="es-CO"/>
           </a:p>
@@ -12118,7 +12121,7 @@
           <a:p>
             <a:fld id="{D253BB75-C9F5-8342-9D8A-C2F31092015F}" type="datetimeFigureOut">
               <a:rPr lang="es-CO" smtClean="0"/>
-              <a:t>8/03/2021</a:t>
+              <a:t>08/03/2021</a:t>
             </a:fld>
             <a:endParaRPr lang="es-CO"/>
           </a:p>
@@ -13644,7 +13647,7 @@
           <a:p>
             <a:fld id="{D253BB75-C9F5-8342-9D8A-C2F31092015F}" type="datetimeFigureOut">
               <a:rPr lang="es-CO" smtClean="0"/>
-              <a:t>8/03/2021</a:t>
+              <a:t>08/03/2021</a:t>
             </a:fld>
             <a:endParaRPr lang="es-CO"/>
           </a:p>
@@ -15180,7 +15183,7 @@
           <a:p>
             <a:fld id="{D253BB75-C9F5-8342-9D8A-C2F31092015F}" type="datetimeFigureOut">
               <a:rPr lang="es-CO" smtClean="0"/>
-              <a:t>8/03/2021</a:t>
+              <a:t>08/03/2021</a:t>
             </a:fld>
             <a:endParaRPr lang="es-CO"/>
           </a:p>
@@ -15403,7 +15406,7 @@
           <a:p>
             <a:fld id="{D253BB75-C9F5-8342-9D8A-C2F31092015F}" type="datetimeFigureOut">
               <a:rPr lang="es-CO" smtClean="0"/>
-              <a:t>8/03/2021</a:t>
+              <a:t>08/03/2021</a:t>
             </a:fld>
             <a:endParaRPr lang="es-CO"/>
           </a:p>
@@ -20422,6 +20425,647 @@
 </p:sld>
 </file>
 
+<file path=ppt/slides/slide40.xml><?xml version="1.0" encoding="utf-8"?>
+<p:sld xmlns:a="http://schemas.openxmlformats.org/drawingml/2006/main" xmlns:r="http://schemas.openxmlformats.org/officeDocument/2006/relationships" xmlns:p="http://schemas.openxmlformats.org/presentationml/2006/main">
+  <p:cSld>
+    <p:spTree>
+      <p:nvGrpSpPr>
+        <p:cNvPr id="1" name=""/>
+        <p:cNvGrpSpPr/>
+        <p:nvPr/>
+      </p:nvGrpSpPr>
+      <p:grpSpPr>
+        <a:xfrm>
+          <a:off x="0" y="0"/>
+          <a:ext cx="0" cy="0"/>
+          <a:chOff x="0" y="0"/>
+          <a:chExt cx="0" cy="0"/>
+        </a:xfrm>
+      </p:grpSpPr>
+      <p:sp>
+        <p:nvSpPr>
+          <p:cNvPr id="2" name="Título 1">
+            <a:extLst>
+              <a:ext uri="{FF2B5EF4-FFF2-40B4-BE49-F238E27FC236}">
+                <a16:creationId xmlns:a16="http://schemas.microsoft.com/office/drawing/2014/main" id="{0DF8FDDE-7FF6-114B-95BB-26E67991BA49}"/>
+              </a:ext>
+            </a:extLst>
+          </p:cNvPr>
+          <p:cNvSpPr>
+            <a:spLocks noGrp="1"/>
+          </p:cNvSpPr>
+          <p:nvPr>
+            <p:ph type="title"/>
+          </p:nvPr>
+        </p:nvSpPr>
+        <p:spPr/>
+        <p:txBody>
+          <a:bodyPr/>
+          <a:lstStyle/>
+          <a:p>
+            <a:r>
+              <a:rPr lang="es-CO"/>
+              <a:t>Requerimientos </a:t>
+            </a:r>
+            <a:r>
+              <a:rPr lang="es-CO" dirty="0"/>
+              <a:t>no funcionales</a:t>
+            </a:r>
+          </a:p>
+        </p:txBody>
+      </p:sp>
+      <p:graphicFrame>
+        <p:nvGraphicFramePr>
+          <p:cNvPr id="4" name="Tabla 4">
+            <a:extLst>
+              <a:ext uri="{FF2B5EF4-FFF2-40B4-BE49-F238E27FC236}">
+                <a16:creationId xmlns:a16="http://schemas.microsoft.com/office/drawing/2014/main" id="{3275B20B-304D-3645-A6E7-687160D9B56D}"/>
+              </a:ext>
+            </a:extLst>
+          </p:cNvPr>
+          <p:cNvGraphicFramePr>
+            <a:graphicFrameLocks noGrp="1"/>
+          </p:cNvGraphicFramePr>
+          <p:nvPr>
+            <p:ph idx="1"/>
+            <p:extLst/>
+          </p:nvPr>
+        </p:nvGraphicFramePr>
+        <p:xfrm>
+          <a:off x="5118100" y="803275"/>
+          <a:ext cx="6281738" cy="4023360"/>
+        </p:xfrm>
+        <a:graphic>
+          <a:graphicData uri="http://schemas.openxmlformats.org/drawingml/2006/table">
+            <a:tbl>
+              <a:tblPr firstRow="1" bandRow="1">
+                <a:tableStyleId>{5C22544A-7EE6-4342-B048-85BDC9FD1C3A}</a:tableStyleId>
+              </a:tblPr>
+              <a:tblGrid>
+                <a:gridCol w="3140869">
+                  <a:extLst>
+                    <a:ext uri="{9D8B030D-6E8A-4147-A177-3AD203B41FA5}">
+                      <a16:colId xmlns:a16="http://schemas.microsoft.com/office/drawing/2014/main" val="2405063638"/>
+                    </a:ext>
+                  </a:extLst>
+                </a:gridCol>
+                <a:gridCol w="3140869">
+                  <a:extLst>
+                    <a:ext uri="{9D8B030D-6E8A-4147-A177-3AD203B41FA5}">
+                      <a16:colId xmlns:a16="http://schemas.microsoft.com/office/drawing/2014/main" val="3099478781"/>
+                    </a:ext>
+                  </a:extLst>
+                </a:gridCol>
+              </a:tblGrid>
+              <a:tr h="370840">
+                <a:tc>
+                  <a:txBody>
+                    <a:bodyPr/>
+                    <a:lstStyle/>
+                    <a:p>
+                      <a:r>
+                        <a:rPr lang="es-CO" dirty="0"/>
+                        <a:t>Identificación del requerimiento</a:t>
+                      </a:r>
+                    </a:p>
+                  </a:txBody>
+                  <a:tcPr/>
+                </a:tc>
+                <a:tc>
+                  <a:txBody>
+                    <a:bodyPr/>
+                    <a:lstStyle/>
+                    <a:p>
+                      <a:r>
+                        <a:rPr lang="es-CO" dirty="0"/>
+                        <a:t>RNF04</a:t>
+                      </a:r>
+                    </a:p>
+                  </a:txBody>
+                  <a:tcPr/>
+                </a:tc>
+                <a:extLst>
+                  <a:ext uri="{0D108BD9-81ED-4DB2-BD59-A6C34878D82A}">
+                    <a16:rowId xmlns:a16="http://schemas.microsoft.com/office/drawing/2014/main" val="3120795479"/>
+                  </a:ext>
+                </a:extLst>
+              </a:tr>
+              <a:tr h="370840">
+                <a:tc>
+                  <a:txBody>
+                    <a:bodyPr/>
+                    <a:lstStyle/>
+                    <a:p>
+                      <a:r>
+                        <a:rPr lang="es-CO" dirty="0"/>
+                        <a:t>Nombre del requerimiento</a:t>
+                      </a:r>
+                    </a:p>
+                  </a:txBody>
+                  <a:tcPr/>
+                </a:tc>
+                <a:tc>
+                  <a:txBody>
+                    <a:bodyPr/>
+                    <a:lstStyle/>
+                    <a:p>
+                      <a:r>
+                        <a:rPr lang="es-CO" dirty="0"/>
+                        <a:t>Forma de recuperación de la contraseña</a:t>
+                      </a:r>
+                    </a:p>
+                  </a:txBody>
+                  <a:tcPr/>
+                </a:tc>
+                <a:extLst>
+                  <a:ext uri="{0D108BD9-81ED-4DB2-BD59-A6C34878D82A}">
+                    <a16:rowId xmlns:a16="http://schemas.microsoft.com/office/drawing/2014/main" val="1343925762"/>
+                  </a:ext>
+                </a:extLst>
+              </a:tr>
+              <a:tr h="370840">
+                <a:tc>
+                  <a:txBody>
+                    <a:bodyPr/>
+                    <a:lstStyle/>
+                    <a:p>
+                      <a:r>
+                        <a:rPr lang="es-CO" dirty="0"/>
+                        <a:t>Caracterísitcas</a:t>
+                      </a:r>
+                    </a:p>
+                  </a:txBody>
+                  <a:tcPr/>
+                </a:tc>
+                <a:tc>
+                  <a:txBody>
+                    <a:bodyPr/>
+                    <a:lstStyle/>
+                    <a:p>
+                      <a:r>
+                        <a:rPr lang="es-CO" dirty="0"/>
+                        <a:t>El sistema recuperará la contraseña de acuerdo a la solicitud del usuario.</a:t>
+                      </a:r>
+                    </a:p>
+                  </a:txBody>
+                  <a:tcPr/>
+                </a:tc>
+                <a:extLst>
+                  <a:ext uri="{0D108BD9-81ED-4DB2-BD59-A6C34878D82A}">
+                    <a16:rowId xmlns:a16="http://schemas.microsoft.com/office/drawing/2014/main" val="769886354"/>
+                  </a:ext>
+                </a:extLst>
+              </a:tr>
+              <a:tr h="370840">
+                <a:tc>
+                  <a:txBody>
+                    <a:bodyPr/>
+                    <a:lstStyle/>
+                    <a:p>
+                      <a:r>
+                        <a:rPr lang="es-CO" dirty="0"/>
+                        <a:t>Descripción del requerimiento</a:t>
+                      </a:r>
+                    </a:p>
+                  </a:txBody>
+                  <a:tcPr/>
+                </a:tc>
+                <a:tc>
+                  <a:txBody>
+                    <a:bodyPr/>
+                    <a:lstStyle/>
+                    <a:p>
+                      <a:r>
+                        <a:rPr lang="es-CO" dirty="0"/>
+                        <a:t>El usuario escogerá entre un código de verificación enviado bien sea al correo o al móvil.</a:t>
+                      </a:r>
+                    </a:p>
+                  </a:txBody>
+                  <a:tcPr/>
+                </a:tc>
+                <a:extLst>
+                  <a:ext uri="{0D108BD9-81ED-4DB2-BD59-A6C34878D82A}">
+                    <a16:rowId xmlns:a16="http://schemas.microsoft.com/office/drawing/2014/main" val="2397840479"/>
+                  </a:ext>
+                </a:extLst>
+              </a:tr>
+              <a:tr h="370840">
+                <a:tc>
+                  <a:txBody>
+                    <a:bodyPr/>
+                    <a:lstStyle/>
+                    <a:p>
+                      <a:r>
+                        <a:rPr lang="es-CO" dirty="0"/>
+                        <a:t>Prioridad del requerimiento</a:t>
+                      </a:r>
+                    </a:p>
+                  </a:txBody>
+                  <a:tcPr/>
+                </a:tc>
+                <a:tc>
+                  <a:txBody>
+                    <a:bodyPr/>
+                    <a:lstStyle/>
+                    <a:p>
+                      <a:r>
+                        <a:rPr lang="es-CO" dirty="0"/>
+                        <a:t>Alta</a:t>
+                      </a:r>
+                    </a:p>
+                  </a:txBody>
+                  <a:tcPr/>
+                </a:tc>
+                <a:extLst>
+                  <a:ext uri="{0D108BD9-81ED-4DB2-BD59-A6C34878D82A}">
+                    <a16:rowId xmlns:a16="http://schemas.microsoft.com/office/drawing/2014/main" val="1876826554"/>
+                  </a:ext>
+                </a:extLst>
+              </a:tr>
+            </a:tbl>
+          </a:graphicData>
+        </a:graphic>
+      </p:graphicFrame>
+    </p:spTree>
+    <p:extLst>
+      <p:ext uri="{BB962C8B-B14F-4D97-AF65-F5344CB8AC3E}">
+        <p14:creationId xmlns:p14="http://schemas.microsoft.com/office/powerpoint/2010/main" val="3610143601"/>
+      </p:ext>
+    </p:extLst>
+  </p:cSld>
+  <p:clrMapOvr>
+    <a:masterClrMapping/>
+  </p:clrMapOvr>
+</p:sld>
+</file>
+
+<file path=ppt/slides/slide41.xml><?xml version="1.0" encoding="utf-8"?>
+<p:sld xmlns:a="http://schemas.openxmlformats.org/drawingml/2006/main" xmlns:r="http://schemas.openxmlformats.org/officeDocument/2006/relationships" xmlns:p="http://schemas.openxmlformats.org/presentationml/2006/main">
+  <p:cSld>
+    <p:spTree>
+      <p:nvGrpSpPr>
+        <p:cNvPr id="1" name=""/>
+        <p:cNvGrpSpPr/>
+        <p:nvPr/>
+      </p:nvGrpSpPr>
+      <p:grpSpPr>
+        <a:xfrm>
+          <a:off x="0" y="0"/>
+          <a:ext cx="0" cy="0"/>
+          <a:chOff x="0" y="0"/>
+          <a:chExt cx="0" cy="0"/>
+        </a:xfrm>
+      </p:grpSpPr>
+      <p:sp>
+        <p:nvSpPr>
+          <p:cNvPr id="2" name="Título 1">
+            <a:extLst>
+              <a:ext uri="{FF2B5EF4-FFF2-40B4-BE49-F238E27FC236}">
+                <a16:creationId xmlns:a16="http://schemas.microsoft.com/office/drawing/2014/main" id="{0DF8FDDE-7FF6-114B-95BB-26E67991BA49}"/>
+              </a:ext>
+            </a:extLst>
+          </p:cNvPr>
+          <p:cNvSpPr>
+            <a:spLocks noGrp="1"/>
+          </p:cNvSpPr>
+          <p:nvPr>
+            <p:ph type="title"/>
+          </p:nvPr>
+        </p:nvSpPr>
+        <p:spPr/>
+        <p:txBody>
+          <a:bodyPr/>
+          <a:lstStyle/>
+          <a:p>
+            <a:r>
+              <a:rPr lang="es-CO"/>
+              <a:t>Requerimientos </a:t>
+            </a:r>
+            <a:r>
+              <a:rPr lang="es-CO" dirty="0"/>
+              <a:t>no funcionales</a:t>
+            </a:r>
+          </a:p>
+        </p:txBody>
+      </p:sp>
+      <p:graphicFrame>
+        <p:nvGraphicFramePr>
+          <p:cNvPr id="4" name="Tabla 4">
+            <a:extLst>
+              <a:ext uri="{FF2B5EF4-FFF2-40B4-BE49-F238E27FC236}">
+                <a16:creationId xmlns:a16="http://schemas.microsoft.com/office/drawing/2014/main" id="{3275B20B-304D-3645-A6E7-687160D9B56D}"/>
+              </a:ext>
+            </a:extLst>
+          </p:cNvPr>
+          <p:cNvGraphicFramePr>
+            <a:graphicFrameLocks noGrp="1"/>
+          </p:cNvGraphicFramePr>
+          <p:nvPr>
+            <p:ph idx="1"/>
+            <p:extLst/>
+          </p:nvPr>
+        </p:nvGraphicFramePr>
+        <p:xfrm>
+          <a:off x="5118100" y="803275"/>
+          <a:ext cx="6281738" cy="4023360"/>
+        </p:xfrm>
+        <a:graphic>
+          <a:graphicData uri="http://schemas.openxmlformats.org/drawingml/2006/table">
+            <a:tbl>
+              <a:tblPr firstRow="1" bandRow="1">
+                <a:tableStyleId>{5C22544A-7EE6-4342-B048-85BDC9FD1C3A}</a:tableStyleId>
+              </a:tblPr>
+              <a:tblGrid>
+                <a:gridCol w="3140869">
+                  <a:extLst>
+                    <a:ext uri="{9D8B030D-6E8A-4147-A177-3AD203B41FA5}">
+                      <a16:colId xmlns:a16="http://schemas.microsoft.com/office/drawing/2014/main" val="2405063638"/>
+                    </a:ext>
+                  </a:extLst>
+                </a:gridCol>
+                <a:gridCol w="3140869">
+                  <a:extLst>
+                    <a:ext uri="{9D8B030D-6E8A-4147-A177-3AD203B41FA5}">
+                      <a16:colId xmlns:a16="http://schemas.microsoft.com/office/drawing/2014/main" val="3099478781"/>
+                    </a:ext>
+                  </a:extLst>
+                </a:gridCol>
+              </a:tblGrid>
+              <a:tr h="370840">
+                <a:tc>
+                  <a:txBody>
+                    <a:bodyPr/>
+                    <a:lstStyle/>
+                    <a:p>
+                      <a:r>
+                        <a:rPr lang="es-CO" dirty="0"/>
+                        <a:t>Identificación del requerimiento</a:t>
+                      </a:r>
+                    </a:p>
+                  </a:txBody>
+                  <a:tcPr/>
+                </a:tc>
+                <a:tc>
+                  <a:txBody>
+                    <a:bodyPr/>
+                    <a:lstStyle/>
+                    <a:p>
+                      <a:r>
+                        <a:rPr lang="es-CO" dirty="0"/>
+                        <a:t>RNF05</a:t>
+                      </a:r>
+                    </a:p>
+                  </a:txBody>
+                  <a:tcPr/>
+                </a:tc>
+                <a:extLst>
+                  <a:ext uri="{0D108BD9-81ED-4DB2-BD59-A6C34878D82A}">
+                    <a16:rowId xmlns:a16="http://schemas.microsoft.com/office/drawing/2014/main" val="3120795479"/>
+                  </a:ext>
+                </a:extLst>
+              </a:tr>
+              <a:tr h="370840">
+                <a:tc>
+                  <a:txBody>
+                    <a:bodyPr/>
+                    <a:lstStyle/>
+                    <a:p>
+                      <a:r>
+                        <a:rPr lang="es-CO" dirty="0"/>
+                        <a:t>Nombre del requerimiento</a:t>
+                      </a:r>
+                    </a:p>
+                  </a:txBody>
+                  <a:tcPr/>
+                </a:tc>
+                <a:tc>
+                  <a:txBody>
+                    <a:bodyPr/>
+                    <a:lstStyle/>
+                    <a:p>
+                      <a:r>
+                        <a:rPr lang="es-CO" dirty="0"/>
+                        <a:t>Velocidad de generación de datos</a:t>
+                      </a:r>
+                    </a:p>
+                  </a:txBody>
+                  <a:tcPr/>
+                </a:tc>
+                <a:extLst>
+                  <a:ext uri="{0D108BD9-81ED-4DB2-BD59-A6C34878D82A}">
+                    <a16:rowId xmlns:a16="http://schemas.microsoft.com/office/drawing/2014/main" val="1343925762"/>
+                  </a:ext>
+                </a:extLst>
+              </a:tr>
+              <a:tr h="370840">
+                <a:tc>
+                  <a:txBody>
+                    <a:bodyPr/>
+                    <a:lstStyle/>
+                    <a:p>
+                      <a:r>
+                        <a:rPr lang="es-CO" dirty="0"/>
+                        <a:t>Caracterísitcas</a:t>
+                      </a:r>
+                    </a:p>
+                  </a:txBody>
+                  <a:tcPr/>
+                </a:tc>
+                <a:tc>
+                  <a:txBody>
+                    <a:bodyPr/>
+                    <a:lstStyle/>
+                    <a:p>
+                      <a:r>
+                        <a:rPr lang="es-CO" dirty="0"/>
+                        <a:t>El sistema debe generar informes estadísticos de forma rápida.</a:t>
+                      </a:r>
+                    </a:p>
+                  </a:txBody>
+                  <a:tcPr/>
+                </a:tc>
+                <a:extLst>
+                  <a:ext uri="{0D108BD9-81ED-4DB2-BD59-A6C34878D82A}">
+                    <a16:rowId xmlns:a16="http://schemas.microsoft.com/office/drawing/2014/main" val="769886354"/>
+                  </a:ext>
+                </a:extLst>
+              </a:tr>
+              <a:tr h="370840">
+                <a:tc>
+                  <a:txBody>
+                    <a:bodyPr/>
+                    <a:lstStyle/>
+                    <a:p>
+                      <a:r>
+                        <a:rPr lang="es-CO" dirty="0"/>
+                        <a:t>Descripción del requerimiento</a:t>
+                      </a:r>
+                    </a:p>
+                  </a:txBody>
+                  <a:tcPr/>
+                </a:tc>
+                <a:tc>
+                  <a:txBody>
+                    <a:bodyPr/>
+                    <a:lstStyle/>
+                    <a:p>
+                      <a:pPr marL="0" marR="0" lvl="0" indent="0" algn="l" defTabSz="914400" rtl="0" eaLnBrk="1" fontAlgn="auto" latinLnBrk="0" hangingPunct="1">
+                        <a:lnSpc>
+                          <a:spcPct val="100000"/>
+                        </a:lnSpc>
+                        <a:spcBef>
+                          <a:spcPts val="0"/>
+                        </a:spcBef>
+                        <a:spcAft>
+                          <a:spcPts val="0"/>
+                        </a:spcAft>
+                        <a:buClrTx/>
+                        <a:buSzTx/>
+                        <a:buFontTx/>
+                        <a:buNone/>
+                        <a:tabLst/>
+                        <a:defRPr/>
+                      </a:pPr>
+                      <a:r>
+                        <a:rPr lang="es-CO" dirty="0"/>
+                        <a:t>El sistema debe generar los informes estadísticos en un tiempo máximo de 0,7 segundos.</a:t>
+                      </a:r>
+                    </a:p>
+                  </a:txBody>
+                  <a:tcPr/>
+                </a:tc>
+                <a:extLst>
+                  <a:ext uri="{0D108BD9-81ED-4DB2-BD59-A6C34878D82A}">
+                    <a16:rowId xmlns:a16="http://schemas.microsoft.com/office/drawing/2014/main" val="2397840479"/>
+                  </a:ext>
+                </a:extLst>
+              </a:tr>
+              <a:tr h="370840">
+                <a:tc>
+                  <a:txBody>
+                    <a:bodyPr/>
+                    <a:lstStyle/>
+                    <a:p>
+                      <a:r>
+                        <a:rPr lang="es-CO" dirty="0"/>
+                        <a:t>Prioridad del requerimiento</a:t>
+                      </a:r>
+                    </a:p>
+                  </a:txBody>
+                  <a:tcPr/>
+                </a:tc>
+                <a:tc>
+                  <a:txBody>
+                    <a:bodyPr/>
+                    <a:lstStyle/>
+                    <a:p>
+                      <a:r>
+                        <a:rPr lang="es-CO" dirty="0"/>
+                        <a:t>Alta</a:t>
+                      </a:r>
+                    </a:p>
+                  </a:txBody>
+                  <a:tcPr/>
+                </a:tc>
+                <a:extLst>
+                  <a:ext uri="{0D108BD9-81ED-4DB2-BD59-A6C34878D82A}">
+                    <a16:rowId xmlns:a16="http://schemas.microsoft.com/office/drawing/2014/main" val="1876826554"/>
+                  </a:ext>
+                </a:extLst>
+              </a:tr>
+            </a:tbl>
+          </a:graphicData>
+        </a:graphic>
+      </p:graphicFrame>
+    </p:spTree>
+    <p:extLst>
+      <p:ext uri="{BB962C8B-B14F-4D97-AF65-F5344CB8AC3E}">
+        <p14:creationId xmlns:p14="http://schemas.microsoft.com/office/powerpoint/2010/main" val="3187345233"/>
+      </p:ext>
+    </p:extLst>
+  </p:cSld>
+  <p:clrMapOvr>
+    <a:masterClrMapping/>
+  </p:clrMapOvr>
+</p:sld>
+</file>
+
+<file path=ppt/slides/slide42.xml><?xml version="1.0" encoding="utf-8"?>
+<p:sld xmlns:a="http://schemas.openxmlformats.org/drawingml/2006/main" xmlns:r="http://schemas.openxmlformats.org/officeDocument/2006/relationships" xmlns:p="http://schemas.openxmlformats.org/presentationml/2006/main">
+  <p:cSld>
+    <p:spTree>
+      <p:nvGrpSpPr>
+        <p:cNvPr id="1" name=""/>
+        <p:cNvGrpSpPr/>
+        <p:nvPr/>
+      </p:nvGrpSpPr>
+      <p:grpSpPr>
+        <a:xfrm>
+          <a:off x="0" y="0"/>
+          <a:ext cx="0" cy="0"/>
+          <a:chOff x="0" y="0"/>
+          <a:chExt cx="0" cy="0"/>
+        </a:xfrm>
+      </p:grpSpPr>
+      <p:sp>
+        <p:nvSpPr>
+          <p:cNvPr id="2" name="Título 1"/>
+          <p:cNvSpPr>
+            <a:spLocks noGrp="1"/>
+          </p:cNvSpPr>
+          <p:nvPr>
+            <p:ph type="title"/>
+          </p:nvPr>
+        </p:nvSpPr>
+        <p:spPr/>
+        <p:txBody>
+          <a:bodyPr/>
+          <a:lstStyle/>
+          <a:p>
+            <a:r>
+              <a:rPr lang="es-CO" dirty="0" err="1" smtClean="0"/>
+              <a:t>Versionamento</a:t>
+            </a:r>
+            <a:r>
+              <a:rPr lang="es-CO" dirty="0" smtClean="0"/>
+              <a:t>  GitHub Desktop</a:t>
+            </a:r>
+            <a:endParaRPr lang="es-CO" dirty="0"/>
+          </a:p>
+        </p:txBody>
+      </p:sp>
+      <p:sp>
+        <p:nvSpPr>
+          <p:cNvPr id="3" name="Marcador de contenido 2"/>
+          <p:cNvSpPr>
+            <a:spLocks noGrp="1"/>
+          </p:cNvSpPr>
+          <p:nvPr>
+            <p:ph idx="1"/>
+          </p:nvPr>
+        </p:nvSpPr>
+        <p:spPr/>
+        <p:txBody>
+          <a:bodyPr/>
+          <a:lstStyle/>
+          <a:p>
+            <a:endParaRPr lang="es-CO"/>
+          </a:p>
+        </p:txBody>
+      </p:sp>
+    </p:spTree>
+    <p:extLst>
+      <p:ext uri="{BB962C8B-B14F-4D97-AF65-F5344CB8AC3E}">
+        <p14:creationId xmlns:p14="http://schemas.microsoft.com/office/powerpoint/2010/main" val="1250494816"/>
+      </p:ext>
+    </p:extLst>
+  </p:cSld>
+  <p:clrMapOvr>
+    <a:masterClrMapping/>
+  </p:clrMapOvr>
+</p:sld>
+</file>
+
 <file path=ppt/slides/slide5.xml><?xml version="1.0" encoding="utf-8"?>
 <p:sld xmlns:a="http://schemas.openxmlformats.org/drawingml/2006/main" xmlns:r="http://schemas.openxmlformats.org/officeDocument/2006/relationships" xmlns:p="http://schemas.openxmlformats.org/presentationml/2006/main">
   <p:cSld>

</xml_diff>

<commit_message>
Doc: Caso de uso.v10-17/04/2021
Se agrego la corrección del diagrama de caso de uso según las recomendaciones hechas en la exposición del proyecto y de la instructora Tatiana.
</commit_message>
<xml_diff>
--- a/PLANTEAMIENTO_DEL_PROBLEMA.pptx
+++ b/PLANTEAMIENTO_DEL_PROBLEMA.pptx
@@ -1565,7 +1565,7 @@
           <a:p>
             <a:fld id="{D253BB75-C9F5-8342-9D8A-C2F31092015F}" type="datetimeFigureOut">
               <a:rPr lang="es-CO" smtClean="0"/>
-              <a:t>10/03/2021</a:t>
+              <a:t>17/04/2021</a:t>
             </a:fld>
             <a:endParaRPr lang="es-CO"/>
           </a:p>
@@ -3024,7 +3024,7 @@
           <a:p>
             <a:fld id="{D253BB75-C9F5-8342-9D8A-C2F31092015F}" type="datetimeFigureOut">
               <a:rPr lang="es-CO" smtClean="0"/>
-              <a:t>10/03/2021</a:t>
+              <a:t>17/04/2021</a:t>
             </a:fld>
             <a:endParaRPr lang="es-CO"/>
           </a:p>
@@ -4477,7 +4477,7 @@
           <a:p>
             <a:fld id="{D253BB75-C9F5-8342-9D8A-C2F31092015F}" type="datetimeFigureOut">
               <a:rPr lang="es-CO" smtClean="0"/>
-              <a:t>10/03/2021</a:t>
+              <a:t>17/04/2021</a:t>
             </a:fld>
             <a:endParaRPr lang="es-CO"/>
           </a:p>
@@ -5932,7 +5932,7 @@
           <a:p>
             <a:fld id="{D253BB75-C9F5-8342-9D8A-C2F31092015F}" type="datetimeFigureOut">
               <a:rPr lang="es-CO" smtClean="0"/>
-              <a:t>10/03/2021</a:t>
+              <a:t>17/04/2021</a:t>
             </a:fld>
             <a:endParaRPr lang="es-CO"/>
           </a:p>
@@ -7440,7 +7440,7 @@
           <a:p>
             <a:fld id="{D253BB75-C9F5-8342-9D8A-C2F31092015F}" type="datetimeFigureOut">
               <a:rPr lang="es-CO" smtClean="0"/>
-              <a:t>10/03/2021</a:t>
+              <a:t>17/04/2021</a:t>
             </a:fld>
             <a:endParaRPr lang="es-CO"/>
           </a:p>
@@ -8961,7 +8961,7 @@
           <a:p>
             <a:fld id="{D253BB75-C9F5-8342-9D8A-C2F31092015F}" type="datetimeFigureOut">
               <a:rPr lang="es-CO" smtClean="0"/>
-              <a:t>10/03/2021</a:t>
+              <a:t>17/04/2021</a:t>
             </a:fld>
             <a:endParaRPr lang="es-CO"/>
           </a:p>
@@ -10626,7 +10626,7 @@
           <a:p>
             <a:fld id="{D253BB75-C9F5-8342-9D8A-C2F31092015F}" type="datetimeFigureOut">
               <a:rPr lang="es-CO" smtClean="0"/>
-              <a:t>10/03/2021</a:t>
+              <a:t>17/04/2021</a:t>
             </a:fld>
             <a:endParaRPr lang="es-CO"/>
           </a:p>
@@ -12024,7 +12024,7 @@
           <a:p>
             <a:fld id="{D253BB75-C9F5-8342-9D8A-C2F31092015F}" type="datetimeFigureOut">
               <a:rPr lang="es-CO" smtClean="0"/>
-              <a:t>10/03/2021</a:t>
+              <a:t>17/04/2021</a:t>
             </a:fld>
             <a:endParaRPr lang="es-CO"/>
           </a:p>
@@ -12124,7 +12124,7 @@
           <a:p>
             <a:fld id="{D253BB75-C9F5-8342-9D8A-C2F31092015F}" type="datetimeFigureOut">
               <a:rPr lang="es-CO" smtClean="0"/>
-              <a:t>10/03/2021</a:t>
+              <a:t>17/04/2021</a:t>
             </a:fld>
             <a:endParaRPr lang="es-CO"/>
           </a:p>
@@ -13650,7 +13650,7 @@
           <a:p>
             <a:fld id="{D253BB75-C9F5-8342-9D8A-C2F31092015F}" type="datetimeFigureOut">
               <a:rPr lang="es-CO" smtClean="0"/>
-              <a:t>10/03/2021</a:t>
+              <a:t>17/04/2021</a:t>
             </a:fld>
             <a:endParaRPr lang="es-CO"/>
           </a:p>
@@ -15186,7 +15186,7 @@
           <a:p>
             <a:fld id="{D253BB75-C9F5-8342-9D8A-C2F31092015F}" type="datetimeFigureOut">
               <a:rPr lang="es-CO" smtClean="0"/>
-              <a:t>10/03/2021</a:t>
+              <a:t>17/04/2021</a:t>
             </a:fld>
             <a:endParaRPr lang="es-CO"/>
           </a:p>
@@ -15409,7 +15409,7 @@
           <a:p>
             <a:fld id="{D253BB75-C9F5-8342-9D8A-C2F31092015F}" type="datetimeFigureOut">
               <a:rPr lang="es-CO" smtClean="0"/>
-              <a:t>10/03/2021</a:t>
+              <a:t>17/04/2021</a:t>
             </a:fld>
             <a:endParaRPr lang="es-CO"/>
           </a:p>
@@ -17688,30 +17688,28 @@
       </p:grpSpPr>
       <p:pic>
         <p:nvPicPr>
-          <p:cNvPr id="4" name="Marcador de contenido 4">
-            <a:extLst>
-              <a:ext uri="{FF2B5EF4-FFF2-40B4-BE49-F238E27FC236}">
-                <a16:creationId xmlns:a16="http://schemas.microsoft.com/office/drawing/2014/main" id="{ADAC90ED-B707-6643-BB7E-6710D8A59D06}"/>
-              </a:ext>
-            </a:extLst>
-          </p:cNvPr>
+          <p:cNvPr id="8" name="Imagen 7"/>
           <p:cNvPicPr>
-            <a:picLocks noGrp="1" noChangeAspect="1"/>
+            <a:picLocks noChangeAspect="1"/>
           </p:cNvPicPr>
-          <p:nvPr>
-            <p:ph idx="1"/>
-          </p:nvPr>
+          <p:nvPr/>
         </p:nvPicPr>
         <p:blipFill>
-          <a:blip r:embed="rId2"/>
+          <a:blip r:embed="rId2">
+            <a:extLst>
+              <a:ext uri="{28A0092B-C50C-407E-A947-70E740481C1C}">
+                <a14:useLocalDpi xmlns:a14="http://schemas.microsoft.com/office/drawing/2010/main" val="0"/>
+              </a:ext>
+            </a:extLst>
+          </a:blip>
           <a:stretch>
             <a:fillRect/>
           </a:stretch>
         </p:blipFill>
         <p:spPr>
           <a:xfrm>
-            <a:off x="0" y="1"/>
-            <a:ext cx="12192000" cy="6826178"/>
+            <a:off x="805728" y="0"/>
+            <a:ext cx="9610725" cy="6838950"/>
           </a:xfrm>
           <a:prstGeom prst="rect">
             <a:avLst/>
@@ -17720,20 +17718,14 @@
       </p:pic>
       <p:sp>
         <p:nvSpPr>
-          <p:cNvPr id="5" name="CuadroTexto 4">
-            <a:extLst>
-              <a:ext uri="{FF2B5EF4-FFF2-40B4-BE49-F238E27FC236}">
-                <a16:creationId xmlns:a16="http://schemas.microsoft.com/office/drawing/2014/main" id="{D6FFAA52-70A7-C944-B0AF-9A36AF74E521}"/>
-              </a:ext>
-            </a:extLst>
-          </p:cNvPr>
+          <p:cNvPr id="9" name="CuadroTexto 8"/>
           <p:cNvSpPr txBox="1"/>
           <p:nvPr/>
         </p:nvSpPr>
         <p:spPr>
           <a:xfrm>
-            <a:off x="8223539" y="6549180"/>
-            <a:ext cx="4600575" cy="276999"/>
+            <a:off x="7730836" y="6580769"/>
+            <a:ext cx="3200400" cy="276999"/>
           </a:xfrm>
           <a:prstGeom prst="rect">
             <a:avLst/>
@@ -17747,9 +17739,30 @@
           <a:lstStyle/>
           <a:p>
             <a:r>
-              <a:rPr lang="es-CO" sz="1200" dirty="0"/>
-              <a:t>Fuente: Construcción propia en Lucidchart</a:t>
+              <a:rPr lang="es-CO" sz="1200" dirty="0">
+                <a:latin typeface="Times New Roman" panose="02020603050405020304" pitchFamily="18" charset="0"/>
+                <a:cs typeface="Times New Roman" panose="02020603050405020304" pitchFamily="18" charset="0"/>
+              </a:rPr>
+              <a:t>Fuente: Construcción propia </a:t>
             </a:r>
+            <a:r>
+              <a:rPr lang="es-CO" sz="1200" dirty="0" smtClean="0">
+                <a:latin typeface="Times New Roman" panose="02020603050405020304" pitchFamily="18" charset="0"/>
+                <a:cs typeface="Times New Roman" panose="02020603050405020304" pitchFamily="18" charset="0"/>
+              </a:rPr>
+              <a:t>en Visual </a:t>
+            </a:r>
+            <a:r>
+              <a:rPr lang="es-CO" sz="1200" dirty="0" err="1" smtClean="0">
+                <a:latin typeface="Times New Roman" panose="02020603050405020304" pitchFamily="18" charset="0"/>
+                <a:cs typeface="Times New Roman" panose="02020603050405020304" pitchFamily="18" charset="0"/>
+              </a:rPr>
+              <a:t>Paradigm</a:t>
+            </a:r>
+            <a:endParaRPr lang="es-CO" sz="1200" dirty="0">
+              <a:latin typeface="Times New Roman" panose="02020603050405020304" pitchFamily="18" charset="0"/>
+              <a:cs typeface="Times New Roman" panose="02020603050405020304" pitchFamily="18" charset="0"/>
+            </a:endParaRPr>
           </a:p>
         </p:txBody>
       </p:sp>
@@ -19537,7 +19550,6 @@
               <a:rPr lang="es-CO" dirty="0"/>
               <a:t>, 2005).</a:t>
             </a:r>
-            <a:endParaRPr lang="es-CO" dirty="0"/>
           </a:p>
         </p:txBody>
       </p:sp>

</xml_diff>

<commit_message>
Doc: Caso de Uso.v12-17/04/2021
Se le agregaron casos de inclusión al diagrama de Casos de Uso
</commit_message>
<xml_diff>
--- a/PLANTEAMIENTO_DEL_PROBLEMA.pptx
+++ b/PLANTEAMIENTO_DEL_PROBLEMA.pptx
@@ -1584,7 +1584,7 @@
           <a:p>
             <a:fld id="{D253BB75-C9F5-8342-9D8A-C2F31092015F}" type="datetimeFigureOut">
               <a:rPr lang="es-CO" smtClean="0"/>
-              <a:t>17/04/21</a:t>
+              <a:t>17/04/2021</a:t>
             </a:fld>
             <a:endParaRPr lang="es-CO"/>
           </a:p>
@@ -3043,7 +3043,7 @@
           <a:p>
             <a:fld id="{D253BB75-C9F5-8342-9D8A-C2F31092015F}" type="datetimeFigureOut">
               <a:rPr lang="es-CO" smtClean="0"/>
-              <a:t>17/04/21</a:t>
+              <a:t>17/04/2021</a:t>
             </a:fld>
             <a:endParaRPr lang="es-CO"/>
           </a:p>
@@ -4496,7 +4496,7 @@
           <a:p>
             <a:fld id="{D253BB75-C9F5-8342-9D8A-C2F31092015F}" type="datetimeFigureOut">
               <a:rPr lang="es-CO" smtClean="0"/>
-              <a:t>17/04/21</a:t>
+              <a:t>17/04/2021</a:t>
             </a:fld>
             <a:endParaRPr lang="es-CO"/>
           </a:p>
@@ -5951,7 +5951,7 @@
           <a:p>
             <a:fld id="{D253BB75-C9F5-8342-9D8A-C2F31092015F}" type="datetimeFigureOut">
               <a:rPr lang="es-CO" smtClean="0"/>
-              <a:t>17/04/21</a:t>
+              <a:t>17/04/2021</a:t>
             </a:fld>
             <a:endParaRPr lang="es-CO"/>
           </a:p>
@@ -7459,7 +7459,7 @@
           <a:p>
             <a:fld id="{D253BB75-C9F5-8342-9D8A-C2F31092015F}" type="datetimeFigureOut">
               <a:rPr lang="es-CO" smtClean="0"/>
-              <a:t>17/04/21</a:t>
+              <a:t>17/04/2021</a:t>
             </a:fld>
             <a:endParaRPr lang="es-CO"/>
           </a:p>
@@ -8980,7 +8980,7 @@
           <a:p>
             <a:fld id="{D253BB75-C9F5-8342-9D8A-C2F31092015F}" type="datetimeFigureOut">
               <a:rPr lang="es-CO" smtClean="0"/>
-              <a:t>17/04/21</a:t>
+              <a:t>17/04/2021</a:t>
             </a:fld>
             <a:endParaRPr lang="es-CO"/>
           </a:p>
@@ -10645,7 +10645,7 @@
           <a:p>
             <a:fld id="{D253BB75-C9F5-8342-9D8A-C2F31092015F}" type="datetimeFigureOut">
               <a:rPr lang="es-CO" smtClean="0"/>
-              <a:t>17/04/21</a:t>
+              <a:t>17/04/2021</a:t>
             </a:fld>
             <a:endParaRPr lang="es-CO"/>
           </a:p>
@@ -12043,7 +12043,7 @@
           <a:p>
             <a:fld id="{D253BB75-C9F5-8342-9D8A-C2F31092015F}" type="datetimeFigureOut">
               <a:rPr lang="es-CO" smtClean="0"/>
-              <a:t>17/04/21</a:t>
+              <a:t>17/04/2021</a:t>
             </a:fld>
             <a:endParaRPr lang="es-CO"/>
           </a:p>
@@ -12143,7 +12143,7 @@
           <a:p>
             <a:fld id="{D253BB75-C9F5-8342-9D8A-C2F31092015F}" type="datetimeFigureOut">
               <a:rPr lang="es-CO" smtClean="0"/>
-              <a:t>17/04/21</a:t>
+              <a:t>17/04/2021</a:t>
             </a:fld>
             <a:endParaRPr lang="es-CO"/>
           </a:p>
@@ -13669,7 +13669,7 @@
           <a:p>
             <a:fld id="{D253BB75-C9F5-8342-9D8A-C2F31092015F}" type="datetimeFigureOut">
               <a:rPr lang="es-CO" smtClean="0"/>
-              <a:t>17/04/21</a:t>
+              <a:t>17/04/2021</a:t>
             </a:fld>
             <a:endParaRPr lang="es-CO"/>
           </a:p>
@@ -15205,7 +15205,7 @@
           <a:p>
             <a:fld id="{D253BB75-C9F5-8342-9D8A-C2F31092015F}" type="datetimeFigureOut">
               <a:rPr lang="es-CO" smtClean="0"/>
-              <a:t>17/04/21</a:t>
+              <a:t>17/04/2021</a:t>
             </a:fld>
             <a:endParaRPr lang="es-CO"/>
           </a:p>
@@ -15428,7 +15428,7 @@
           <a:p>
             <a:fld id="{D253BB75-C9F5-8342-9D8A-C2F31092015F}" type="datetimeFigureOut">
               <a:rPr lang="es-CO" smtClean="0"/>
-              <a:t>17/04/21</a:t>
+              <a:t>17/04/2021</a:t>
             </a:fld>
             <a:endParaRPr lang="es-CO"/>
           </a:p>
@@ -17707,7 +17707,7 @@
       </p:grpSpPr>
       <p:pic>
         <p:nvPicPr>
-          <p:cNvPr id="8" name="Imagen 7"/>
+          <p:cNvPr id="2" name="Imagen 1"/>
           <p:cNvPicPr>
             <a:picLocks noChangeAspect="1"/>
           </p:cNvPicPr>
@@ -17727,8 +17727,8 @@
         </p:blipFill>
         <p:spPr>
           <a:xfrm>
-            <a:off x="805728" y="0"/>
-            <a:ext cx="9610725" cy="6838950"/>
+            <a:off x="803564" y="0"/>
+            <a:ext cx="10634807" cy="6848243"/>
           </a:xfrm>
           <a:prstGeom prst="rect">
             <a:avLst/>
@@ -17737,13 +17737,13 @@
       </p:pic>
       <p:sp>
         <p:nvSpPr>
-          <p:cNvPr id="9" name="CuadroTexto 8"/>
+          <p:cNvPr id="6" name="CuadroTexto 5"/>
           <p:cNvSpPr txBox="1"/>
           <p:nvPr/>
         </p:nvSpPr>
         <p:spPr>
           <a:xfrm>
-            <a:off x="7730836" y="6580769"/>
+            <a:off x="8104909" y="6581001"/>
             <a:ext cx="3200400" cy="276999"/>
           </a:xfrm>
           <a:prstGeom prst="rect">

</xml_diff>

<commit_message>
Doc: Archivos de imagen.v13-18/04/2021
Se agrego la corrección del diagrama BPMN y se enumeraron los casos de uso del diagrama. También se agrego una carpeta con archivos png de cada uno de  los diagramas
</commit_message>
<xml_diff>
--- a/PLANTEAMIENTO_DEL_PROBLEMA.pptx
+++ b/PLANTEAMIENTO_DEL_PROBLEMA.pptx
@@ -31,44 +31,45 @@
     <p:sldId id="280" r:id="rId25"/>
     <p:sldId id="281" r:id="rId26"/>
     <p:sldId id="282" r:id="rId27"/>
-    <p:sldId id="290" r:id="rId28"/>
-    <p:sldId id="283" r:id="rId29"/>
-    <p:sldId id="284" r:id="rId30"/>
-    <p:sldId id="285" r:id="rId31"/>
-    <p:sldId id="322" r:id="rId32"/>
-    <p:sldId id="327" r:id="rId33"/>
-    <p:sldId id="311" r:id="rId34"/>
-    <p:sldId id="328" r:id="rId35"/>
-    <p:sldId id="329" r:id="rId36"/>
-    <p:sldId id="330" r:id="rId37"/>
-    <p:sldId id="325" r:id="rId38"/>
-    <p:sldId id="333" r:id="rId39"/>
-    <p:sldId id="334" r:id="rId40"/>
-    <p:sldId id="335" r:id="rId41"/>
-    <p:sldId id="336" r:id="rId42"/>
-    <p:sldId id="331" r:id="rId43"/>
-    <p:sldId id="332" r:id="rId44"/>
-    <p:sldId id="337" r:id="rId45"/>
-    <p:sldId id="338" r:id="rId46"/>
-    <p:sldId id="293" r:id="rId47"/>
-    <p:sldId id="296" r:id="rId48"/>
-    <p:sldId id="339" r:id="rId49"/>
-    <p:sldId id="340" r:id="rId50"/>
-    <p:sldId id="341" r:id="rId51"/>
-    <p:sldId id="297" r:id="rId52"/>
-    <p:sldId id="299" r:id="rId53"/>
-    <p:sldId id="300" r:id="rId54"/>
-    <p:sldId id="298" r:id="rId55"/>
-    <p:sldId id="342" r:id="rId56"/>
-    <p:sldId id="343" r:id="rId57"/>
-    <p:sldId id="344" r:id="rId58"/>
-    <p:sldId id="304" r:id="rId59"/>
-    <p:sldId id="307" r:id="rId60"/>
-    <p:sldId id="308" r:id="rId61"/>
-    <p:sldId id="309" r:id="rId62"/>
-    <p:sldId id="302" r:id="rId63"/>
-    <p:sldId id="301" r:id="rId64"/>
-    <p:sldId id="303" r:id="rId65"/>
+    <p:sldId id="345" r:id="rId28"/>
+    <p:sldId id="290" r:id="rId29"/>
+    <p:sldId id="283" r:id="rId30"/>
+    <p:sldId id="284" r:id="rId31"/>
+    <p:sldId id="285" r:id="rId32"/>
+    <p:sldId id="322" r:id="rId33"/>
+    <p:sldId id="327" r:id="rId34"/>
+    <p:sldId id="311" r:id="rId35"/>
+    <p:sldId id="328" r:id="rId36"/>
+    <p:sldId id="329" r:id="rId37"/>
+    <p:sldId id="330" r:id="rId38"/>
+    <p:sldId id="325" r:id="rId39"/>
+    <p:sldId id="333" r:id="rId40"/>
+    <p:sldId id="334" r:id="rId41"/>
+    <p:sldId id="335" r:id="rId42"/>
+    <p:sldId id="336" r:id="rId43"/>
+    <p:sldId id="331" r:id="rId44"/>
+    <p:sldId id="332" r:id="rId45"/>
+    <p:sldId id="337" r:id="rId46"/>
+    <p:sldId id="338" r:id="rId47"/>
+    <p:sldId id="293" r:id="rId48"/>
+    <p:sldId id="296" r:id="rId49"/>
+    <p:sldId id="339" r:id="rId50"/>
+    <p:sldId id="340" r:id="rId51"/>
+    <p:sldId id="341" r:id="rId52"/>
+    <p:sldId id="297" r:id="rId53"/>
+    <p:sldId id="299" r:id="rId54"/>
+    <p:sldId id="300" r:id="rId55"/>
+    <p:sldId id="298" r:id="rId56"/>
+    <p:sldId id="342" r:id="rId57"/>
+    <p:sldId id="343" r:id="rId58"/>
+    <p:sldId id="344" r:id="rId59"/>
+    <p:sldId id="304" r:id="rId60"/>
+    <p:sldId id="307" r:id="rId61"/>
+    <p:sldId id="308" r:id="rId62"/>
+    <p:sldId id="309" r:id="rId63"/>
+    <p:sldId id="302" r:id="rId64"/>
+    <p:sldId id="301" r:id="rId65"/>
+    <p:sldId id="303" r:id="rId66"/>
   </p:sldIdLst>
   <p:sldSz cx="12192000" cy="6858000"/>
   <p:notesSz cx="6858000" cy="9144000"/>
@@ -1584,7 +1585,7 @@
           <a:p>
             <a:fld id="{D253BB75-C9F5-8342-9D8A-C2F31092015F}" type="datetimeFigureOut">
               <a:rPr lang="es-CO" smtClean="0"/>
-              <a:t>17/04/2021</a:t>
+              <a:t>18/04/2021</a:t>
             </a:fld>
             <a:endParaRPr lang="es-CO"/>
           </a:p>
@@ -3043,7 +3044,7 @@
           <a:p>
             <a:fld id="{D253BB75-C9F5-8342-9D8A-C2F31092015F}" type="datetimeFigureOut">
               <a:rPr lang="es-CO" smtClean="0"/>
-              <a:t>17/04/2021</a:t>
+              <a:t>18/04/2021</a:t>
             </a:fld>
             <a:endParaRPr lang="es-CO"/>
           </a:p>
@@ -4496,7 +4497,7 @@
           <a:p>
             <a:fld id="{D253BB75-C9F5-8342-9D8A-C2F31092015F}" type="datetimeFigureOut">
               <a:rPr lang="es-CO" smtClean="0"/>
-              <a:t>17/04/2021</a:t>
+              <a:t>18/04/2021</a:t>
             </a:fld>
             <a:endParaRPr lang="es-CO"/>
           </a:p>
@@ -5951,7 +5952,7 @@
           <a:p>
             <a:fld id="{D253BB75-C9F5-8342-9D8A-C2F31092015F}" type="datetimeFigureOut">
               <a:rPr lang="es-CO" smtClean="0"/>
-              <a:t>17/04/2021</a:t>
+              <a:t>18/04/2021</a:t>
             </a:fld>
             <a:endParaRPr lang="es-CO"/>
           </a:p>
@@ -7459,7 +7460,7 @@
           <a:p>
             <a:fld id="{D253BB75-C9F5-8342-9D8A-C2F31092015F}" type="datetimeFigureOut">
               <a:rPr lang="es-CO" smtClean="0"/>
-              <a:t>17/04/2021</a:t>
+              <a:t>18/04/2021</a:t>
             </a:fld>
             <a:endParaRPr lang="es-CO"/>
           </a:p>
@@ -8980,7 +8981,7 @@
           <a:p>
             <a:fld id="{D253BB75-C9F5-8342-9D8A-C2F31092015F}" type="datetimeFigureOut">
               <a:rPr lang="es-CO" smtClean="0"/>
-              <a:t>17/04/2021</a:t>
+              <a:t>18/04/2021</a:t>
             </a:fld>
             <a:endParaRPr lang="es-CO"/>
           </a:p>
@@ -10645,7 +10646,7 @@
           <a:p>
             <a:fld id="{D253BB75-C9F5-8342-9D8A-C2F31092015F}" type="datetimeFigureOut">
               <a:rPr lang="es-CO" smtClean="0"/>
-              <a:t>17/04/2021</a:t>
+              <a:t>18/04/2021</a:t>
             </a:fld>
             <a:endParaRPr lang="es-CO"/>
           </a:p>
@@ -12043,7 +12044,7 @@
           <a:p>
             <a:fld id="{D253BB75-C9F5-8342-9D8A-C2F31092015F}" type="datetimeFigureOut">
               <a:rPr lang="es-CO" smtClean="0"/>
-              <a:t>17/04/2021</a:t>
+              <a:t>18/04/2021</a:t>
             </a:fld>
             <a:endParaRPr lang="es-CO"/>
           </a:p>
@@ -12143,7 +12144,7 @@
           <a:p>
             <a:fld id="{D253BB75-C9F5-8342-9D8A-C2F31092015F}" type="datetimeFigureOut">
               <a:rPr lang="es-CO" smtClean="0"/>
-              <a:t>17/04/2021</a:t>
+              <a:t>18/04/2021</a:t>
             </a:fld>
             <a:endParaRPr lang="es-CO"/>
           </a:p>
@@ -13669,7 +13670,7 @@
           <a:p>
             <a:fld id="{D253BB75-C9F5-8342-9D8A-C2F31092015F}" type="datetimeFigureOut">
               <a:rPr lang="es-CO" smtClean="0"/>
-              <a:t>17/04/2021</a:t>
+              <a:t>18/04/2021</a:t>
             </a:fld>
             <a:endParaRPr lang="es-CO"/>
           </a:p>
@@ -15205,7 +15206,7 @@
           <a:p>
             <a:fld id="{D253BB75-C9F5-8342-9D8A-C2F31092015F}" type="datetimeFigureOut">
               <a:rPr lang="es-CO" smtClean="0"/>
-              <a:t>17/04/2021</a:t>
+              <a:t>18/04/2021</a:t>
             </a:fld>
             <a:endParaRPr lang="es-CO"/>
           </a:p>
@@ -15428,7 +15429,7 @@
           <a:p>
             <a:fld id="{D253BB75-C9F5-8342-9D8A-C2F31092015F}" type="datetimeFigureOut">
               <a:rPr lang="es-CO" smtClean="0"/>
-              <a:t>17/04/2021</a:t>
+              <a:t>18/04/2021</a:t>
             </a:fld>
             <a:endParaRPr lang="es-CO"/>
           </a:p>
@@ -17436,30 +17437,27 @@
       </p:grpSpPr>
       <p:pic>
         <p:nvPicPr>
-          <p:cNvPr id="4" name="Marcador de contenido 4">
-            <a:extLst>
-              <a:ext uri="{FF2B5EF4-FFF2-40B4-BE49-F238E27FC236}">
-                <a16:creationId xmlns:a16="http://schemas.microsoft.com/office/drawing/2014/main" id="{0705C287-6193-E540-B1C5-BF0EEC65E628}"/>
-              </a:ext>
-            </a:extLst>
-          </p:cNvPr>
+          <p:cNvPr id="3" name="Imagen 2"/>
           <p:cNvPicPr>
-            <a:picLocks noGrp="1" noChangeAspect="1"/>
+            <a:picLocks noChangeAspect="1"/>
           </p:cNvPicPr>
-          <p:nvPr>
-            <p:ph idx="1"/>
-          </p:nvPr>
+          <p:nvPr/>
         </p:nvPicPr>
-        <p:blipFill>
-          <a:blip r:embed="rId2"/>
-          <a:stretch>
-            <a:fillRect/>
-          </a:stretch>
+        <p:blipFill rotWithShape="1">
+          <a:blip r:embed="rId2">
+            <a:extLst>
+              <a:ext uri="{28A0092B-C50C-407E-A947-70E740481C1C}">
+                <a14:useLocalDpi xmlns:a14="http://schemas.microsoft.com/office/drawing/2010/main" val="0"/>
+              </a:ext>
+            </a:extLst>
+          </a:blip>
+          <a:srcRect l="1127" t="-403" b="74545"/>
+          <a:stretch/>
         </p:blipFill>
         <p:spPr>
           <a:xfrm>
-            <a:off x="374073" y="304800"/>
-            <a:ext cx="11507351" cy="6289964"/>
+            <a:off x="0" y="1177637"/>
+            <a:ext cx="11993946" cy="4239490"/>
           </a:xfrm>
           <a:prstGeom prst="rect">
             <a:avLst/>
@@ -17480,6 +17478,65 @@
 </file>
 
 <file path=ppt/slides/slide27.xml><?xml version="1.0" encoding="utf-8"?>
+<p:sld xmlns:a="http://schemas.openxmlformats.org/drawingml/2006/main" xmlns:r="http://schemas.openxmlformats.org/officeDocument/2006/relationships" xmlns:p="http://schemas.openxmlformats.org/presentationml/2006/main">
+  <p:cSld>
+    <p:spTree>
+      <p:nvGrpSpPr>
+        <p:cNvPr id="1" name=""/>
+        <p:cNvGrpSpPr/>
+        <p:nvPr/>
+      </p:nvGrpSpPr>
+      <p:grpSpPr>
+        <a:xfrm>
+          <a:off x="0" y="0"/>
+          <a:ext cx="0" cy="0"/>
+          <a:chOff x="0" y="0"/>
+          <a:chExt cx="0" cy="0"/>
+        </a:xfrm>
+      </p:grpSpPr>
+      <p:pic>
+        <p:nvPicPr>
+          <p:cNvPr id="4" name="Imagen 3"/>
+          <p:cNvPicPr>
+            <a:picLocks noChangeAspect="1"/>
+          </p:cNvPicPr>
+          <p:nvPr/>
+        </p:nvPicPr>
+        <p:blipFill rotWithShape="1">
+          <a:blip r:embed="rId2">
+            <a:extLst>
+              <a:ext uri="{28A0092B-C50C-407E-A947-70E740481C1C}">
+                <a14:useLocalDpi xmlns:a14="http://schemas.microsoft.com/office/drawing/2010/main" val="0"/>
+              </a:ext>
+            </a:extLst>
+          </a:blip>
+          <a:srcRect l="580" t="27273" r="1217" b="3232"/>
+          <a:stretch/>
+        </p:blipFill>
+        <p:spPr>
+          <a:xfrm>
+            <a:off x="1696532" y="0"/>
+            <a:ext cx="7059541" cy="6751964"/>
+          </a:xfrm>
+          <a:prstGeom prst="rect">
+            <a:avLst/>
+          </a:prstGeom>
+        </p:spPr>
+      </p:pic>
+    </p:spTree>
+    <p:extLst>
+      <p:ext uri="{BB962C8B-B14F-4D97-AF65-F5344CB8AC3E}">
+        <p14:creationId xmlns:p14="http://schemas.microsoft.com/office/powerpoint/2010/main" val="668909990"/>
+      </p:ext>
+    </p:extLst>
+  </p:cSld>
+  <p:clrMapOvr>
+    <a:masterClrMapping/>
+  </p:clrMapOvr>
+</p:sld>
+</file>
+
+<file path=ppt/slides/slide28.xml><?xml version="1.0" encoding="utf-8"?>
 <p:sld xmlns:a="http://schemas.openxmlformats.org/drawingml/2006/main" xmlns:r="http://schemas.openxmlformats.org/officeDocument/2006/relationships" xmlns:p="http://schemas.openxmlformats.org/presentationml/2006/main">
   <p:cSld>
     <p:spTree>
@@ -17601,7 +17658,7 @@
 </p:sld>
 </file>
 
-<file path=ppt/slides/slide28.xml><?xml version="1.0" encoding="utf-8"?>
+<file path=ppt/slides/slide29.xml><?xml version="1.0" encoding="utf-8"?>
 <p:sld xmlns:a="http://schemas.openxmlformats.org/drawingml/2006/main" xmlns:r="http://schemas.openxmlformats.org/officeDocument/2006/relationships" xmlns:p="http://schemas.openxmlformats.org/presentationml/2006/main">
   <p:cSld>
     <p:spTree>
@@ -17679,109 +17736,6 @@
     <p:extLst>
       <p:ext uri="{BB962C8B-B14F-4D97-AF65-F5344CB8AC3E}">
         <p14:creationId xmlns:p14="http://schemas.microsoft.com/office/powerpoint/2010/main" val="1547825825"/>
-      </p:ext>
-    </p:extLst>
-  </p:cSld>
-  <p:clrMapOvr>
-    <a:masterClrMapping/>
-  </p:clrMapOvr>
-</p:sld>
-</file>
-
-<file path=ppt/slides/slide29.xml><?xml version="1.0" encoding="utf-8"?>
-<p:sld xmlns:a="http://schemas.openxmlformats.org/drawingml/2006/main" xmlns:r="http://schemas.openxmlformats.org/officeDocument/2006/relationships" xmlns:p="http://schemas.openxmlformats.org/presentationml/2006/main">
-  <p:cSld>
-    <p:spTree>
-      <p:nvGrpSpPr>
-        <p:cNvPr id="1" name=""/>
-        <p:cNvGrpSpPr/>
-        <p:nvPr/>
-      </p:nvGrpSpPr>
-      <p:grpSpPr>
-        <a:xfrm>
-          <a:off x="0" y="0"/>
-          <a:ext cx="0" cy="0"/>
-          <a:chOff x="0" y="0"/>
-          <a:chExt cx="0" cy="0"/>
-        </a:xfrm>
-      </p:grpSpPr>
-      <p:pic>
-        <p:nvPicPr>
-          <p:cNvPr id="2" name="Imagen 1"/>
-          <p:cNvPicPr>
-            <a:picLocks noChangeAspect="1"/>
-          </p:cNvPicPr>
-          <p:nvPr/>
-        </p:nvPicPr>
-        <p:blipFill>
-          <a:blip r:embed="rId2">
-            <a:extLst>
-              <a:ext uri="{28A0092B-C50C-407E-A947-70E740481C1C}">
-                <a14:useLocalDpi xmlns:a14="http://schemas.microsoft.com/office/drawing/2010/main" val="0"/>
-              </a:ext>
-            </a:extLst>
-          </a:blip>
-          <a:stretch>
-            <a:fillRect/>
-          </a:stretch>
-        </p:blipFill>
-        <p:spPr>
-          <a:xfrm>
-            <a:off x="803564" y="0"/>
-            <a:ext cx="10634807" cy="6848243"/>
-          </a:xfrm>
-          <a:prstGeom prst="rect">
-            <a:avLst/>
-          </a:prstGeom>
-        </p:spPr>
-      </p:pic>
-      <p:sp>
-        <p:nvSpPr>
-          <p:cNvPr id="6" name="CuadroTexto 5"/>
-          <p:cNvSpPr txBox="1"/>
-          <p:nvPr/>
-        </p:nvSpPr>
-        <p:spPr>
-          <a:xfrm>
-            <a:off x="8104909" y="6581001"/>
-            <a:ext cx="3200400" cy="276999"/>
-          </a:xfrm>
-          <a:prstGeom prst="rect">
-            <a:avLst/>
-          </a:prstGeom>
-          <a:noFill/>
-        </p:spPr>
-        <p:txBody>
-          <a:bodyPr wrap="square" rtlCol="0">
-            <a:spAutoFit/>
-          </a:bodyPr>
-          <a:lstStyle/>
-          <a:p>
-            <a:r>
-              <a:rPr lang="es-CO" sz="1200" dirty="0">
-                <a:latin typeface="Times New Roman" panose="02020603050405020304" pitchFamily="18" charset="0"/>
-                <a:cs typeface="Times New Roman" panose="02020603050405020304" pitchFamily="18" charset="0"/>
-              </a:rPr>
-              <a:t>Fuente: Construcción propia en Visual </a:t>
-            </a:r>
-            <a:r>
-              <a:rPr lang="es-CO" sz="1200" dirty="0" err="1">
-                <a:latin typeface="Times New Roman" panose="02020603050405020304" pitchFamily="18" charset="0"/>
-                <a:cs typeface="Times New Roman" panose="02020603050405020304" pitchFamily="18" charset="0"/>
-              </a:rPr>
-              <a:t>Paradigm</a:t>
-            </a:r>
-            <a:endParaRPr lang="es-CO" sz="1200" dirty="0">
-              <a:latin typeface="Times New Roman" panose="02020603050405020304" pitchFamily="18" charset="0"/>
-              <a:cs typeface="Times New Roman" panose="02020603050405020304" pitchFamily="18" charset="0"/>
-            </a:endParaRPr>
-          </a:p>
-        </p:txBody>
-      </p:sp>
-    </p:spTree>
-    <p:extLst>
-      <p:ext uri="{BB962C8B-B14F-4D97-AF65-F5344CB8AC3E}">
-        <p14:creationId xmlns:p14="http://schemas.microsoft.com/office/powerpoint/2010/main" val="3397706953"/>
       </p:ext>
     </p:extLst>
   </p:cSld>
@@ -17908,6 +17862,109 @@
       </p:grpSpPr>
       <p:sp>
         <p:nvSpPr>
+          <p:cNvPr id="6" name="CuadroTexto 5"/>
+          <p:cNvSpPr txBox="1"/>
+          <p:nvPr/>
+        </p:nvSpPr>
+        <p:spPr>
+          <a:xfrm>
+            <a:off x="8104909" y="6581001"/>
+            <a:ext cx="3200400" cy="276999"/>
+          </a:xfrm>
+          <a:prstGeom prst="rect">
+            <a:avLst/>
+          </a:prstGeom>
+          <a:noFill/>
+        </p:spPr>
+        <p:txBody>
+          <a:bodyPr wrap="square" rtlCol="0">
+            <a:spAutoFit/>
+          </a:bodyPr>
+          <a:lstStyle/>
+          <a:p>
+            <a:r>
+              <a:rPr lang="es-CO" sz="1200" dirty="0">
+                <a:latin typeface="Times New Roman" panose="02020603050405020304" pitchFamily="18" charset="0"/>
+                <a:cs typeface="Times New Roman" panose="02020603050405020304" pitchFamily="18" charset="0"/>
+              </a:rPr>
+              <a:t>Fuente: Construcción propia en Visual </a:t>
+            </a:r>
+            <a:r>
+              <a:rPr lang="es-CO" sz="1200" dirty="0" err="1">
+                <a:latin typeface="Times New Roman" panose="02020603050405020304" pitchFamily="18" charset="0"/>
+                <a:cs typeface="Times New Roman" panose="02020603050405020304" pitchFamily="18" charset="0"/>
+              </a:rPr>
+              <a:t>Paradigm</a:t>
+            </a:r>
+            <a:endParaRPr lang="es-CO" sz="1200" dirty="0">
+              <a:latin typeface="Times New Roman" panose="02020603050405020304" pitchFamily="18" charset="0"/>
+              <a:cs typeface="Times New Roman" panose="02020603050405020304" pitchFamily="18" charset="0"/>
+            </a:endParaRPr>
+          </a:p>
+        </p:txBody>
+      </p:sp>
+      <p:pic>
+        <p:nvPicPr>
+          <p:cNvPr id="3" name="Imagen 2"/>
+          <p:cNvPicPr>
+            <a:picLocks noChangeAspect="1"/>
+          </p:cNvPicPr>
+          <p:nvPr/>
+        </p:nvPicPr>
+        <p:blipFill>
+          <a:blip r:embed="rId2">
+            <a:extLst>
+              <a:ext uri="{28A0092B-C50C-407E-A947-70E740481C1C}">
+                <a14:useLocalDpi xmlns:a14="http://schemas.microsoft.com/office/drawing/2010/main" val="0"/>
+              </a:ext>
+            </a:extLst>
+          </a:blip>
+          <a:stretch>
+            <a:fillRect/>
+          </a:stretch>
+        </p:blipFill>
+        <p:spPr>
+          <a:xfrm>
+            <a:off x="785812" y="96982"/>
+            <a:ext cx="10219788" cy="6373091"/>
+          </a:xfrm>
+          <a:prstGeom prst="rect">
+            <a:avLst/>
+          </a:prstGeom>
+        </p:spPr>
+      </p:pic>
+    </p:spTree>
+    <p:extLst>
+      <p:ext uri="{BB962C8B-B14F-4D97-AF65-F5344CB8AC3E}">
+        <p14:creationId xmlns:p14="http://schemas.microsoft.com/office/powerpoint/2010/main" val="3397706953"/>
+      </p:ext>
+    </p:extLst>
+  </p:cSld>
+  <p:clrMapOvr>
+    <a:masterClrMapping/>
+  </p:clrMapOvr>
+</p:sld>
+</file>
+
+<file path=ppt/slides/slide31.xml><?xml version="1.0" encoding="utf-8"?>
+<p:sld xmlns:a="http://schemas.openxmlformats.org/drawingml/2006/main" xmlns:r="http://schemas.openxmlformats.org/officeDocument/2006/relationships" xmlns:p="http://schemas.openxmlformats.org/presentationml/2006/main">
+  <p:cSld>
+    <p:spTree>
+      <p:nvGrpSpPr>
+        <p:cNvPr id="1" name=""/>
+        <p:cNvGrpSpPr/>
+        <p:nvPr/>
+      </p:nvGrpSpPr>
+      <p:grpSpPr>
+        <a:xfrm>
+          <a:off x="0" y="0"/>
+          <a:ext cx="0" cy="0"/>
+          <a:chOff x="0" y="0"/>
+          <a:chExt cx="0" cy="0"/>
+        </a:xfrm>
+      </p:grpSpPr>
+      <p:sp>
+        <p:nvSpPr>
           <p:cNvPr id="2" name="Título 1">
             <a:extLst>
               <a:ext uri="{FF2B5EF4-FFF2-40B4-BE49-F238E27FC236}">
@@ -17986,7 +18043,7 @@
 </p:sld>
 </file>
 
-<file path=ppt/slides/slide31.xml><?xml version="1.0" encoding="utf-8"?>
+<file path=ppt/slides/slide32.xml><?xml version="1.0" encoding="utf-8"?>
 <p:sld xmlns:a="http://schemas.openxmlformats.org/drawingml/2006/main" xmlns:r="http://schemas.openxmlformats.org/officeDocument/2006/relationships" xmlns:p="http://schemas.openxmlformats.org/presentationml/2006/main">
   <p:cSld>
     <p:spTree>
@@ -18324,7 +18381,7 @@
 </p:sld>
 </file>
 
-<file path=ppt/slides/slide32.xml><?xml version="1.0" encoding="utf-8"?>
+<file path=ppt/slides/slide33.xml><?xml version="1.0" encoding="utf-8"?>
 <p:sld xmlns:a="http://schemas.openxmlformats.org/drawingml/2006/main" xmlns:r="http://schemas.openxmlformats.org/officeDocument/2006/relationships" xmlns:p="http://schemas.openxmlformats.org/presentationml/2006/main">
   <p:cSld>
     <p:spTree>
@@ -18662,7 +18719,7 @@
 </p:sld>
 </file>
 
-<file path=ppt/slides/slide33.xml><?xml version="1.0" encoding="utf-8"?>
+<file path=ppt/slides/slide34.xml><?xml version="1.0" encoding="utf-8"?>
 <p:sld xmlns:a="http://schemas.openxmlformats.org/drawingml/2006/main" xmlns:r="http://schemas.openxmlformats.org/officeDocument/2006/relationships" xmlns:p="http://schemas.openxmlformats.org/presentationml/2006/main">
   <p:cSld>
     <p:spTree>
@@ -19012,7 +19069,7 @@
 </p:sld>
 </file>
 
-<file path=ppt/slides/slide34.xml><?xml version="1.0" encoding="utf-8"?>
+<file path=ppt/slides/slide35.xml><?xml version="1.0" encoding="utf-8"?>
 <p:sld xmlns:a="http://schemas.openxmlformats.org/drawingml/2006/main" xmlns:r="http://schemas.openxmlformats.org/officeDocument/2006/relationships" xmlns:p="http://schemas.openxmlformats.org/presentationml/2006/main">
   <p:cSld>
     <p:spTree>
@@ -19350,7 +19407,7 @@
 </p:sld>
 </file>
 
-<file path=ppt/slides/slide35.xml><?xml version="1.0" encoding="utf-8"?>
+<file path=ppt/slides/slide36.xml><?xml version="1.0" encoding="utf-8"?>
 <p:sld xmlns:a="http://schemas.openxmlformats.org/drawingml/2006/main" xmlns:r="http://schemas.openxmlformats.org/officeDocument/2006/relationships" xmlns:p="http://schemas.openxmlformats.org/presentationml/2006/main">
   <p:cSld>
     <p:spTree>
@@ -19700,7 +19757,7 @@
 </p:sld>
 </file>
 
-<file path=ppt/slides/slide36.xml><?xml version="1.0" encoding="utf-8"?>
+<file path=ppt/slides/slide37.xml><?xml version="1.0" encoding="utf-8"?>
 <p:sld xmlns:a="http://schemas.openxmlformats.org/drawingml/2006/main" xmlns:r="http://schemas.openxmlformats.org/officeDocument/2006/relationships" xmlns:p="http://schemas.openxmlformats.org/presentationml/2006/main">
   <p:cSld>
     <p:spTree>
@@ -20070,7 +20127,7 @@
 </p:sld>
 </file>
 
-<file path=ppt/slides/slide37.xml><?xml version="1.0" encoding="utf-8"?>
+<file path=ppt/slides/slide38.xml><?xml version="1.0" encoding="utf-8"?>
 <p:sld xmlns:a="http://schemas.openxmlformats.org/drawingml/2006/main" xmlns:r="http://schemas.openxmlformats.org/officeDocument/2006/relationships" xmlns:p="http://schemas.openxmlformats.org/presentationml/2006/main">
   <p:cSld>
     <p:spTree>
@@ -20440,7 +20497,7 @@
 </p:sld>
 </file>
 
-<file path=ppt/slides/slide38.xml><?xml version="1.0" encoding="utf-8"?>
+<file path=ppt/slides/slide39.xml><?xml version="1.0" encoding="utf-8"?>
 <p:sld xmlns:a="http://schemas.openxmlformats.org/drawingml/2006/main" xmlns:r="http://schemas.openxmlformats.org/officeDocument/2006/relationships" xmlns:p="http://schemas.openxmlformats.org/presentationml/2006/main">
   <p:cSld>
     <p:spTree>
@@ -20801,376 +20858,6 @@
     <p:extLst>
       <p:ext uri="{BB962C8B-B14F-4D97-AF65-F5344CB8AC3E}">
         <p14:creationId xmlns:p14="http://schemas.microsoft.com/office/powerpoint/2010/main" val="2645603914"/>
-      </p:ext>
-    </p:extLst>
-  </p:cSld>
-  <p:clrMapOvr>
-    <a:masterClrMapping/>
-  </p:clrMapOvr>
-</p:sld>
-</file>
-
-<file path=ppt/slides/slide39.xml><?xml version="1.0" encoding="utf-8"?>
-<p:sld xmlns:a="http://schemas.openxmlformats.org/drawingml/2006/main" xmlns:r="http://schemas.openxmlformats.org/officeDocument/2006/relationships" xmlns:p="http://schemas.openxmlformats.org/presentationml/2006/main">
-  <p:cSld>
-    <p:spTree>
-      <p:nvGrpSpPr>
-        <p:cNvPr id="1" name=""/>
-        <p:cNvGrpSpPr/>
-        <p:nvPr/>
-      </p:nvGrpSpPr>
-      <p:grpSpPr>
-        <a:xfrm>
-          <a:off x="0" y="0"/>
-          <a:ext cx="0" cy="0"/>
-          <a:chOff x="0" y="0"/>
-          <a:chExt cx="0" cy="0"/>
-        </a:xfrm>
-      </p:grpSpPr>
-      <p:sp>
-        <p:nvSpPr>
-          <p:cNvPr id="2" name="Título 1">
-            <a:extLst>
-              <a:ext uri="{FF2B5EF4-FFF2-40B4-BE49-F238E27FC236}">
-                <a16:creationId xmlns:a16="http://schemas.microsoft.com/office/drawing/2014/main" id="{A544CF25-2F8F-BC45-9D5E-B7214CD84D05}"/>
-              </a:ext>
-            </a:extLst>
-          </p:cNvPr>
-          <p:cNvSpPr>
-            <a:spLocks noGrp="1"/>
-          </p:cNvSpPr>
-          <p:nvPr>
-            <p:ph type="title"/>
-          </p:nvPr>
-        </p:nvSpPr>
-        <p:spPr/>
-        <p:txBody>
-          <a:bodyPr/>
-          <a:lstStyle/>
-          <a:p>
-            <a:r>
-              <a:rPr lang="es-CO" dirty="0"/>
-              <a:t>Requerimientos funcionales</a:t>
-            </a:r>
-          </a:p>
-        </p:txBody>
-      </p:sp>
-      <p:graphicFrame>
-        <p:nvGraphicFramePr>
-          <p:cNvPr id="4" name="Tabla 4">
-            <a:extLst>
-              <a:ext uri="{FF2B5EF4-FFF2-40B4-BE49-F238E27FC236}">
-                <a16:creationId xmlns:a16="http://schemas.microsoft.com/office/drawing/2014/main" id="{104B1BC5-C194-6A4D-BF36-86B68BC29C6E}"/>
-              </a:ext>
-            </a:extLst>
-          </p:cNvPr>
-          <p:cNvGraphicFramePr>
-            <a:graphicFrameLocks noGrp="1"/>
-          </p:cNvGraphicFramePr>
-          <p:nvPr>
-            <p:ph idx="1"/>
-          </p:nvPr>
-        </p:nvGraphicFramePr>
-        <p:xfrm>
-          <a:off x="5118100" y="803275"/>
-          <a:ext cx="6281738" cy="5227320"/>
-        </p:xfrm>
-        <a:graphic>
-          <a:graphicData uri="http://schemas.openxmlformats.org/drawingml/2006/table">
-            <a:tbl>
-              <a:tblPr firstRow="1" bandRow="1">
-                <a:tableStyleId>{5C22544A-7EE6-4342-B048-85BDC9FD1C3A}</a:tableStyleId>
-              </a:tblPr>
-              <a:tblGrid>
-                <a:gridCol w="3140869">
-                  <a:extLst>
-                    <a:ext uri="{9D8B030D-6E8A-4147-A177-3AD203B41FA5}">
-                      <a16:colId xmlns:a16="http://schemas.microsoft.com/office/drawing/2014/main" val="1589146686"/>
-                    </a:ext>
-                  </a:extLst>
-                </a:gridCol>
-                <a:gridCol w="3140869">
-                  <a:extLst>
-                    <a:ext uri="{9D8B030D-6E8A-4147-A177-3AD203B41FA5}">
-                      <a16:colId xmlns:a16="http://schemas.microsoft.com/office/drawing/2014/main" val="1463651238"/>
-                    </a:ext>
-                  </a:extLst>
-                </a:gridCol>
-              </a:tblGrid>
-              <a:tr h="370840">
-                <a:tc>
-                  <a:txBody>
-                    <a:bodyPr/>
-                    <a:lstStyle/>
-                    <a:p>
-                      <a:r>
-                        <a:rPr lang="es-CO" sz="1400" dirty="0"/>
-                        <a:t>Identificación del requerimiento</a:t>
-                      </a:r>
-                    </a:p>
-                  </a:txBody>
-                  <a:tcPr/>
-                </a:tc>
-                <a:tc>
-                  <a:txBody>
-                    <a:bodyPr/>
-                    <a:lstStyle/>
-                    <a:p>
-                      <a:r>
-                        <a:rPr lang="es-CO" sz="1400" dirty="0"/>
-                        <a:t>RF09</a:t>
-                      </a:r>
-                    </a:p>
-                  </a:txBody>
-                  <a:tcPr/>
-                </a:tc>
-                <a:extLst>
-                  <a:ext uri="{0D108BD9-81ED-4DB2-BD59-A6C34878D82A}">
-                    <a16:rowId xmlns:a16="http://schemas.microsoft.com/office/drawing/2014/main" val="3568786682"/>
-                  </a:ext>
-                </a:extLst>
-              </a:tr>
-              <a:tr h="370840">
-                <a:tc>
-                  <a:txBody>
-                    <a:bodyPr/>
-                    <a:lstStyle/>
-                    <a:p>
-                      <a:r>
-                        <a:rPr lang="es-CO" sz="1400" dirty="0"/>
-                        <a:t>Nombre del requerimiento</a:t>
-                      </a:r>
-                    </a:p>
-                  </a:txBody>
-                  <a:tcPr/>
-                </a:tc>
-                <a:tc>
-                  <a:txBody>
-                    <a:bodyPr/>
-                    <a:lstStyle/>
-                    <a:p>
-                      <a:r>
-                        <a:rPr lang="es-CO" sz="1400" dirty="0"/>
-                        <a:t>Consultar notas</a:t>
-                      </a:r>
-                    </a:p>
-                  </a:txBody>
-                  <a:tcPr/>
-                </a:tc>
-                <a:extLst>
-                  <a:ext uri="{0D108BD9-81ED-4DB2-BD59-A6C34878D82A}">
-                    <a16:rowId xmlns:a16="http://schemas.microsoft.com/office/drawing/2014/main" val="2616514354"/>
-                  </a:ext>
-                </a:extLst>
-              </a:tr>
-              <a:tr h="370840">
-                <a:tc>
-                  <a:txBody>
-                    <a:bodyPr/>
-                    <a:lstStyle/>
-                    <a:p>
-                      <a:r>
-                        <a:rPr lang="es-CO" sz="1400" dirty="0"/>
-                        <a:t>Características</a:t>
-                      </a:r>
-                    </a:p>
-                  </a:txBody>
-                  <a:tcPr/>
-                </a:tc>
-                <a:tc>
-                  <a:txBody>
-                    <a:bodyPr/>
-                    <a:lstStyle/>
-                    <a:p>
-                      <a:r>
-                        <a:rPr lang="es-CO" sz="1400" dirty="0"/>
-                        <a:t>El usuario estudiante podrá consultar su boletín de calificaciones y sus estadísticas de rendimiento</a:t>
-                      </a:r>
-                    </a:p>
-                  </a:txBody>
-                  <a:tcPr/>
-                </a:tc>
-                <a:extLst>
-                  <a:ext uri="{0D108BD9-81ED-4DB2-BD59-A6C34878D82A}">
-                    <a16:rowId xmlns:a16="http://schemas.microsoft.com/office/drawing/2014/main" val="1942680024"/>
-                  </a:ext>
-                </a:extLst>
-              </a:tr>
-              <a:tr h="370840">
-                <a:tc>
-                  <a:txBody>
-                    <a:bodyPr/>
-                    <a:lstStyle/>
-                    <a:p>
-                      <a:r>
-                        <a:rPr lang="es-CO" sz="1400" dirty="0"/>
-                        <a:t>Descripción del requerimiento</a:t>
-                      </a:r>
-                    </a:p>
-                  </a:txBody>
-                  <a:tcPr/>
-                </a:tc>
-                <a:tc>
-                  <a:txBody>
-                    <a:bodyPr/>
-                    <a:lstStyle/>
-                    <a:p>
-                      <a:pPr marL="0" marR="0" lvl="0" indent="0" algn="l" defTabSz="914400" rtl="0" eaLnBrk="1" fontAlgn="auto" latinLnBrk="0" hangingPunct="1">
-                        <a:lnSpc>
-                          <a:spcPct val="100000"/>
-                        </a:lnSpc>
-                        <a:spcBef>
-                          <a:spcPts val="0"/>
-                        </a:spcBef>
-                        <a:spcAft>
-                          <a:spcPts val="0"/>
-                        </a:spcAft>
-                        <a:buClrTx/>
-                        <a:buSzTx/>
-                        <a:buFontTx/>
-                        <a:buNone/>
-                        <a:tabLst/>
-                        <a:defRPr/>
-                      </a:pPr>
-                      <a:r>
-                        <a:rPr lang="es-CO" sz="1400" dirty="0"/>
-                        <a:t>El sistema permite al usuario estudiante la consulta de su boletín bimestral y sus estadísticas de rendimiento.</a:t>
-                      </a:r>
-                    </a:p>
-                    <a:p>
-                      <a:endParaRPr lang="es-CO" sz="1400" dirty="0"/>
-                    </a:p>
-                  </a:txBody>
-                  <a:tcPr/>
-                </a:tc>
-                <a:extLst>
-                  <a:ext uri="{0D108BD9-81ED-4DB2-BD59-A6C34878D82A}">
-                    <a16:rowId xmlns:a16="http://schemas.microsoft.com/office/drawing/2014/main" val="2968710298"/>
-                  </a:ext>
-                </a:extLst>
-              </a:tr>
-              <a:tr h="370840">
-                <a:tc>
-                  <a:txBody>
-                    <a:bodyPr/>
-                    <a:lstStyle/>
-                    <a:p>
-                      <a:r>
-                        <a:rPr lang="es-CO" sz="1400" dirty="0"/>
-                        <a:t>Requerimientos no funcionales</a:t>
-                      </a:r>
-                    </a:p>
-                  </a:txBody>
-                  <a:tcPr/>
-                </a:tc>
-                <a:tc>
-                  <a:txBody>
-                    <a:bodyPr/>
-                    <a:lstStyle/>
-                    <a:p>
-                      <a:r>
-                        <a:rPr lang="es-CO" sz="1400" dirty="0"/>
-                        <a:t>RNF01</a:t>
-                      </a:r>
-                    </a:p>
-                    <a:p>
-                      <a:r>
-                        <a:rPr lang="es-CO" sz="1400" dirty="0"/>
-                        <a:t>RNF08</a:t>
-                      </a:r>
-                    </a:p>
-                    <a:p>
-                      <a:r>
-                        <a:rPr lang="es-CO" sz="1400" dirty="0"/>
-                        <a:t>RNF09</a:t>
-                      </a:r>
-                    </a:p>
-                    <a:p>
-                      <a:r>
-                        <a:rPr lang="es-CO" sz="1400" dirty="0"/>
-                        <a:t>RNF10</a:t>
-                      </a:r>
-                    </a:p>
-                    <a:p>
-                      <a:r>
-                        <a:rPr lang="es-CO" sz="1400" dirty="0"/>
-                        <a:t>RNF11</a:t>
-                      </a:r>
-                    </a:p>
-                    <a:p>
-                      <a:r>
-                        <a:rPr lang="es-CO" sz="1400" dirty="0"/>
-                        <a:t>RNF13</a:t>
-                      </a:r>
-                    </a:p>
-                    <a:p>
-                      <a:r>
-                        <a:rPr lang="es-CO" sz="1400" dirty="0"/>
-                        <a:t>RNF14</a:t>
-                      </a:r>
-                    </a:p>
-                    <a:p>
-                      <a:r>
-                        <a:rPr lang="es-CO" sz="1400" dirty="0"/>
-                        <a:t>RNF15</a:t>
-                      </a:r>
-                    </a:p>
-                    <a:p>
-                      <a:r>
-                        <a:rPr lang="es-CO" sz="1400" dirty="0"/>
-                        <a:t>RNF16</a:t>
-                      </a:r>
-                    </a:p>
-                  </a:txBody>
-                  <a:tcPr/>
-                </a:tc>
-                <a:extLst>
-                  <a:ext uri="{0D108BD9-81ED-4DB2-BD59-A6C34878D82A}">
-                    <a16:rowId xmlns:a16="http://schemas.microsoft.com/office/drawing/2014/main" val="302045704"/>
-                  </a:ext>
-                </a:extLst>
-              </a:tr>
-              <a:tr h="370840">
-                <a:tc>
-                  <a:txBody>
-                    <a:bodyPr/>
-                    <a:lstStyle/>
-                    <a:p>
-                      <a:r>
-                        <a:rPr lang="es-CO" sz="1400" dirty="0"/>
-                        <a:t>Prioridad del requerimiento</a:t>
-                      </a:r>
-                    </a:p>
-                  </a:txBody>
-                  <a:tcPr/>
-                </a:tc>
-                <a:tc>
-                  <a:txBody>
-                    <a:bodyPr/>
-                    <a:lstStyle/>
-                    <a:p>
-                      <a:r>
-                        <a:rPr lang="es-CO" sz="1400" dirty="0"/>
-                        <a:t>Alta</a:t>
-                      </a:r>
-                    </a:p>
-                  </a:txBody>
-                  <a:tcPr/>
-                </a:tc>
-                <a:extLst>
-                  <a:ext uri="{0D108BD9-81ED-4DB2-BD59-A6C34878D82A}">
-                    <a16:rowId xmlns:a16="http://schemas.microsoft.com/office/drawing/2014/main" val="2916724385"/>
-                  </a:ext>
-                </a:extLst>
-              </a:tr>
-            </a:tbl>
-          </a:graphicData>
-        </a:graphic>
-      </p:graphicFrame>
-    </p:spTree>
-    <p:extLst>
-      <p:ext uri="{BB962C8B-B14F-4D97-AF65-F5344CB8AC3E}">
-        <p14:creationId xmlns:p14="http://schemas.microsoft.com/office/powerpoint/2010/main" val="10977141"/>
       </p:ext>
     </p:extLst>
   </p:cSld>
@@ -21352,6 +21039,376 @@
         </p:nvGraphicFramePr>
         <p:xfrm>
           <a:off x="5118100" y="803275"/>
+          <a:ext cx="6281738" cy="5227320"/>
+        </p:xfrm>
+        <a:graphic>
+          <a:graphicData uri="http://schemas.openxmlformats.org/drawingml/2006/table">
+            <a:tbl>
+              <a:tblPr firstRow="1" bandRow="1">
+                <a:tableStyleId>{5C22544A-7EE6-4342-B048-85BDC9FD1C3A}</a:tableStyleId>
+              </a:tblPr>
+              <a:tblGrid>
+                <a:gridCol w="3140869">
+                  <a:extLst>
+                    <a:ext uri="{9D8B030D-6E8A-4147-A177-3AD203B41FA5}">
+                      <a16:colId xmlns:a16="http://schemas.microsoft.com/office/drawing/2014/main" val="1589146686"/>
+                    </a:ext>
+                  </a:extLst>
+                </a:gridCol>
+                <a:gridCol w="3140869">
+                  <a:extLst>
+                    <a:ext uri="{9D8B030D-6E8A-4147-A177-3AD203B41FA5}">
+                      <a16:colId xmlns:a16="http://schemas.microsoft.com/office/drawing/2014/main" val="1463651238"/>
+                    </a:ext>
+                  </a:extLst>
+                </a:gridCol>
+              </a:tblGrid>
+              <a:tr h="370840">
+                <a:tc>
+                  <a:txBody>
+                    <a:bodyPr/>
+                    <a:lstStyle/>
+                    <a:p>
+                      <a:r>
+                        <a:rPr lang="es-CO" sz="1400" dirty="0"/>
+                        <a:t>Identificación del requerimiento</a:t>
+                      </a:r>
+                    </a:p>
+                  </a:txBody>
+                  <a:tcPr/>
+                </a:tc>
+                <a:tc>
+                  <a:txBody>
+                    <a:bodyPr/>
+                    <a:lstStyle/>
+                    <a:p>
+                      <a:r>
+                        <a:rPr lang="es-CO" sz="1400" dirty="0"/>
+                        <a:t>RF09</a:t>
+                      </a:r>
+                    </a:p>
+                  </a:txBody>
+                  <a:tcPr/>
+                </a:tc>
+                <a:extLst>
+                  <a:ext uri="{0D108BD9-81ED-4DB2-BD59-A6C34878D82A}">
+                    <a16:rowId xmlns:a16="http://schemas.microsoft.com/office/drawing/2014/main" val="3568786682"/>
+                  </a:ext>
+                </a:extLst>
+              </a:tr>
+              <a:tr h="370840">
+                <a:tc>
+                  <a:txBody>
+                    <a:bodyPr/>
+                    <a:lstStyle/>
+                    <a:p>
+                      <a:r>
+                        <a:rPr lang="es-CO" sz="1400" dirty="0"/>
+                        <a:t>Nombre del requerimiento</a:t>
+                      </a:r>
+                    </a:p>
+                  </a:txBody>
+                  <a:tcPr/>
+                </a:tc>
+                <a:tc>
+                  <a:txBody>
+                    <a:bodyPr/>
+                    <a:lstStyle/>
+                    <a:p>
+                      <a:r>
+                        <a:rPr lang="es-CO" sz="1400" dirty="0"/>
+                        <a:t>Consultar notas</a:t>
+                      </a:r>
+                    </a:p>
+                  </a:txBody>
+                  <a:tcPr/>
+                </a:tc>
+                <a:extLst>
+                  <a:ext uri="{0D108BD9-81ED-4DB2-BD59-A6C34878D82A}">
+                    <a16:rowId xmlns:a16="http://schemas.microsoft.com/office/drawing/2014/main" val="2616514354"/>
+                  </a:ext>
+                </a:extLst>
+              </a:tr>
+              <a:tr h="370840">
+                <a:tc>
+                  <a:txBody>
+                    <a:bodyPr/>
+                    <a:lstStyle/>
+                    <a:p>
+                      <a:r>
+                        <a:rPr lang="es-CO" sz="1400" dirty="0"/>
+                        <a:t>Características</a:t>
+                      </a:r>
+                    </a:p>
+                  </a:txBody>
+                  <a:tcPr/>
+                </a:tc>
+                <a:tc>
+                  <a:txBody>
+                    <a:bodyPr/>
+                    <a:lstStyle/>
+                    <a:p>
+                      <a:r>
+                        <a:rPr lang="es-CO" sz="1400" dirty="0"/>
+                        <a:t>El usuario estudiante podrá consultar su boletín de calificaciones y sus estadísticas de rendimiento</a:t>
+                      </a:r>
+                    </a:p>
+                  </a:txBody>
+                  <a:tcPr/>
+                </a:tc>
+                <a:extLst>
+                  <a:ext uri="{0D108BD9-81ED-4DB2-BD59-A6C34878D82A}">
+                    <a16:rowId xmlns:a16="http://schemas.microsoft.com/office/drawing/2014/main" val="1942680024"/>
+                  </a:ext>
+                </a:extLst>
+              </a:tr>
+              <a:tr h="370840">
+                <a:tc>
+                  <a:txBody>
+                    <a:bodyPr/>
+                    <a:lstStyle/>
+                    <a:p>
+                      <a:r>
+                        <a:rPr lang="es-CO" sz="1400" dirty="0"/>
+                        <a:t>Descripción del requerimiento</a:t>
+                      </a:r>
+                    </a:p>
+                  </a:txBody>
+                  <a:tcPr/>
+                </a:tc>
+                <a:tc>
+                  <a:txBody>
+                    <a:bodyPr/>
+                    <a:lstStyle/>
+                    <a:p>
+                      <a:pPr marL="0" marR="0" lvl="0" indent="0" algn="l" defTabSz="914400" rtl="0" eaLnBrk="1" fontAlgn="auto" latinLnBrk="0" hangingPunct="1">
+                        <a:lnSpc>
+                          <a:spcPct val="100000"/>
+                        </a:lnSpc>
+                        <a:spcBef>
+                          <a:spcPts val="0"/>
+                        </a:spcBef>
+                        <a:spcAft>
+                          <a:spcPts val="0"/>
+                        </a:spcAft>
+                        <a:buClrTx/>
+                        <a:buSzTx/>
+                        <a:buFontTx/>
+                        <a:buNone/>
+                        <a:tabLst/>
+                        <a:defRPr/>
+                      </a:pPr>
+                      <a:r>
+                        <a:rPr lang="es-CO" sz="1400" dirty="0"/>
+                        <a:t>El sistema permite al usuario estudiante la consulta de su boletín bimestral y sus estadísticas de rendimiento.</a:t>
+                      </a:r>
+                    </a:p>
+                    <a:p>
+                      <a:endParaRPr lang="es-CO" sz="1400" dirty="0"/>
+                    </a:p>
+                  </a:txBody>
+                  <a:tcPr/>
+                </a:tc>
+                <a:extLst>
+                  <a:ext uri="{0D108BD9-81ED-4DB2-BD59-A6C34878D82A}">
+                    <a16:rowId xmlns:a16="http://schemas.microsoft.com/office/drawing/2014/main" val="2968710298"/>
+                  </a:ext>
+                </a:extLst>
+              </a:tr>
+              <a:tr h="370840">
+                <a:tc>
+                  <a:txBody>
+                    <a:bodyPr/>
+                    <a:lstStyle/>
+                    <a:p>
+                      <a:r>
+                        <a:rPr lang="es-CO" sz="1400" dirty="0"/>
+                        <a:t>Requerimientos no funcionales</a:t>
+                      </a:r>
+                    </a:p>
+                  </a:txBody>
+                  <a:tcPr/>
+                </a:tc>
+                <a:tc>
+                  <a:txBody>
+                    <a:bodyPr/>
+                    <a:lstStyle/>
+                    <a:p>
+                      <a:r>
+                        <a:rPr lang="es-CO" sz="1400" dirty="0"/>
+                        <a:t>RNF01</a:t>
+                      </a:r>
+                    </a:p>
+                    <a:p>
+                      <a:r>
+                        <a:rPr lang="es-CO" sz="1400" dirty="0"/>
+                        <a:t>RNF08</a:t>
+                      </a:r>
+                    </a:p>
+                    <a:p>
+                      <a:r>
+                        <a:rPr lang="es-CO" sz="1400" dirty="0"/>
+                        <a:t>RNF09</a:t>
+                      </a:r>
+                    </a:p>
+                    <a:p>
+                      <a:r>
+                        <a:rPr lang="es-CO" sz="1400" dirty="0"/>
+                        <a:t>RNF10</a:t>
+                      </a:r>
+                    </a:p>
+                    <a:p>
+                      <a:r>
+                        <a:rPr lang="es-CO" sz="1400" dirty="0"/>
+                        <a:t>RNF11</a:t>
+                      </a:r>
+                    </a:p>
+                    <a:p>
+                      <a:r>
+                        <a:rPr lang="es-CO" sz="1400" dirty="0"/>
+                        <a:t>RNF13</a:t>
+                      </a:r>
+                    </a:p>
+                    <a:p>
+                      <a:r>
+                        <a:rPr lang="es-CO" sz="1400" dirty="0"/>
+                        <a:t>RNF14</a:t>
+                      </a:r>
+                    </a:p>
+                    <a:p>
+                      <a:r>
+                        <a:rPr lang="es-CO" sz="1400" dirty="0"/>
+                        <a:t>RNF15</a:t>
+                      </a:r>
+                    </a:p>
+                    <a:p>
+                      <a:r>
+                        <a:rPr lang="es-CO" sz="1400" dirty="0"/>
+                        <a:t>RNF16</a:t>
+                      </a:r>
+                    </a:p>
+                  </a:txBody>
+                  <a:tcPr/>
+                </a:tc>
+                <a:extLst>
+                  <a:ext uri="{0D108BD9-81ED-4DB2-BD59-A6C34878D82A}">
+                    <a16:rowId xmlns:a16="http://schemas.microsoft.com/office/drawing/2014/main" val="302045704"/>
+                  </a:ext>
+                </a:extLst>
+              </a:tr>
+              <a:tr h="370840">
+                <a:tc>
+                  <a:txBody>
+                    <a:bodyPr/>
+                    <a:lstStyle/>
+                    <a:p>
+                      <a:r>
+                        <a:rPr lang="es-CO" sz="1400" dirty="0"/>
+                        <a:t>Prioridad del requerimiento</a:t>
+                      </a:r>
+                    </a:p>
+                  </a:txBody>
+                  <a:tcPr/>
+                </a:tc>
+                <a:tc>
+                  <a:txBody>
+                    <a:bodyPr/>
+                    <a:lstStyle/>
+                    <a:p>
+                      <a:r>
+                        <a:rPr lang="es-CO" sz="1400" dirty="0"/>
+                        <a:t>Alta</a:t>
+                      </a:r>
+                    </a:p>
+                  </a:txBody>
+                  <a:tcPr/>
+                </a:tc>
+                <a:extLst>
+                  <a:ext uri="{0D108BD9-81ED-4DB2-BD59-A6C34878D82A}">
+                    <a16:rowId xmlns:a16="http://schemas.microsoft.com/office/drawing/2014/main" val="2916724385"/>
+                  </a:ext>
+                </a:extLst>
+              </a:tr>
+            </a:tbl>
+          </a:graphicData>
+        </a:graphic>
+      </p:graphicFrame>
+    </p:spTree>
+    <p:extLst>
+      <p:ext uri="{BB962C8B-B14F-4D97-AF65-F5344CB8AC3E}">
+        <p14:creationId xmlns:p14="http://schemas.microsoft.com/office/powerpoint/2010/main" val="10977141"/>
+      </p:ext>
+    </p:extLst>
+  </p:cSld>
+  <p:clrMapOvr>
+    <a:masterClrMapping/>
+  </p:clrMapOvr>
+</p:sld>
+</file>
+
+<file path=ppt/slides/slide41.xml><?xml version="1.0" encoding="utf-8"?>
+<p:sld xmlns:a="http://schemas.openxmlformats.org/drawingml/2006/main" xmlns:r="http://schemas.openxmlformats.org/officeDocument/2006/relationships" xmlns:p="http://schemas.openxmlformats.org/presentationml/2006/main">
+  <p:cSld>
+    <p:spTree>
+      <p:nvGrpSpPr>
+        <p:cNvPr id="1" name=""/>
+        <p:cNvGrpSpPr/>
+        <p:nvPr/>
+      </p:nvGrpSpPr>
+      <p:grpSpPr>
+        <a:xfrm>
+          <a:off x="0" y="0"/>
+          <a:ext cx="0" cy="0"/>
+          <a:chOff x="0" y="0"/>
+          <a:chExt cx="0" cy="0"/>
+        </a:xfrm>
+      </p:grpSpPr>
+      <p:sp>
+        <p:nvSpPr>
+          <p:cNvPr id="2" name="Título 1">
+            <a:extLst>
+              <a:ext uri="{FF2B5EF4-FFF2-40B4-BE49-F238E27FC236}">
+                <a16:creationId xmlns:a16="http://schemas.microsoft.com/office/drawing/2014/main" id="{A544CF25-2F8F-BC45-9D5E-B7214CD84D05}"/>
+              </a:ext>
+            </a:extLst>
+          </p:cNvPr>
+          <p:cNvSpPr>
+            <a:spLocks noGrp="1"/>
+          </p:cNvSpPr>
+          <p:nvPr>
+            <p:ph type="title"/>
+          </p:nvPr>
+        </p:nvSpPr>
+        <p:spPr/>
+        <p:txBody>
+          <a:bodyPr/>
+          <a:lstStyle/>
+          <a:p>
+            <a:r>
+              <a:rPr lang="es-CO" dirty="0"/>
+              <a:t>Requerimientos funcionales</a:t>
+            </a:r>
+          </a:p>
+        </p:txBody>
+      </p:sp>
+      <p:graphicFrame>
+        <p:nvGraphicFramePr>
+          <p:cNvPr id="4" name="Tabla 4">
+            <a:extLst>
+              <a:ext uri="{FF2B5EF4-FFF2-40B4-BE49-F238E27FC236}">
+                <a16:creationId xmlns:a16="http://schemas.microsoft.com/office/drawing/2014/main" id="{104B1BC5-C194-6A4D-BF36-86B68BC29C6E}"/>
+              </a:ext>
+            </a:extLst>
+          </p:cNvPr>
+          <p:cNvGraphicFramePr>
+            <a:graphicFrameLocks noGrp="1"/>
+          </p:cNvGraphicFramePr>
+          <p:nvPr>
+            <p:ph idx="1"/>
+          </p:nvPr>
+        </p:nvGraphicFramePr>
+        <p:xfrm>
+          <a:off x="5118100" y="803275"/>
           <a:ext cx="6281738" cy="4800600"/>
         </p:xfrm>
         <a:graphic>
@@ -21659,7 +21716,7 @@
 </p:sld>
 </file>
 
-<file path=ppt/slides/slide41.xml><?xml version="1.0" encoding="utf-8"?>
+<file path=ppt/slides/slide42.xml><?xml version="1.0" encoding="utf-8"?>
 <p:sld xmlns:a="http://schemas.openxmlformats.org/drawingml/2006/main" xmlns:r="http://schemas.openxmlformats.org/officeDocument/2006/relationships" xmlns:p="http://schemas.openxmlformats.org/presentationml/2006/main">
   <p:cSld>
     <p:spTree>
@@ -22029,7 +22086,7 @@
 </p:sld>
 </file>
 
-<file path=ppt/slides/slide42.xml><?xml version="1.0" encoding="utf-8"?>
+<file path=ppt/slides/slide43.xml><?xml version="1.0" encoding="utf-8"?>
 <p:sld xmlns:a="http://schemas.openxmlformats.org/drawingml/2006/main" xmlns:r="http://schemas.openxmlformats.org/officeDocument/2006/relationships" xmlns:p="http://schemas.openxmlformats.org/presentationml/2006/main">
   <p:cSld>
     <p:spTree>
@@ -22399,7 +22456,7 @@
 </p:sld>
 </file>
 
-<file path=ppt/slides/slide43.xml><?xml version="1.0" encoding="utf-8"?>
+<file path=ppt/slides/slide44.xml><?xml version="1.0" encoding="utf-8"?>
 <p:sld xmlns:a="http://schemas.openxmlformats.org/drawingml/2006/main" xmlns:r="http://schemas.openxmlformats.org/officeDocument/2006/relationships" xmlns:p="http://schemas.openxmlformats.org/presentationml/2006/main">
   <p:cSld>
     <p:spTree>
@@ -22793,7 +22850,7 @@
 </p:sld>
 </file>
 
-<file path=ppt/slides/slide44.xml><?xml version="1.0" encoding="utf-8"?>
+<file path=ppt/slides/slide45.xml><?xml version="1.0" encoding="utf-8"?>
 <p:sld xmlns:a="http://schemas.openxmlformats.org/drawingml/2006/main" xmlns:r="http://schemas.openxmlformats.org/officeDocument/2006/relationships" xmlns:p="http://schemas.openxmlformats.org/presentationml/2006/main">
   <p:cSld>
     <p:spTree>
@@ -23163,7 +23220,7 @@
 </p:sld>
 </file>
 
-<file path=ppt/slides/slide45.xml><?xml version="1.0" encoding="utf-8"?>
+<file path=ppt/slides/slide46.xml><?xml version="1.0" encoding="utf-8"?>
 <p:sld xmlns:a="http://schemas.openxmlformats.org/drawingml/2006/main" xmlns:r="http://schemas.openxmlformats.org/officeDocument/2006/relationships" xmlns:p="http://schemas.openxmlformats.org/presentationml/2006/main">
   <p:cSld>
     <p:spTree>
@@ -23533,7 +23590,7 @@
 </p:sld>
 </file>
 
-<file path=ppt/slides/slide46.xml><?xml version="1.0" encoding="utf-8"?>
+<file path=ppt/slides/slide47.xml><?xml version="1.0" encoding="utf-8"?>
 <p:sld xmlns:a="http://schemas.openxmlformats.org/drawingml/2006/main" xmlns:r="http://schemas.openxmlformats.org/officeDocument/2006/relationships" xmlns:p="http://schemas.openxmlformats.org/presentationml/2006/main">
   <p:cSld>
     <p:spTree>
@@ -23635,7 +23692,7 @@
 </p:sld>
 </file>
 
-<file path=ppt/slides/slide47.xml><?xml version="1.0" encoding="utf-8"?>
+<file path=ppt/slides/slide48.xml><?xml version="1.0" encoding="utf-8"?>
 <p:sld xmlns:a="http://schemas.openxmlformats.org/drawingml/2006/main" xmlns:r="http://schemas.openxmlformats.org/officeDocument/2006/relationships" xmlns:p="http://schemas.openxmlformats.org/presentationml/2006/main">
   <p:cSld>
     <p:spTree>
@@ -23904,7 +23961,7 @@
 </p:sld>
 </file>
 
-<file path=ppt/slides/slide48.xml><?xml version="1.0" encoding="utf-8"?>
+<file path=ppt/slides/slide49.xml><?xml version="1.0" encoding="utf-8"?>
 <p:sld xmlns:a="http://schemas.openxmlformats.org/drawingml/2006/main" xmlns:r="http://schemas.openxmlformats.org/officeDocument/2006/relationships" xmlns:p="http://schemas.openxmlformats.org/presentationml/2006/main">
   <p:cSld>
     <p:spTree>
@@ -24164,300 +24221,6 @@
     <p:extLst>
       <p:ext uri="{BB962C8B-B14F-4D97-AF65-F5344CB8AC3E}">
         <p14:creationId xmlns:p14="http://schemas.microsoft.com/office/powerpoint/2010/main" val="1139138037"/>
-      </p:ext>
-    </p:extLst>
-  </p:cSld>
-  <p:clrMapOvr>
-    <a:masterClrMapping/>
-  </p:clrMapOvr>
-</p:sld>
-</file>
-
-<file path=ppt/slides/slide49.xml><?xml version="1.0" encoding="utf-8"?>
-<p:sld xmlns:a="http://schemas.openxmlformats.org/drawingml/2006/main" xmlns:r="http://schemas.openxmlformats.org/officeDocument/2006/relationships" xmlns:p="http://schemas.openxmlformats.org/presentationml/2006/main">
-  <p:cSld>
-    <p:spTree>
-      <p:nvGrpSpPr>
-        <p:cNvPr id="1" name=""/>
-        <p:cNvGrpSpPr/>
-        <p:nvPr/>
-      </p:nvGrpSpPr>
-      <p:grpSpPr>
-        <a:xfrm>
-          <a:off x="0" y="0"/>
-          <a:ext cx="0" cy="0"/>
-          <a:chOff x="0" y="0"/>
-          <a:chExt cx="0" cy="0"/>
-        </a:xfrm>
-      </p:grpSpPr>
-      <p:sp>
-        <p:nvSpPr>
-          <p:cNvPr id="2" name="Título 1">
-            <a:extLst>
-              <a:ext uri="{FF2B5EF4-FFF2-40B4-BE49-F238E27FC236}">
-                <a16:creationId xmlns:a16="http://schemas.microsoft.com/office/drawing/2014/main" id="{0DF8FDDE-7FF6-114B-95BB-26E67991BA49}"/>
-              </a:ext>
-            </a:extLst>
-          </p:cNvPr>
-          <p:cNvSpPr>
-            <a:spLocks noGrp="1"/>
-          </p:cNvSpPr>
-          <p:nvPr>
-            <p:ph type="title"/>
-          </p:nvPr>
-        </p:nvSpPr>
-        <p:spPr/>
-        <p:txBody>
-          <a:bodyPr/>
-          <a:lstStyle/>
-          <a:p>
-            <a:r>
-              <a:rPr lang="es-CO" dirty="0"/>
-              <a:t>Requerimientos no funcionales</a:t>
-            </a:r>
-          </a:p>
-        </p:txBody>
-      </p:sp>
-      <p:graphicFrame>
-        <p:nvGraphicFramePr>
-          <p:cNvPr id="4" name="Tabla 4">
-            <a:extLst>
-              <a:ext uri="{FF2B5EF4-FFF2-40B4-BE49-F238E27FC236}">
-                <a16:creationId xmlns:a16="http://schemas.microsoft.com/office/drawing/2014/main" id="{3275B20B-304D-3645-A6E7-687160D9B56D}"/>
-              </a:ext>
-            </a:extLst>
-          </p:cNvPr>
-          <p:cNvGraphicFramePr>
-            <a:graphicFrameLocks noGrp="1"/>
-          </p:cNvGraphicFramePr>
-          <p:nvPr>
-            <p:ph idx="1"/>
-          </p:nvPr>
-        </p:nvGraphicFramePr>
-        <p:xfrm>
-          <a:off x="5118100" y="803275"/>
-          <a:ext cx="6281738" cy="3754120"/>
-        </p:xfrm>
-        <a:graphic>
-          <a:graphicData uri="http://schemas.openxmlformats.org/drawingml/2006/table">
-            <a:tbl>
-              <a:tblPr firstRow="1" bandRow="1">
-                <a:tableStyleId>{5C22544A-7EE6-4342-B048-85BDC9FD1C3A}</a:tableStyleId>
-              </a:tblPr>
-              <a:tblGrid>
-                <a:gridCol w="3140869">
-                  <a:extLst>
-                    <a:ext uri="{9D8B030D-6E8A-4147-A177-3AD203B41FA5}">
-                      <a16:colId xmlns:a16="http://schemas.microsoft.com/office/drawing/2014/main" val="2405063638"/>
-                    </a:ext>
-                  </a:extLst>
-                </a:gridCol>
-                <a:gridCol w="3140869">
-                  <a:extLst>
-                    <a:ext uri="{9D8B030D-6E8A-4147-A177-3AD203B41FA5}">
-                      <a16:colId xmlns:a16="http://schemas.microsoft.com/office/drawing/2014/main" val="3099478781"/>
-                    </a:ext>
-                  </a:extLst>
-                </a:gridCol>
-              </a:tblGrid>
-              <a:tr h="370840">
-                <a:tc>
-                  <a:txBody>
-                    <a:bodyPr/>
-                    <a:lstStyle/>
-                    <a:p>
-                      <a:r>
-                        <a:rPr lang="es-CO" dirty="0"/>
-                        <a:t>Identificación del requerimiento</a:t>
-                      </a:r>
-                    </a:p>
-                  </a:txBody>
-                  <a:tcPr/>
-                </a:tc>
-                <a:tc>
-                  <a:txBody>
-                    <a:bodyPr/>
-                    <a:lstStyle/>
-                    <a:p>
-                      <a:r>
-                        <a:rPr lang="es-CO" dirty="0"/>
-                        <a:t>RNF03</a:t>
-                      </a:r>
-                    </a:p>
-                  </a:txBody>
-                  <a:tcPr/>
-                </a:tc>
-                <a:extLst>
-                  <a:ext uri="{0D108BD9-81ED-4DB2-BD59-A6C34878D82A}">
-                    <a16:rowId xmlns:a16="http://schemas.microsoft.com/office/drawing/2014/main" val="3120795479"/>
-                  </a:ext>
-                </a:extLst>
-              </a:tr>
-              <a:tr h="370840">
-                <a:tc>
-                  <a:txBody>
-                    <a:bodyPr/>
-                    <a:lstStyle/>
-                    <a:p>
-                      <a:r>
-                        <a:rPr lang="es-CO" dirty="0"/>
-                        <a:t>Nombre del requerimiento</a:t>
-                      </a:r>
-                    </a:p>
-                  </a:txBody>
-                  <a:tcPr/>
-                </a:tc>
-                <a:tc>
-                  <a:txBody>
-                    <a:bodyPr/>
-                    <a:lstStyle/>
-                    <a:p>
-                      <a:r>
-                        <a:rPr lang="es-CO" dirty="0" err="1"/>
-                        <a:t>Frontend</a:t>
-                      </a:r>
-                      <a:endParaRPr lang="es-CO" dirty="0"/>
-                    </a:p>
-                  </a:txBody>
-                  <a:tcPr/>
-                </a:tc>
-                <a:extLst>
-                  <a:ext uri="{0D108BD9-81ED-4DB2-BD59-A6C34878D82A}">
-                    <a16:rowId xmlns:a16="http://schemas.microsoft.com/office/drawing/2014/main" val="1343925762"/>
-                  </a:ext>
-                </a:extLst>
-              </a:tr>
-              <a:tr h="370840">
-                <a:tc>
-                  <a:txBody>
-                    <a:bodyPr/>
-                    <a:lstStyle/>
-                    <a:p>
-                      <a:r>
-                        <a:rPr lang="es-CO" dirty="0"/>
-                        <a:t>Caracterísitcas</a:t>
-                      </a:r>
-                    </a:p>
-                  </a:txBody>
-                  <a:tcPr/>
-                </a:tc>
-                <a:tc>
-                  <a:txBody>
-                    <a:bodyPr/>
-                    <a:lstStyle/>
-                    <a:p>
-                      <a:r>
-                        <a:rPr lang="es-CO" dirty="0"/>
-                        <a:t>El </a:t>
-                      </a:r>
-                      <a:r>
-                        <a:rPr lang="es-CO" dirty="0" err="1"/>
-                        <a:t>frontend</a:t>
-                      </a:r>
-                      <a:r>
-                        <a:rPr lang="es-CO" dirty="0"/>
-                        <a:t> debe estar escrito, al menos, en </a:t>
-                      </a:r>
-                      <a:r>
-                        <a:rPr lang="es-CO" dirty="0" err="1"/>
-                        <a:t>NoteJS</a:t>
-                      </a:r>
-                      <a:r>
-                        <a:rPr lang="es-CO" dirty="0"/>
-                        <a:t> y HTML.</a:t>
-                      </a:r>
-                    </a:p>
-                  </a:txBody>
-                  <a:tcPr/>
-                </a:tc>
-                <a:extLst>
-                  <a:ext uri="{0D108BD9-81ED-4DB2-BD59-A6C34878D82A}">
-                    <a16:rowId xmlns:a16="http://schemas.microsoft.com/office/drawing/2014/main" val="769886354"/>
-                  </a:ext>
-                </a:extLst>
-              </a:tr>
-              <a:tr h="370840">
-                <a:tc>
-                  <a:txBody>
-                    <a:bodyPr/>
-                    <a:lstStyle/>
-                    <a:p>
-                      <a:r>
-                        <a:rPr lang="es-CO" dirty="0"/>
-                        <a:t>Descripción del requerimiento</a:t>
-                      </a:r>
-                    </a:p>
-                  </a:txBody>
-                  <a:tcPr/>
-                </a:tc>
-                <a:tc>
-                  <a:txBody>
-                    <a:bodyPr/>
-                    <a:lstStyle/>
-                    <a:p>
-                      <a:r>
-                        <a:rPr lang="es-CO" dirty="0"/>
-                        <a:t>Se deben utilizar, al menos, los lenguajes </a:t>
-                      </a:r>
-                      <a:r>
-                        <a:rPr lang="es-CO" dirty="0" err="1"/>
-                        <a:t>NoteJS</a:t>
-                      </a:r>
-                      <a:r>
-                        <a:rPr lang="es-CO" dirty="0"/>
-                        <a:t>  y HTML para el diseño frontal del sistema.</a:t>
-                      </a:r>
-                    </a:p>
-                  </a:txBody>
-                  <a:tcPr/>
-                </a:tc>
-                <a:extLst>
-                  <a:ext uri="{0D108BD9-81ED-4DB2-BD59-A6C34878D82A}">
-                    <a16:rowId xmlns:a16="http://schemas.microsoft.com/office/drawing/2014/main" val="2397840479"/>
-                  </a:ext>
-                </a:extLst>
-              </a:tr>
-              <a:tr h="370840">
-                <a:tc>
-                  <a:txBody>
-                    <a:bodyPr/>
-                    <a:lstStyle/>
-                    <a:p>
-                      <a:r>
-                        <a:rPr lang="es-CO" dirty="0"/>
-                        <a:t>Prioridad del requerimiento</a:t>
-                      </a:r>
-                    </a:p>
-                  </a:txBody>
-                  <a:tcPr/>
-                </a:tc>
-                <a:tc>
-                  <a:txBody>
-                    <a:bodyPr/>
-                    <a:lstStyle/>
-                    <a:p>
-                      <a:r>
-                        <a:rPr lang="es-CO" dirty="0"/>
-                        <a:t>Alta</a:t>
-                      </a:r>
-                    </a:p>
-                  </a:txBody>
-                  <a:tcPr/>
-                </a:tc>
-                <a:extLst>
-                  <a:ext uri="{0D108BD9-81ED-4DB2-BD59-A6C34878D82A}">
-                    <a16:rowId xmlns:a16="http://schemas.microsoft.com/office/drawing/2014/main" val="1876826554"/>
-                  </a:ext>
-                </a:extLst>
-              </a:tr>
-            </a:tbl>
-          </a:graphicData>
-        </a:graphic>
-      </p:graphicFrame>
-    </p:spTree>
-    <p:extLst>
-      <p:ext uri="{BB962C8B-B14F-4D97-AF65-F5344CB8AC3E}">
-        <p14:creationId xmlns:p14="http://schemas.microsoft.com/office/powerpoint/2010/main" val="3274729353"/>
       </p:ext>
     </p:extLst>
   </p:cSld>
@@ -24663,6 +24426,300 @@
                     <a:p>
                       <a:r>
                         <a:rPr lang="es-CO" dirty="0"/>
+                        <a:t>RNF03</a:t>
+                      </a:r>
+                    </a:p>
+                  </a:txBody>
+                  <a:tcPr/>
+                </a:tc>
+                <a:extLst>
+                  <a:ext uri="{0D108BD9-81ED-4DB2-BD59-A6C34878D82A}">
+                    <a16:rowId xmlns:a16="http://schemas.microsoft.com/office/drawing/2014/main" val="3120795479"/>
+                  </a:ext>
+                </a:extLst>
+              </a:tr>
+              <a:tr h="370840">
+                <a:tc>
+                  <a:txBody>
+                    <a:bodyPr/>
+                    <a:lstStyle/>
+                    <a:p>
+                      <a:r>
+                        <a:rPr lang="es-CO" dirty="0"/>
+                        <a:t>Nombre del requerimiento</a:t>
+                      </a:r>
+                    </a:p>
+                  </a:txBody>
+                  <a:tcPr/>
+                </a:tc>
+                <a:tc>
+                  <a:txBody>
+                    <a:bodyPr/>
+                    <a:lstStyle/>
+                    <a:p>
+                      <a:r>
+                        <a:rPr lang="es-CO" dirty="0" err="1"/>
+                        <a:t>Frontend</a:t>
+                      </a:r>
+                      <a:endParaRPr lang="es-CO" dirty="0"/>
+                    </a:p>
+                  </a:txBody>
+                  <a:tcPr/>
+                </a:tc>
+                <a:extLst>
+                  <a:ext uri="{0D108BD9-81ED-4DB2-BD59-A6C34878D82A}">
+                    <a16:rowId xmlns:a16="http://schemas.microsoft.com/office/drawing/2014/main" val="1343925762"/>
+                  </a:ext>
+                </a:extLst>
+              </a:tr>
+              <a:tr h="370840">
+                <a:tc>
+                  <a:txBody>
+                    <a:bodyPr/>
+                    <a:lstStyle/>
+                    <a:p>
+                      <a:r>
+                        <a:rPr lang="es-CO" dirty="0"/>
+                        <a:t>Caracterísitcas</a:t>
+                      </a:r>
+                    </a:p>
+                  </a:txBody>
+                  <a:tcPr/>
+                </a:tc>
+                <a:tc>
+                  <a:txBody>
+                    <a:bodyPr/>
+                    <a:lstStyle/>
+                    <a:p>
+                      <a:r>
+                        <a:rPr lang="es-CO" dirty="0"/>
+                        <a:t>El </a:t>
+                      </a:r>
+                      <a:r>
+                        <a:rPr lang="es-CO" dirty="0" err="1"/>
+                        <a:t>frontend</a:t>
+                      </a:r>
+                      <a:r>
+                        <a:rPr lang="es-CO" dirty="0"/>
+                        <a:t> debe estar escrito, al menos, en </a:t>
+                      </a:r>
+                      <a:r>
+                        <a:rPr lang="es-CO" dirty="0" err="1"/>
+                        <a:t>NoteJS</a:t>
+                      </a:r>
+                      <a:r>
+                        <a:rPr lang="es-CO" dirty="0"/>
+                        <a:t> y HTML.</a:t>
+                      </a:r>
+                    </a:p>
+                  </a:txBody>
+                  <a:tcPr/>
+                </a:tc>
+                <a:extLst>
+                  <a:ext uri="{0D108BD9-81ED-4DB2-BD59-A6C34878D82A}">
+                    <a16:rowId xmlns:a16="http://schemas.microsoft.com/office/drawing/2014/main" val="769886354"/>
+                  </a:ext>
+                </a:extLst>
+              </a:tr>
+              <a:tr h="370840">
+                <a:tc>
+                  <a:txBody>
+                    <a:bodyPr/>
+                    <a:lstStyle/>
+                    <a:p>
+                      <a:r>
+                        <a:rPr lang="es-CO" dirty="0"/>
+                        <a:t>Descripción del requerimiento</a:t>
+                      </a:r>
+                    </a:p>
+                  </a:txBody>
+                  <a:tcPr/>
+                </a:tc>
+                <a:tc>
+                  <a:txBody>
+                    <a:bodyPr/>
+                    <a:lstStyle/>
+                    <a:p>
+                      <a:r>
+                        <a:rPr lang="es-CO" dirty="0"/>
+                        <a:t>Se deben utilizar, al menos, los lenguajes </a:t>
+                      </a:r>
+                      <a:r>
+                        <a:rPr lang="es-CO" dirty="0" err="1"/>
+                        <a:t>NoteJS</a:t>
+                      </a:r>
+                      <a:r>
+                        <a:rPr lang="es-CO" dirty="0"/>
+                        <a:t>  y HTML para el diseño frontal del sistema.</a:t>
+                      </a:r>
+                    </a:p>
+                  </a:txBody>
+                  <a:tcPr/>
+                </a:tc>
+                <a:extLst>
+                  <a:ext uri="{0D108BD9-81ED-4DB2-BD59-A6C34878D82A}">
+                    <a16:rowId xmlns:a16="http://schemas.microsoft.com/office/drawing/2014/main" val="2397840479"/>
+                  </a:ext>
+                </a:extLst>
+              </a:tr>
+              <a:tr h="370840">
+                <a:tc>
+                  <a:txBody>
+                    <a:bodyPr/>
+                    <a:lstStyle/>
+                    <a:p>
+                      <a:r>
+                        <a:rPr lang="es-CO" dirty="0"/>
+                        <a:t>Prioridad del requerimiento</a:t>
+                      </a:r>
+                    </a:p>
+                  </a:txBody>
+                  <a:tcPr/>
+                </a:tc>
+                <a:tc>
+                  <a:txBody>
+                    <a:bodyPr/>
+                    <a:lstStyle/>
+                    <a:p>
+                      <a:r>
+                        <a:rPr lang="es-CO" dirty="0"/>
+                        <a:t>Alta</a:t>
+                      </a:r>
+                    </a:p>
+                  </a:txBody>
+                  <a:tcPr/>
+                </a:tc>
+                <a:extLst>
+                  <a:ext uri="{0D108BD9-81ED-4DB2-BD59-A6C34878D82A}">
+                    <a16:rowId xmlns:a16="http://schemas.microsoft.com/office/drawing/2014/main" val="1876826554"/>
+                  </a:ext>
+                </a:extLst>
+              </a:tr>
+            </a:tbl>
+          </a:graphicData>
+        </a:graphic>
+      </p:graphicFrame>
+    </p:spTree>
+    <p:extLst>
+      <p:ext uri="{BB962C8B-B14F-4D97-AF65-F5344CB8AC3E}">
+        <p14:creationId xmlns:p14="http://schemas.microsoft.com/office/powerpoint/2010/main" val="3274729353"/>
+      </p:ext>
+    </p:extLst>
+  </p:cSld>
+  <p:clrMapOvr>
+    <a:masterClrMapping/>
+  </p:clrMapOvr>
+</p:sld>
+</file>
+
+<file path=ppt/slides/slide51.xml><?xml version="1.0" encoding="utf-8"?>
+<p:sld xmlns:a="http://schemas.openxmlformats.org/drawingml/2006/main" xmlns:r="http://schemas.openxmlformats.org/officeDocument/2006/relationships" xmlns:p="http://schemas.openxmlformats.org/presentationml/2006/main">
+  <p:cSld>
+    <p:spTree>
+      <p:nvGrpSpPr>
+        <p:cNvPr id="1" name=""/>
+        <p:cNvGrpSpPr/>
+        <p:nvPr/>
+      </p:nvGrpSpPr>
+      <p:grpSpPr>
+        <a:xfrm>
+          <a:off x="0" y="0"/>
+          <a:ext cx="0" cy="0"/>
+          <a:chOff x="0" y="0"/>
+          <a:chExt cx="0" cy="0"/>
+        </a:xfrm>
+      </p:grpSpPr>
+      <p:sp>
+        <p:nvSpPr>
+          <p:cNvPr id="2" name="Título 1">
+            <a:extLst>
+              <a:ext uri="{FF2B5EF4-FFF2-40B4-BE49-F238E27FC236}">
+                <a16:creationId xmlns:a16="http://schemas.microsoft.com/office/drawing/2014/main" id="{0DF8FDDE-7FF6-114B-95BB-26E67991BA49}"/>
+              </a:ext>
+            </a:extLst>
+          </p:cNvPr>
+          <p:cNvSpPr>
+            <a:spLocks noGrp="1"/>
+          </p:cNvSpPr>
+          <p:nvPr>
+            <p:ph type="title"/>
+          </p:nvPr>
+        </p:nvSpPr>
+        <p:spPr/>
+        <p:txBody>
+          <a:bodyPr/>
+          <a:lstStyle/>
+          <a:p>
+            <a:r>
+              <a:rPr lang="es-CO" dirty="0"/>
+              <a:t>Requerimientos no funcionales</a:t>
+            </a:r>
+          </a:p>
+        </p:txBody>
+      </p:sp>
+      <p:graphicFrame>
+        <p:nvGraphicFramePr>
+          <p:cNvPr id="4" name="Tabla 4">
+            <a:extLst>
+              <a:ext uri="{FF2B5EF4-FFF2-40B4-BE49-F238E27FC236}">
+                <a16:creationId xmlns:a16="http://schemas.microsoft.com/office/drawing/2014/main" id="{3275B20B-304D-3645-A6E7-687160D9B56D}"/>
+              </a:ext>
+            </a:extLst>
+          </p:cNvPr>
+          <p:cNvGraphicFramePr>
+            <a:graphicFrameLocks noGrp="1"/>
+          </p:cNvGraphicFramePr>
+          <p:nvPr>
+            <p:ph idx="1"/>
+          </p:nvPr>
+        </p:nvGraphicFramePr>
+        <p:xfrm>
+          <a:off x="5118100" y="803275"/>
+          <a:ext cx="6281738" cy="3754120"/>
+        </p:xfrm>
+        <a:graphic>
+          <a:graphicData uri="http://schemas.openxmlformats.org/drawingml/2006/table">
+            <a:tbl>
+              <a:tblPr firstRow="1" bandRow="1">
+                <a:tableStyleId>{5C22544A-7EE6-4342-B048-85BDC9FD1C3A}</a:tableStyleId>
+              </a:tblPr>
+              <a:tblGrid>
+                <a:gridCol w="3140869">
+                  <a:extLst>
+                    <a:ext uri="{9D8B030D-6E8A-4147-A177-3AD203B41FA5}">
+                      <a16:colId xmlns:a16="http://schemas.microsoft.com/office/drawing/2014/main" val="2405063638"/>
+                    </a:ext>
+                  </a:extLst>
+                </a:gridCol>
+                <a:gridCol w="3140869">
+                  <a:extLst>
+                    <a:ext uri="{9D8B030D-6E8A-4147-A177-3AD203B41FA5}">
+                      <a16:colId xmlns:a16="http://schemas.microsoft.com/office/drawing/2014/main" val="3099478781"/>
+                    </a:ext>
+                  </a:extLst>
+                </a:gridCol>
+              </a:tblGrid>
+              <a:tr h="370840">
+                <a:tc>
+                  <a:txBody>
+                    <a:bodyPr/>
+                    <a:lstStyle/>
+                    <a:p>
+                      <a:r>
+                        <a:rPr lang="es-CO" dirty="0"/>
+                        <a:t>Identificación del requerimiento</a:t>
+                      </a:r>
+                    </a:p>
+                  </a:txBody>
+                  <a:tcPr/>
+                </a:tc>
+                <a:tc>
+                  <a:txBody>
+                    <a:bodyPr/>
+                    <a:lstStyle/>
+                    <a:p>
+                      <a:r>
+                        <a:rPr lang="es-CO" dirty="0"/>
                         <a:t>RNF04</a:t>
                       </a:r>
                     </a:p>
@@ -24865,7 +24922,7 @@
 </p:sld>
 </file>
 
-<file path=ppt/slides/slide51.xml><?xml version="1.0" encoding="utf-8"?>
+<file path=ppt/slides/slide52.xml><?xml version="1.0" encoding="utf-8"?>
 <p:sld xmlns:a="http://schemas.openxmlformats.org/drawingml/2006/main" xmlns:r="http://schemas.openxmlformats.org/officeDocument/2006/relationships" xmlns:p="http://schemas.openxmlformats.org/presentationml/2006/main">
   <p:cSld>
     <p:spTree>
@@ -25138,7 +25195,7 @@
 </p:sld>
 </file>
 
-<file path=ppt/slides/slide52.xml><?xml version="1.0" encoding="utf-8"?>
+<file path=ppt/slides/slide53.xml><?xml version="1.0" encoding="utf-8"?>
 <p:sld xmlns:a="http://schemas.openxmlformats.org/drawingml/2006/main" xmlns:r="http://schemas.openxmlformats.org/officeDocument/2006/relationships" xmlns:p="http://schemas.openxmlformats.org/presentationml/2006/main">
   <p:cSld>
     <p:spTree>
@@ -25411,7 +25468,7 @@
 </p:sld>
 </file>
 
-<file path=ppt/slides/slide53.xml><?xml version="1.0" encoding="utf-8"?>
+<file path=ppt/slides/slide54.xml><?xml version="1.0" encoding="utf-8"?>
 <p:sld xmlns:a="http://schemas.openxmlformats.org/drawingml/2006/main" xmlns:r="http://schemas.openxmlformats.org/officeDocument/2006/relationships" xmlns:p="http://schemas.openxmlformats.org/presentationml/2006/main">
   <p:cSld>
     <p:spTree>
@@ -25684,7 +25741,7 @@
 </p:sld>
 </file>
 
-<file path=ppt/slides/slide54.xml><?xml version="1.0" encoding="utf-8"?>
+<file path=ppt/slides/slide55.xml><?xml version="1.0" encoding="utf-8"?>
 <p:sld xmlns:a="http://schemas.openxmlformats.org/drawingml/2006/main" xmlns:r="http://schemas.openxmlformats.org/officeDocument/2006/relationships" xmlns:p="http://schemas.openxmlformats.org/presentationml/2006/main">
   <p:cSld>
     <p:spTree>
@@ -25974,7 +26031,7 @@
 </p:sld>
 </file>
 
-<file path=ppt/slides/slide55.xml><?xml version="1.0" encoding="utf-8"?>
+<file path=ppt/slides/slide56.xml><?xml version="1.0" encoding="utf-8"?>
 <p:sld xmlns:a="http://schemas.openxmlformats.org/drawingml/2006/main" xmlns:r="http://schemas.openxmlformats.org/officeDocument/2006/relationships" xmlns:p="http://schemas.openxmlformats.org/presentationml/2006/main">
   <p:cSld>
     <p:spTree>
@@ -26264,7 +26321,7 @@
 </p:sld>
 </file>
 
-<file path=ppt/slides/slide56.xml><?xml version="1.0" encoding="utf-8"?>
+<file path=ppt/slides/slide57.xml><?xml version="1.0" encoding="utf-8"?>
 <p:sld xmlns:a="http://schemas.openxmlformats.org/drawingml/2006/main" xmlns:r="http://schemas.openxmlformats.org/officeDocument/2006/relationships" xmlns:p="http://schemas.openxmlformats.org/presentationml/2006/main">
   <p:cSld>
     <p:spTree>
@@ -26537,7 +26594,7 @@
 </p:sld>
 </file>
 
-<file path=ppt/slides/slide57.xml><?xml version="1.0" encoding="utf-8"?>
+<file path=ppt/slides/slide58.xml><?xml version="1.0" encoding="utf-8"?>
 <p:sld xmlns:a="http://schemas.openxmlformats.org/drawingml/2006/main" xmlns:r="http://schemas.openxmlformats.org/officeDocument/2006/relationships" xmlns:p="http://schemas.openxmlformats.org/presentationml/2006/main">
   <p:cSld>
     <p:spTree>
@@ -26810,7 +26867,7 @@
 </p:sld>
 </file>
 
-<file path=ppt/slides/slide58.xml><?xml version="1.0" encoding="utf-8"?>
+<file path=ppt/slides/slide59.xml><?xml version="1.0" encoding="utf-8"?>
 <p:sld xmlns:a="http://schemas.openxmlformats.org/drawingml/2006/main" xmlns:r="http://schemas.openxmlformats.org/officeDocument/2006/relationships" xmlns:p="http://schemas.openxmlformats.org/presentationml/2006/main">
   <p:cSld>
     <p:spTree>
@@ -27074,279 +27131,6 @@
     <p:extLst>
       <p:ext uri="{BB962C8B-B14F-4D97-AF65-F5344CB8AC3E}">
         <p14:creationId xmlns:p14="http://schemas.microsoft.com/office/powerpoint/2010/main" val="1915646667"/>
-      </p:ext>
-    </p:extLst>
-  </p:cSld>
-  <p:clrMapOvr>
-    <a:masterClrMapping/>
-  </p:clrMapOvr>
-</p:sld>
-</file>
-
-<file path=ppt/slides/slide59.xml><?xml version="1.0" encoding="utf-8"?>
-<p:sld xmlns:a="http://schemas.openxmlformats.org/drawingml/2006/main" xmlns:r="http://schemas.openxmlformats.org/officeDocument/2006/relationships" xmlns:p="http://schemas.openxmlformats.org/presentationml/2006/main">
-  <p:cSld>
-    <p:spTree>
-      <p:nvGrpSpPr>
-        <p:cNvPr id="1" name=""/>
-        <p:cNvGrpSpPr/>
-        <p:nvPr/>
-      </p:nvGrpSpPr>
-      <p:grpSpPr>
-        <a:xfrm>
-          <a:off x="0" y="0"/>
-          <a:ext cx="0" cy="0"/>
-          <a:chOff x="0" y="0"/>
-          <a:chExt cx="0" cy="0"/>
-        </a:xfrm>
-      </p:grpSpPr>
-      <p:sp>
-        <p:nvSpPr>
-          <p:cNvPr id="2" name="Título 1">
-            <a:extLst>
-              <a:ext uri="{FF2B5EF4-FFF2-40B4-BE49-F238E27FC236}">
-                <a16:creationId xmlns:a16="http://schemas.microsoft.com/office/drawing/2014/main" id="{0DF8FDDE-7FF6-114B-95BB-26E67991BA49}"/>
-              </a:ext>
-            </a:extLst>
-          </p:cNvPr>
-          <p:cNvSpPr>
-            <a:spLocks noGrp="1"/>
-          </p:cNvSpPr>
-          <p:nvPr>
-            <p:ph type="title"/>
-          </p:nvPr>
-        </p:nvSpPr>
-        <p:spPr/>
-        <p:txBody>
-          <a:bodyPr/>
-          <a:lstStyle/>
-          <a:p>
-            <a:r>
-              <a:rPr lang="es-CO"/>
-              <a:t>Requerimientos </a:t>
-            </a:r>
-            <a:r>
-              <a:rPr lang="es-CO" dirty="0"/>
-              <a:t>no funcionales</a:t>
-            </a:r>
-          </a:p>
-        </p:txBody>
-      </p:sp>
-      <p:graphicFrame>
-        <p:nvGraphicFramePr>
-          <p:cNvPr id="4" name="Tabla 4">
-            <a:extLst>
-              <a:ext uri="{FF2B5EF4-FFF2-40B4-BE49-F238E27FC236}">
-                <a16:creationId xmlns:a16="http://schemas.microsoft.com/office/drawing/2014/main" id="{3275B20B-304D-3645-A6E7-687160D9B56D}"/>
-              </a:ext>
-            </a:extLst>
-          </p:cNvPr>
-          <p:cNvGraphicFramePr>
-            <a:graphicFrameLocks noGrp="1"/>
-          </p:cNvGraphicFramePr>
-          <p:nvPr>
-            <p:ph idx="1"/>
-          </p:nvPr>
-        </p:nvGraphicFramePr>
-        <p:xfrm>
-          <a:off x="5118100" y="803275"/>
-          <a:ext cx="6281738" cy="3205480"/>
-        </p:xfrm>
-        <a:graphic>
-          <a:graphicData uri="http://schemas.openxmlformats.org/drawingml/2006/table">
-            <a:tbl>
-              <a:tblPr firstRow="1" bandRow="1">
-                <a:tableStyleId>{5C22544A-7EE6-4342-B048-85BDC9FD1C3A}</a:tableStyleId>
-              </a:tblPr>
-              <a:tblGrid>
-                <a:gridCol w="3140869">
-                  <a:extLst>
-                    <a:ext uri="{9D8B030D-6E8A-4147-A177-3AD203B41FA5}">
-                      <a16:colId xmlns:a16="http://schemas.microsoft.com/office/drawing/2014/main" val="2405063638"/>
-                    </a:ext>
-                  </a:extLst>
-                </a:gridCol>
-                <a:gridCol w="3140869">
-                  <a:extLst>
-                    <a:ext uri="{9D8B030D-6E8A-4147-A177-3AD203B41FA5}">
-                      <a16:colId xmlns:a16="http://schemas.microsoft.com/office/drawing/2014/main" val="3099478781"/>
-                    </a:ext>
-                  </a:extLst>
-                </a:gridCol>
-              </a:tblGrid>
-              <a:tr h="370840">
-                <a:tc>
-                  <a:txBody>
-                    <a:bodyPr/>
-                    <a:lstStyle/>
-                    <a:p>
-                      <a:r>
-                        <a:rPr lang="es-CO" dirty="0"/>
-                        <a:t>Identificación del requerimiento</a:t>
-                      </a:r>
-                    </a:p>
-                  </a:txBody>
-                  <a:tcPr/>
-                </a:tc>
-                <a:tc>
-                  <a:txBody>
-                    <a:bodyPr/>
-                    <a:lstStyle/>
-                    <a:p>
-                      <a:r>
-                        <a:rPr lang="es-CO" dirty="0"/>
-                        <a:t>RNF13</a:t>
-                      </a:r>
-                    </a:p>
-                  </a:txBody>
-                  <a:tcPr/>
-                </a:tc>
-                <a:extLst>
-                  <a:ext uri="{0D108BD9-81ED-4DB2-BD59-A6C34878D82A}">
-                    <a16:rowId xmlns:a16="http://schemas.microsoft.com/office/drawing/2014/main" val="3120795479"/>
-                  </a:ext>
-                </a:extLst>
-              </a:tr>
-              <a:tr h="370840">
-                <a:tc>
-                  <a:txBody>
-                    <a:bodyPr/>
-                    <a:lstStyle/>
-                    <a:p>
-                      <a:r>
-                        <a:rPr lang="es-CO" dirty="0"/>
-                        <a:t>Nombre del requerimiento</a:t>
-                      </a:r>
-                    </a:p>
-                  </a:txBody>
-                  <a:tcPr/>
-                </a:tc>
-                <a:tc>
-                  <a:txBody>
-                    <a:bodyPr/>
-                    <a:lstStyle/>
-                    <a:p>
-                      <a:r>
-                        <a:rPr lang="es-CO" dirty="0"/>
-                        <a:t>Durabilidad</a:t>
-                      </a:r>
-                    </a:p>
-                  </a:txBody>
-                  <a:tcPr/>
-                </a:tc>
-                <a:extLst>
-                  <a:ext uri="{0D108BD9-81ED-4DB2-BD59-A6C34878D82A}">
-                    <a16:rowId xmlns:a16="http://schemas.microsoft.com/office/drawing/2014/main" val="1343925762"/>
-                  </a:ext>
-                </a:extLst>
-              </a:tr>
-              <a:tr h="370840">
-                <a:tc>
-                  <a:txBody>
-                    <a:bodyPr/>
-                    <a:lstStyle/>
-                    <a:p>
-                      <a:r>
-                        <a:rPr lang="es-CO" dirty="0"/>
-                        <a:t>Caracterísitcas</a:t>
-                      </a:r>
-                    </a:p>
-                  </a:txBody>
-                  <a:tcPr/>
-                </a:tc>
-                <a:tc>
-                  <a:txBody>
-                    <a:bodyPr/>
-                    <a:lstStyle/>
-                    <a:p>
-                      <a:r>
-                        <a:rPr lang="es-CO" dirty="0"/>
-                        <a:t>El sistema debe funcionar, al menos, cinco años.</a:t>
-                      </a:r>
-                    </a:p>
-                  </a:txBody>
-                  <a:tcPr/>
-                </a:tc>
-                <a:extLst>
-                  <a:ext uri="{0D108BD9-81ED-4DB2-BD59-A6C34878D82A}">
-                    <a16:rowId xmlns:a16="http://schemas.microsoft.com/office/drawing/2014/main" val="769886354"/>
-                  </a:ext>
-                </a:extLst>
-              </a:tr>
-              <a:tr h="370840">
-                <a:tc>
-                  <a:txBody>
-                    <a:bodyPr/>
-                    <a:lstStyle/>
-                    <a:p>
-                      <a:r>
-                        <a:rPr lang="es-CO" dirty="0"/>
-                        <a:t>Descripción del requerimiento</a:t>
-                      </a:r>
-                    </a:p>
-                  </a:txBody>
-                  <a:tcPr/>
-                </a:tc>
-                <a:tc>
-                  <a:txBody>
-                    <a:bodyPr/>
-                    <a:lstStyle/>
-                    <a:p>
-                      <a:r>
-                        <a:rPr lang="es-CO" dirty="0"/>
-                        <a:t>El periodo de actualización del sistema será de cada cinco años.</a:t>
-                      </a:r>
-                    </a:p>
-                  </a:txBody>
-                  <a:tcPr/>
-                </a:tc>
-                <a:extLst>
-                  <a:ext uri="{0D108BD9-81ED-4DB2-BD59-A6C34878D82A}">
-                    <a16:rowId xmlns:a16="http://schemas.microsoft.com/office/drawing/2014/main" val="2397840479"/>
-                  </a:ext>
-                </a:extLst>
-              </a:tr>
-              <a:tr h="370840">
-                <a:tc>
-                  <a:txBody>
-                    <a:bodyPr/>
-                    <a:lstStyle/>
-                    <a:p>
-                      <a:r>
-                        <a:rPr lang="es-CO" dirty="0"/>
-                        <a:t>Prioridad del requerimiento</a:t>
-                      </a:r>
-                    </a:p>
-                  </a:txBody>
-                  <a:tcPr/>
-                </a:tc>
-                <a:tc>
-                  <a:txBody>
-                    <a:bodyPr/>
-                    <a:lstStyle/>
-                    <a:p>
-                      <a:r>
-                        <a:rPr lang="es-CO" dirty="0"/>
-                        <a:t>Media</a:t>
-                      </a:r>
-                    </a:p>
-                  </a:txBody>
-                  <a:tcPr/>
-                </a:tc>
-                <a:extLst>
-                  <a:ext uri="{0D108BD9-81ED-4DB2-BD59-A6C34878D82A}">
-                    <a16:rowId xmlns:a16="http://schemas.microsoft.com/office/drawing/2014/main" val="1876826554"/>
-                  </a:ext>
-                </a:extLst>
-              </a:tr>
-            </a:tbl>
-          </a:graphicData>
-        </a:graphic>
-      </p:graphicFrame>
-    </p:spTree>
-    <p:extLst>
-      <p:ext uri="{BB962C8B-B14F-4D97-AF65-F5344CB8AC3E}">
-        <p14:creationId xmlns:p14="http://schemas.microsoft.com/office/powerpoint/2010/main" val="2540038314"/>
       </p:ext>
     </p:extLst>
   </p:cSld>
@@ -27511,6 +27295,279 @@
         </p:nvGraphicFramePr>
         <p:xfrm>
           <a:off x="5118100" y="803275"/>
+          <a:ext cx="6281738" cy="3205480"/>
+        </p:xfrm>
+        <a:graphic>
+          <a:graphicData uri="http://schemas.openxmlformats.org/drawingml/2006/table">
+            <a:tbl>
+              <a:tblPr firstRow="1" bandRow="1">
+                <a:tableStyleId>{5C22544A-7EE6-4342-B048-85BDC9FD1C3A}</a:tableStyleId>
+              </a:tblPr>
+              <a:tblGrid>
+                <a:gridCol w="3140869">
+                  <a:extLst>
+                    <a:ext uri="{9D8B030D-6E8A-4147-A177-3AD203B41FA5}">
+                      <a16:colId xmlns:a16="http://schemas.microsoft.com/office/drawing/2014/main" val="2405063638"/>
+                    </a:ext>
+                  </a:extLst>
+                </a:gridCol>
+                <a:gridCol w="3140869">
+                  <a:extLst>
+                    <a:ext uri="{9D8B030D-6E8A-4147-A177-3AD203B41FA5}">
+                      <a16:colId xmlns:a16="http://schemas.microsoft.com/office/drawing/2014/main" val="3099478781"/>
+                    </a:ext>
+                  </a:extLst>
+                </a:gridCol>
+              </a:tblGrid>
+              <a:tr h="370840">
+                <a:tc>
+                  <a:txBody>
+                    <a:bodyPr/>
+                    <a:lstStyle/>
+                    <a:p>
+                      <a:r>
+                        <a:rPr lang="es-CO" dirty="0"/>
+                        <a:t>Identificación del requerimiento</a:t>
+                      </a:r>
+                    </a:p>
+                  </a:txBody>
+                  <a:tcPr/>
+                </a:tc>
+                <a:tc>
+                  <a:txBody>
+                    <a:bodyPr/>
+                    <a:lstStyle/>
+                    <a:p>
+                      <a:r>
+                        <a:rPr lang="es-CO" dirty="0"/>
+                        <a:t>RNF13</a:t>
+                      </a:r>
+                    </a:p>
+                  </a:txBody>
+                  <a:tcPr/>
+                </a:tc>
+                <a:extLst>
+                  <a:ext uri="{0D108BD9-81ED-4DB2-BD59-A6C34878D82A}">
+                    <a16:rowId xmlns:a16="http://schemas.microsoft.com/office/drawing/2014/main" val="3120795479"/>
+                  </a:ext>
+                </a:extLst>
+              </a:tr>
+              <a:tr h="370840">
+                <a:tc>
+                  <a:txBody>
+                    <a:bodyPr/>
+                    <a:lstStyle/>
+                    <a:p>
+                      <a:r>
+                        <a:rPr lang="es-CO" dirty="0"/>
+                        <a:t>Nombre del requerimiento</a:t>
+                      </a:r>
+                    </a:p>
+                  </a:txBody>
+                  <a:tcPr/>
+                </a:tc>
+                <a:tc>
+                  <a:txBody>
+                    <a:bodyPr/>
+                    <a:lstStyle/>
+                    <a:p>
+                      <a:r>
+                        <a:rPr lang="es-CO" dirty="0"/>
+                        <a:t>Durabilidad</a:t>
+                      </a:r>
+                    </a:p>
+                  </a:txBody>
+                  <a:tcPr/>
+                </a:tc>
+                <a:extLst>
+                  <a:ext uri="{0D108BD9-81ED-4DB2-BD59-A6C34878D82A}">
+                    <a16:rowId xmlns:a16="http://schemas.microsoft.com/office/drawing/2014/main" val="1343925762"/>
+                  </a:ext>
+                </a:extLst>
+              </a:tr>
+              <a:tr h="370840">
+                <a:tc>
+                  <a:txBody>
+                    <a:bodyPr/>
+                    <a:lstStyle/>
+                    <a:p>
+                      <a:r>
+                        <a:rPr lang="es-CO" dirty="0"/>
+                        <a:t>Caracterísitcas</a:t>
+                      </a:r>
+                    </a:p>
+                  </a:txBody>
+                  <a:tcPr/>
+                </a:tc>
+                <a:tc>
+                  <a:txBody>
+                    <a:bodyPr/>
+                    <a:lstStyle/>
+                    <a:p>
+                      <a:r>
+                        <a:rPr lang="es-CO" dirty="0"/>
+                        <a:t>El sistema debe funcionar, al menos, cinco años.</a:t>
+                      </a:r>
+                    </a:p>
+                  </a:txBody>
+                  <a:tcPr/>
+                </a:tc>
+                <a:extLst>
+                  <a:ext uri="{0D108BD9-81ED-4DB2-BD59-A6C34878D82A}">
+                    <a16:rowId xmlns:a16="http://schemas.microsoft.com/office/drawing/2014/main" val="769886354"/>
+                  </a:ext>
+                </a:extLst>
+              </a:tr>
+              <a:tr h="370840">
+                <a:tc>
+                  <a:txBody>
+                    <a:bodyPr/>
+                    <a:lstStyle/>
+                    <a:p>
+                      <a:r>
+                        <a:rPr lang="es-CO" dirty="0"/>
+                        <a:t>Descripción del requerimiento</a:t>
+                      </a:r>
+                    </a:p>
+                  </a:txBody>
+                  <a:tcPr/>
+                </a:tc>
+                <a:tc>
+                  <a:txBody>
+                    <a:bodyPr/>
+                    <a:lstStyle/>
+                    <a:p>
+                      <a:r>
+                        <a:rPr lang="es-CO" dirty="0"/>
+                        <a:t>El periodo de actualización del sistema será de cada cinco años.</a:t>
+                      </a:r>
+                    </a:p>
+                  </a:txBody>
+                  <a:tcPr/>
+                </a:tc>
+                <a:extLst>
+                  <a:ext uri="{0D108BD9-81ED-4DB2-BD59-A6C34878D82A}">
+                    <a16:rowId xmlns:a16="http://schemas.microsoft.com/office/drawing/2014/main" val="2397840479"/>
+                  </a:ext>
+                </a:extLst>
+              </a:tr>
+              <a:tr h="370840">
+                <a:tc>
+                  <a:txBody>
+                    <a:bodyPr/>
+                    <a:lstStyle/>
+                    <a:p>
+                      <a:r>
+                        <a:rPr lang="es-CO" dirty="0"/>
+                        <a:t>Prioridad del requerimiento</a:t>
+                      </a:r>
+                    </a:p>
+                  </a:txBody>
+                  <a:tcPr/>
+                </a:tc>
+                <a:tc>
+                  <a:txBody>
+                    <a:bodyPr/>
+                    <a:lstStyle/>
+                    <a:p>
+                      <a:r>
+                        <a:rPr lang="es-CO" dirty="0"/>
+                        <a:t>Media</a:t>
+                      </a:r>
+                    </a:p>
+                  </a:txBody>
+                  <a:tcPr/>
+                </a:tc>
+                <a:extLst>
+                  <a:ext uri="{0D108BD9-81ED-4DB2-BD59-A6C34878D82A}">
+                    <a16:rowId xmlns:a16="http://schemas.microsoft.com/office/drawing/2014/main" val="1876826554"/>
+                  </a:ext>
+                </a:extLst>
+              </a:tr>
+            </a:tbl>
+          </a:graphicData>
+        </a:graphic>
+      </p:graphicFrame>
+    </p:spTree>
+    <p:extLst>
+      <p:ext uri="{BB962C8B-B14F-4D97-AF65-F5344CB8AC3E}">
+        <p14:creationId xmlns:p14="http://schemas.microsoft.com/office/powerpoint/2010/main" val="2540038314"/>
+      </p:ext>
+    </p:extLst>
+  </p:cSld>
+  <p:clrMapOvr>
+    <a:masterClrMapping/>
+  </p:clrMapOvr>
+</p:sld>
+</file>
+
+<file path=ppt/slides/slide61.xml><?xml version="1.0" encoding="utf-8"?>
+<p:sld xmlns:a="http://schemas.openxmlformats.org/drawingml/2006/main" xmlns:r="http://schemas.openxmlformats.org/officeDocument/2006/relationships" xmlns:p="http://schemas.openxmlformats.org/presentationml/2006/main">
+  <p:cSld>
+    <p:spTree>
+      <p:nvGrpSpPr>
+        <p:cNvPr id="1" name=""/>
+        <p:cNvGrpSpPr/>
+        <p:nvPr/>
+      </p:nvGrpSpPr>
+      <p:grpSpPr>
+        <a:xfrm>
+          <a:off x="0" y="0"/>
+          <a:ext cx="0" cy="0"/>
+          <a:chOff x="0" y="0"/>
+          <a:chExt cx="0" cy="0"/>
+        </a:xfrm>
+      </p:grpSpPr>
+      <p:sp>
+        <p:nvSpPr>
+          <p:cNvPr id="2" name="Título 1">
+            <a:extLst>
+              <a:ext uri="{FF2B5EF4-FFF2-40B4-BE49-F238E27FC236}">
+                <a16:creationId xmlns:a16="http://schemas.microsoft.com/office/drawing/2014/main" id="{0DF8FDDE-7FF6-114B-95BB-26E67991BA49}"/>
+              </a:ext>
+            </a:extLst>
+          </p:cNvPr>
+          <p:cNvSpPr>
+            <a:spLocks noGrp="1"/>
+          </p:cNvSpPr>
+          <p:nvPr>
+            <p:ph type="title"/>
+          </p:nvPr>
+        </p:nvSpPr>
+        <p:spPr/>
+        <p:txBody>
+          <a:bodyPr/>
+          <a:lstStyle/>
+          <a:p>
+            <a:r>
+              <a:rPr lang="es-CO"/>
+              <a:t>Requerimientos </a:t>
+            </a:r>
+            <a:r>
+              <a:rPr lang="es-CO" dirty="0"/>
+              <a:t>no funcionales</a:t>
+            </a:r>
+          </a:p>
+        </p:txBody>
+      </p:sp>
+      <p:graphicFrame>
+        <p:nvGraphicFramePr>
+          <p:cNvPr id="4" name="Tabla 4">
+            <a:extLst>
+              <a:ext uri="{FF2B5EF4-FFF2-40B4-BE49-F238E27FC236}">
+                <a16:creationId xmlns:a16="http://schemas.microsoft.com/office/drawing/2014/main" id="{3275B20B-304D-3645-A6E7-687160D9B56D}"/>
+              </a:ext>
+            </a:extLst>
+          </p:cNvPr>
+          <p:cNvGraphicFramePr>
+            <a:graphicFrameLocks noGrp="1"/>
+          </p:cNvGraphicFramePr>
+          <p:nvPr>
+            <p:ph idx="1"/>
+          </p:nvPr>
+        </p:nvGraphicFramePr>
+        <p:xfrm>
+          <a:off x="5118100" y="803275"/>
           <a:ext cx="6281738" cy="3754120"/>
         </p:xfrm>
         <a:graphic>
@@ -27717,7 +27774,7 @@
 </p:sld>
 </file>
 
-<file path=ppt/slides/slide61.xml><?xml version="1.0" encoding="utf-8"?>
+<file path=ppt/slides/slide62.xml><?xml version="1.0" encoding="utf-8"?>
 <p:sld xmlns:a="http://schemas.openxmlformats.org/drawingml/2006/main" xmlns:r="http://schemas.openxmlformats.org/officeDocument/2006/relationships" xmlns:p="http://schemas.openxmlformats.org/presentationml/2006/main">
   <p:cSld>
     <p:spTree>
@@ -27990,7 +28047,7 @@
 </p:sld>
 </file>
 
-<file path=ppt/slides/slide62.xml><?xml version="1.0" encoding="utf-8"?>
+<file path=ppt/slides/slide63.xml><?xml version="1.0" encoding="utf-8"?>
 <p:sld xmlns:a="http://schemas.openxmlformats.org/drawingml/2006/main" xmlns:r="http://schemas.openxmlformats.org/officeDocument/2006/relationships" xmlns:p="http://schemas.openxmlformats.org/presentationml/2006/main">
   <p:cSld>
     <p:spTree>
@@ -28043,7 +28100,7 @@
 </p:sld>
 </file>
 
-<file path=ppt/slides/slide63.xml><?xml version="1.0" encoding="utf-8"?>
+<file path=ppt/slides/slide64.xml><?xml version="1.0" encoding="utf-8"?>
 <p:sld xmlns:a="http://schemas.openxmlformats.org/drawingml/2006/main" xmlns:r="http://schemas.openxmlformats.org/officeDocument/2006/relationships" xmlns:p="http://schemas.openxmlformats.org/presentationml/2006/main">
   <p:cSld>
     <p:spTree>
@@ -28096,7 +28153,7 @@
 </p:sld>
 </file>
 
-<file path=ppt/slides/slide64.xml><?xml version="1.0" encoding="utf-8"?>
+<file path=ppt/slides/slide65.xml><?xml version="1.0" encoding="utf-8"?>
 <p:sld xmlns:a="http://schemas.openxmlformats.org/drawingml/2006/main" xmlns:r="http://schemas.openxmlformats.org/officeDocument/2006/relationships" xmlns:p="http://schemas.openxmlformats.org/presentationml/2006/main">
   <p:cSld>
     <p:spTree>

</xml_diff>

<commit_message>
Doc: Caso de uso.v14-25/04/2021
Se ha corregido y agregado casos de uso al diagrama de casos de uso
</commit_message>
<xml_diff>
--- a/PLANTEAMIENTO_DEL_PROBLEMA.pptx
+++ b/PLANTEAMIENTO_DEL_PROBLEMA.pptx
@@ -1585,7 +1585,7 @@
           <a:p>
             <a:fld id="{D253BB75-C9F5-8342-9D8A-C2F31092015F}" type="datetimeFigureOut">
               <a:rPr lang="es-CO" smtClean="0"/>
-              <a:t>18/04/2021</a:t>
+              <a:t>25/04/2021</a:t>
             </a:fld>
             <a:endParaRPr lang="es-CO"/>
           </a:p>
@@ -3044,7 +3044,7 @@
           <a:p>
             <a:fld id="{D253BB75-C9F5-8342-9D8A-C2F31092015F}" type="datetimeFigureOut">
               <a:rPr lang="es-CO" smtClean="0"/>
-              <a:t>18/04/2021</a:t>
+              <a:t>25/04/2021</a:t>
             </a:fld>
             <a:endParaRPr lang="es-CO"/>
           </a:p>
@@ -4497,7 +4497,7 @@
           <a:p>
             <a:fld id="{D253BB75-C9F5-8342-9D8A-C2F31092015F}" type="datetimeFigureOut">
               <a:rPr lang="es-CO" smtClean="0"/>
-              <a:t>18/04/2021</a:t>
+              <a:t>25/04/2021</a:t>
             </a:fld>
             <a:endParaRPr lang="es-CO"/>
           </a:p>
@@ -5952,7 +5952,7 @@
           <a:p>
             <a:fld id="{D253BB75-C9F5-8342-9D8A-C2F31092015F}" type="datetimeFigureOut">
               <a:rPr lang="es-CO" smtClean="0"/>
-              <a:t>18/04/2021</a:t>
+              <a:t>25/04/2021</a:t>
             </a:fld>
             <a:endParaRPr lang="es-CO"/>
           </a:p>
@@ -7460,7 +7460,7 @@
           <a:p>
             <a:fld id="{D253BB75-C9F5-8342-9D8A-C2F31092015F}" type="datetimeFigureOut">
               <a:rPr lang="es-CO" smtClean="0"/>
-              <a:t>18/04/2021</a:t>
+              <a:t>25/04/2021</a:t>
             </a:fld>
             <a:endParaRPr lang="es-CO"/>
           </a:p>
@@ -8981,7 +8981,7 @@
           <a:p>
             <a:fld id="{D253BB75-C9F5-8342-9D8A-C2F31092015F}" type="datetimeFigureOut">
               <a:rPr lang="es-CO" smtClean="0"/>
-              <a:t>18/04/2021</a:t>
+              <a:t>25/04/2021</a:t>
             </a:fld>
             <a:endParaRPr lang="es-CO"/>
           </a:p>
@@ -10646,7 +10646,7 @@
           <a:p>
             <a:fld id="{D253BB75-C9F5-8342-9D8A-C2F31092015F}" type="datetimeFigureOut">
               <a:rPr lang="es-CO" smtClean="0"/>
-              <a:t>18/04/2021</a:t>
+              <a:t>25/04/2021</a:t>
             </a:fld>
             <a:endParaRPr lang="es-CO"/>
           </a:p>
@@ -12044,7 +12044,7 @@
           <a:p>
             <a:fld id="{D253BB75-C9F5-8342-9D8A-C2F31092015F}" type="datetimeFigureOut">
               <a:rPr lang="es-CO" smtClean="0"/>
-              <a:t>18/04/2021</a:t>
+              <a:t>25/04/2021</a:t>
             </a:fld>
             <a:endParaRPr lang="es-CO"/>
           </a:p>
@@ -12144,7 +12144,7 @@
           <a:p>
             <a:fld id="{D253BB75-C9F5-8342-9D8A-C2F31092015F}" type="datetimeFigureOut">
               <a:rPr lang="es-CO" smtClean="0"/>
-              <a:t>18/04/2021</a:t>
+              <a:t>25/04/2021</a:t>
             </a:fld>
             <a:endParaRPr lang="es-CO"/>
           </a:p>
@@ -13670,7 +13670,7 @@
           <a:p>
             <a:fld id="{D253BB75-C9F5-8342-9D8A-C2F31092015F}" type="datetimeFigureOut">
               <a:rPr lang="es-CO" smtClean="0"/>
-              <a:t>18/04/2021</a:t>
+              <a:t>25/04/2021</a:t>
             </a:fld>
             <a:endParaRPr lang="es-CO"/>
           </a:p>
@@ -15206,7 +15206,7 @@
           <a:p>
             <a:fld id="{D253BB75-C9F5-8342-9D8A-C2F31092015F}" type="datetimeFigureOut">
               <a:rPr lang="es-CO" smtClean="0"/>
-              <a:t>18/04/2021</a:t>
+              <a:t>25/04/2021</a:t>
             </a:fld>
             <a:endParaRPr lang="es-CO"/>
           </a:p>
@@ -15429,7 +15429,7 @@
           <a:p>
             <a:fld id="{D253BB75-C9F5-8342-9D8A-C2F31092015F}" type="datetimeFigureOut">
               <a:rPr lang="es-CO" smtClean="0"/>
-              <a:t>18/04/2021</a:t>
+              <a:t>25/04/2021</a:t>
             </a:fld>
             <a:endParaRPr lang="es-CO"/>
           </a:p>
@@ -17742,6 +17742,13 @@
   <p:clrMapOvr>
     <a:masterClrMapping/>
   </p:clrMapOvr>
+  <p:timing>
+    <p:tnLst>
+      <p:par>
+        <p:cTn id="1" dur="indefinite" restart="never" nodeType="tmRoot"/>
+      </p:par>
+    </p:tnLst>
+  </p:timing>
 </p:sld>
 </file>
 
@@ -17860,15 +17867,45 @@
           <a:chExt cx="0" cy="0"/>
         </a:xfrm>
       </p:grpSpPr>
+      <p:pic>
+        <p:nvPicPr>
+          <p:cNvPr id="2" name="Imagen 1"/>
+          <p:cNvPicPr>
+            <a:picLocks noChangeAspect="1"/>
+          </p:cNvPicPr>
+          <p:nvPr/>
+        </p:nvPicPr>
+        <p:blipFill>
+          <a:blip r:embed="rId2">
+            <a:extLst>
+              <a:ext uri="{28A0092B-C50C-407E-A947-70E740481C1C}">
+                <a14:useLocalDpi xmlns:a14="http://schemas.microsoft.com/office/drawing/2010/main" val="0"/>
+              </a:ext>
+            </a:extLst>
+          </a:blip>
+          <a:stretch>
+            <a:fillRect/>
+          </a:stretch>
+        </p:blipFill>
+        <p:spPr>
+          <a:xfrm>
+            <a:off x="0" y="0"/>
+            <a:ext cx="12099991" cy="6858002"/>
+          </a:xfrm>
+          <a:prstGeom prst="rect">
+            <a:avLst/>
+          </a:prstGeom>
+        </p:spPr>
+      </p:pic>
       <p:sp>
         <p:nvSpPr>
-          <p:cNvPr id="6" name="CuadroTexto 5"/>
+          <p:cNvPr id="5" name="CuadroTexto 4"/>
           <p:cNvSpPr txBox="1"/>
           <p:nvPr/>
         </p:nvSpPr>
         <p:spPr>
           <a:xfrm>
-            <a:off x="8104909" y="6581001"/>
+            <a:off x="8991600" y="6470161"/>
             <a:ext cx="3200400" cy="276999"/>
           </a:xfrm>
           <a:prstGeom prst="rect">
@@ -17903,36 +17940,6 @@
           </a:p>
         </p:txBody>
       </p:sp>
-      <p:pic>
-        <p:nvPicPr>
-          <p:cNvPr id="3" name="Imagen 2"/>
-          <p:cNvPicPr>
-            <a:picLocks noChangeAspect="1"/>
-          </p:cNvPicPr>
-          <p:nvPr/>
-        </p:nvPicPr>
-        <p:blipFill>
-          <a:blip r:embed="rId2">
-            <a:extLst>
-              <a:ext uri="{28A0092B-C50C-407E-A947-70E740481C1C}">
-                <a14:useLocalDpi xmlns:a14="http://schemas.microsoft.com/office/drawing/2010/main" val="0"/>
-              </a:ext>
-            </a:extLst>
-          </a:blip>
-          <a:stretch>
-            <a:fillRect/>
-          </a:stretch>
-        </p:blipFill>
-        <p:spPr>
-          <a:xfrm>
-            <a:off x="785812" y="96982"/>
-            <a:ext cx="10219788" cy="6373091"/>
-          </a:xfrm>
-          <a:prstGeom prst="rect">
-            <a:avLst/>
-          </a:prstGeom>
-        </p:spPr>
-      </p:pic>
     </p:spTree>
     <p:extLst>
       <p:ext uri="{BB962C8B-B14F-4D97-AF65-F5344CB8AC3E}">
@@ -17943,6 +17950,13 @@
   <p:clrMapOvr>
     <a:masterClrMapping/>
   </p:clrMapOvr>
+  <p:timing>
+    <p:tnLst>
+      <p:par>
+        <p:cTn id="1" dur="indefinite" restart="never" nodeType="tmRoot"/>
+      </p:par>
+    </p:tnLst>
+  </p:timing>
 </p:sld>
 </file>
 
@@ -18040,6 +18054,13 @@
   <p:clrMapOvr>
     <a:masterClrMapping/>
   </p:clrMapOvr>
+  <p:timing>
+    <p:tnLst>
+      <p:par>
+        <p:cTn id="1" dur="indefinite" restart="never" nodeType="tmRoot"/>
+      </p:par>
+    </p:tnLst>
+  </p:timing>
 </p:sld>
 </file>
 
@@ -18378,6 +18399,13 @@
   <p:clrMapOvr>
     <a:masterClrMapping/>
   </p:clrMapOvr>
+  <p:timing>
+    <p:tnLst>
+      <p:par>
+        <p:cTn id="1" dur="indefinite" restart="never" nodeType="tmRoot"/>
+      </p:par>
+    </p:tnLst>
+  </p:timing>
 </p:sld>
 </file>
 

</xml_diff>

<commit_message>
doc:Formato Casos de Uso Extendido.V1.22/05/2021
Se realizan los casos de uso extendido en documento Word.
</commit_message>
<xml_diff>
--- a/PLANTEAMIENTO_DEL_PROBLEMA.pptx
+++ b/PLANTEAMIENTO_DEL_PROBLEMA.pptx
@@ -41,35 +41,36 @@
     <p:sldId id="311" r:id="rId35"/>
     <p:sldId id="328" r:id="rId36"/>
     <p:sldId id="329" r:id="rId37"/>
-    <p:sldId id="330" r:id="rId38"/>
-    <p:sldId id="325" r:id="rId39"/>
-    <p:sldId id="333" r:id="rId40"/>
-    <p:sldId id="334" r:id="rId41"/>
-    <p:sldId id="335" r:id="rId42"/>
-    <p:sldId id="336" r:id="rId43"/>
-    <p:sldId id="331" r:id="rId44"/>
-    <p:sldId id="332" r:id="rId45"/>
-    <p:sldId id="337" r:id="rId46"/>
-    <p:sldId id="338" r:id="rId47"/>
-    <p:sldId id="293" r:id="rId48"/>
-    <p:sldId id="296" r:id="rId49"/>
-    <p:sldId id="339" r:id="rId50"/>
-    <p:sldId id="340" r:id="rId51"/>
-    <p:sldId id="341" r:id="rId52"/>
-    <p:sldId id="297" r:id="rId53"/>
-    <p:sldId id="299" r:id="rId54"/>
-    <p:sldId id="300" r:id="rId55"/>
-    <p:sldId id="298" r:id="rId56"/>
-    <p:sldId id="342" r:id="rId57"/>
-    <p:sldId id="343" r:id="rId58"/>
-    <p:sldId id="344" r:id="rId59"/>
-    <p:sldId id="304" r:id="rId60"/>
-    <p:sldId id="307" r:id="rId61"/>
-    <p:sldId id="308" r:id="rId62"/>
-    <p:sldId id="309" r:id="rId63"/>
-    <p:sldId id="302" r:id="rId64"/>
-    <p:sldId id="301" r:id="rId65"/>
-    <p:sldId id="303" r:id="rId66"/>
+    <p:sldId id="346" r:id="rId38"/>
+    <p:sldId id="330" r:id="rId39"/>
+    <p:sldId id="325" r:id="rId40"/>
+    <p:sldId id="333" r:id="rId41"/>
+    <p:sldId id="334" r:id="rId42"/>
+    <p:sldId id="335" r:id="rId43"/>
+    <p:sldId id="336" r:id="rId44"/>
+    <p:sldId id="331" r:id="rId45"/>
+    <p:sldId id="332" r:id="rId46"/>
+    <p:sldId id="337" r:id="rId47"/>
+    <p:sldId id="338" r:id="rId48"/>
+    <p:sldId id="293" r:id="rId49"/>
+    <p:sldId id="296" r:id="rId50"/>
+    <p:sldId id="339" r:id="rId51"/>
+    <p:sldId id="340" r:id="rId52"/>
+    <p:sldId id="341" r:id="rId53"/>
+    <p:sldId id="297" r:id="rId54"/>
+    <p:sldId id="299" r:id="rId55"/>
+    <p:sldId id="300" r:id="rId56"/>
+    <p:sldId id="298" r:id="rId57"/>
+    <p:sldId id="342" r:id="rId58"/>
+    <p:sldId id="343" r:id="rId59"/>
+    <p:sldId id="344" r:id="rId60"/>
+    <p:sldId id="304" r:id="rId61"/>
+    <p:sldId id="307" r:id="rId62"/>
+    <p:sldId id="308" r:id="rId63"/>
+    <p:sldId id="309" r:id="rId64"/>
+    <p:sldId id="302" r:id="rId65"/>
+    <p:sldId id="301" r:id="rId66"/>
+    <p:sldId id="303" r:id="rId67"/>
   </p:sldIdLst>
   <p:sldSz cx="12192000" cy="6858000"/>
   <p:notesSz cx="6858000" cy="9144000"/>
@@ -1585,7 +1586,7 @@
           <a:p>
             <a:fld id="{D253BB75-C9F5-8342-9D8A-C2F31092015F}" type="datetimeFigureOut">
               <a:rPr lang="es-CO" smtClean="0"/>
-              <a:t>22/05/2021</a:t>
+              <a:t>22/05/21</a:t>
             </a:fld>
             <a:endParaRPr lang="es-CO"/>
           </a:p>
@@ -3044,7 +3045,7 @@
           <a:p>
             <a:fld id="{D253BB75-C9F5-8342-9D8A-C2F31092015F}" type="datetimeFigureOut">
               <a:rPr lang="es-CO" smtClean="0"/>
-              <a:t>22/05/2021</a:t>
+              <a:t>22/05/21</a:t>
             </a:fld>
             <a:endParaRPr lang="es-CO"/>
           </a:p>
@@ -4497,7 +4498,7 @@
           <a:p>
             <a:fld id="{D253BB75-C9F5-8342-9D8A-C2F31092015F}" type="datetimeFigureOut">
               <a:rPr lang="es-CO" smtClean="0"/>
-              <a:t>22/05/2021</a:t>
+              <a:t>22/05/21</a:t>
             </a:fld>
             <a:endParaRPr lang="es-CO"/>
           </a:p>
@@ -5952,7 +5953,7 @@
           <a:p>
             <a:fld id="{D253BB75-C9F5-8342-9D8A-C2F31092015F}" type="datetimeFigureOut">
               <a:rPr lang="es-CO" smtClean="0"/>
-              <a:t>22/05/2021</a:t>
+              <a:t>22/05/21</a:t>
             </a:fld>
             <a:endParaRPr lang="es-CO"/>
           </a:p>
@@ -7460,7 +7461,7 @@
           <a:p>
             <a:fld id="{D253BB75-C9F5-8342-9D8A-C2F31092015F}" type="datetimeFigureOut">
               <a:rPr lang="es-CO" smtClean="0"/>
-              <a:t>22/05/2021</a:t>
+              <a:t>22/05/21</a:t>
             </a:fld>
             <a:endParaRPr lang="es-CO"/>
           </a:p>
@@ -8981,7 +8982,7 @@
           <a:p>
             <a:fld id="{D253BB75-C9F5-8342-9D8A-C2F31092015F}" type="datetimeFigureOut">
               <a:rPr lang="es-CO" smtClean="0"/>
-              <a:t>22/05/2021</a:t>
+              <a:t>22/05/21</a:t>
             </a:fld>
             <a:endParaRPr lang="es-CO"/>
           </a:p>
@@ -10646,7 +10647,7 @@
           <a:p>
             <a:fld id="{D253BB75-C9F5-8342-9D8A-C2F31092015F}" type="datetimeFigureOut">
               <a:rPr lang="es-CO" smtClean="0"/>
-              <a:t>22/05/2021</a:t>
+              <a:t>22/05/21</a:t>
             </a:fld>
             <a:endParaRPr lang="es-CO"/>
           </a:p>
@@ -12044,7 +12045,7 @@
           <a:p>
             <a:fld id="{D253BB75-C9F5-8342-9D8A-C2F31092015F}" type="datetimeFigureOut">
               <a:rPr lang="es-CO" smtClean="0"/>
-              <a:t>22/05/2021</a:t>
+              <a:t>22/05/21</a:t>
             </a:fld>
             <a:endParaRPr lang="es-CO"/>
           </a:p>
@@ -12144,7 +12145,7 @@
           <a:p>
             <a:fld id="{D253BB75-C9F5-8342-9D8A-C2F31092015F}" type="datetimeFigureOut">
               <a:rPr lang="es-CO" smtClean="0"/>
-              <a:t>22/05/2021</a:t>
+              <a:t>22/05/21</a:t>
             </a:fld>
             <a:endParaRPr lang="es-CO"/>
           </a:p>
@@ -13670,7 +13671,7 @@
           <a:p>
             <a:fld id="{D253BB75-C9F5-8342-9D8A-C2F31092015F}" type="datetimeFigureOut">
               <a:rPr lang="es-CO" smtClean="0"/>
-              <a:t>22/05/2021</a:t>
+              <a:t>22/05/21</a:t>
             </a:fld>
             <a:endParaRPr lang="es-CO"/>
           </a:p>
@@ -15206,7 +15207,7 @@
           <a:p>
             <a:fld id="{D253BB75-C9F5-8342-9D8A-C2F31092015F}" type="datetimeFigureOut">
               <a:rPr lang="es-CO" smtClean="0"/>
-              <a:t>22/05/2021</a:t>
+              <a:t>22/05/21</a:t>
             </a:fld>
             <a:endParaRPr lang="es-CO"/>
           </a:p>
@@ -15429,7 +15430,7 @@
           <a:p>
             <a:fld id="{D253BB75-C9F5-8342-9D8A-C2F31092015F}" type="datetimeFigureOut">
               <a:rPr lang="es-CO" smtClean="0"/>
-              <a:t>22/05/2021</a:t>
+              <a:t>22/05/21</a:t>
             </a:fld>
             <a:endParaRPr lang="es-CO"/>
           </a:p>
@@ -17742,13 +17743,6 @@
   <p:clrMapOvr>
     <a:masterClrMapping/>
   </p:clrMapOvr>
-  <p:timing>
-    <p:tnLst>
-      <p:par>
-        <p:cTn id="1" dur="indefinite" restart="never" nodeType="tmRoot"/>
-      </p:par>
-    </p:tnLst>
-  </p:timing>
 </p:sld>
 </file>
 
@@ -17867,36 +17861,6 @@
           <a:chExt cx="0" cy="0"/>
         </a:xfrm>
       </p:grpSpPr>
-      <p:pic>
-        <p:nvPicPr>
-          <p:cNvPr id="3" name="Imagen 2"/>
-          <p:cNvPicPr>
-            <a:picLocks noChangeAspect="1"/>
-          </p:cNvPicPr>
-          <p:nvPr/>
-        </p:nvPicPr>
-        <p:blipFill>
-          <a:blip r:embed="rId2">
-            <a:extLst>
-              <a:ext uri="{28A0092B-C50C-407E-A947-70E740481C1C}">
-                <a14:useLocalDpi xmlns:a14="http://schemas.microsoft.com/office/drawing/2010/main" val="0"/>
-              </a:ext>
-            </a:extLst>
-          </a:blip>
-          <a:stretch>
-            <a:fillRect/>
-          </a:stretch>
-        </p:blipFill>
-        <p:spPr>
-          <a:xfrm>
-            <a:off x="0" y="0"/>
-            <a:ext cx="12191999" cy="6858000"/>
-          </a:xfrm>
-          <a:prstGeom prst="rect">
-            <a:avLst/>
-          </a:prstGeom>
-        </p:spPr>
-      </p:pic>
       <p:sp>
         <p:nvSpPr>
           <p:cNvPr id="6" name="CuadroTexto 5"/>
@@ -17905,7 +17869,7 @@
         </p:nvSpPr>
         <p:spPr>
           <a:xfrm>
-            <a:off x="8991600" y="6545019"/>
+            <a:off x="8104909" y="6581001"/>
             <a:ext cx="3200400" cy="276999"/>
           </a:xfrm>
           <a:prstGeom prst="rect">
@@ -17924,21 +17888,12 @@
                 <a:latin typeface="Times New Roman" panose="02020603050405020304" pitchFamily="18" charset="0"/>
                 <a:cs typeface="Times New Roman" panose="02020603050405020304" pitchFamily="18" charset="0"/>
               </a:rPr>
-              <a:t>Fuente: </a:t>
-            </a:r>
-            <a:r>
-              <a:rPr lang="es-CO" sz="1200" dirty="0">
-                <a:latin typeface="Times New Roman" panose="02020603050405020304" pitchFamily="18" charset="0"/>
-                <a:cs typeface="Times New Roman" panose="02020603050405020304" pitchFamily="18" charset="0"/>
-                <a:hlinkClick r:id="rId3"/>
-              </a:rPr>
-              <a:t>Construcción propia en Visual </a:t>
+              <a:t>Fuente: Construcción propia en Visual </a:t>
             </a:r>
             <a:r>
               <a:rPr lang="es-CO" sz="1200" dirty="0" err="1">
                 <a:latin typeface="Times New Roman" panose="02020603050405020304" pitchFamily="18" charset="0"/>
                 <a:cs typeface="Times New Roman" panose="02020603050405020304" pitchFamily="18" charset="0"/>
-                <a:hlinkClick r:id="rId3"/>
               </a:rPr>
               <a:t>Paradigm</a:t>
             </a:r>
@@ -17949,6 +17904,36 @@
           </a:p>
         </p:txBody>
       </p:sp>
+      <p:pic>
+        <p:nvPicPr>
+          <p:cNvPr id="3" name="Imagen 2"/>
+          <p:cNvPicPr>
+            <a:picLocks noChangeAspect="1"/>
+          </p:cNvPicPr>
+          <p:nvPr/>
+        </p:nvPicPr>
+        <p:blipFill>
+          <a:blip r:embed="rId2">
+            <a:extLst>
+              <a:ext uri="{28A0092B-C50C-407E-A947-70E740481C1C}">
+                <a14:useLocalDpi xmlns:a14="http://schemas.microsoft.com/office/drawing/2010/main" val="0"/>
+              </a:ext>
+            </a:extLst>
+          </a:blip>
+          <a:stretch>
+            <a:fillRect/>
+          </a:stretch>
+        </p:blipFill>
+        <p:spPr>
+          <a:xfrm>
+            <a:off x="785812" y="96982"/>
+            <a:ext cx="10219788" cy="6373091"/>
+          </a:xfrm>
+          <a:prstGeom prst="rect">
+            <a:avLst/>
+          </a:prstGeom>
+        </p:spPr>
+      </p:pic>
     </p:spTree>
     <p:extLst>
       <p:ext uri="{BB962C8B-B14F-4D97-AF65-F5344CB8AC3E}">
@@ -17959,13 +17944,6 @@
   <p:clrMapOvr>
     <a:masterClrMapping/>
   </p:clrMapOvr>
-  <p:timing>
-    <p:tnLst>
-      <p:par>
-        <p:cTn id="1" dur="indefinite" restart="never" nodeType="tmRoot"/>
-      </p:par>
-    </p:tnLst>
-  </p:timing>
 </p:sld>
 </file>
 
@@ -18063,13 +18041,6 @@
   <p:clrMapOvr>
     <a:masterClrMapping/>
   </p:clrMapOvr>
-  <p:timing>
-    <p:tnLst>
-      <p:par>
-        <p:cTn id="1" dur="indefinite" restart="never" nodeType="tmRoot"/>
-      </p:par>
-    </p:tnLst>
-  </p:timing>
 </p:sld>
 </file>
 
@@ -18132,6 +18103,11 @@
           </p:cNvGraphicFramePr>
           <p:nvPr>
             <p:ph idx="1"/>
+            <p:extLst>
+              <p:ext uri="{D42A27DB-BD31-4B8C-83A1-F6EECF244321}">
+                <p14:modId xmlns:p14="http://schemas.microsoft.com/office/powerpoint/2010/main" val="3724057812"/>
+              </p:ext>
+            </p:extLst>
           </p:nvPr>
         </p:nvGraphicFramePr>
         <p:xfrm>
@@ -18181,7 +18157,7 @@
                     <a:p>
                       <a:r>
                         <a:rPr lang="es-CO" sz="1400" dirty="0"/>
-                        <a:t>RF01</a:t>
+                        <a:t>RF001</a:t>
                       </a:r>
                     </a:p>
                   </a:txBody>
@@ -18214,7 +18190,7 @@
                     <a:p>
                       <a:r>
                         <a:rPr lang="es-CO" sz="1400" dirty="0"/>
-                        <a:t>Ingreso de  usuario </a:t>
+                        <a:t>Ingresar al sistema </a:t>
                       </a:r>
                     </a:p>
                   </a:txBody>
@@ -18408,13 +18384,6 @@
   <p:clrMapOvr>
     <a:masterClrMapping/>
   </p:clrMapOvr>
-  <p:timing>
-    <p:tnLst>
-      <p:par>
-        <p:cTn id="1" dur="indefinite" restart="never" nodeType="tmRoot"/>
-      </p:par>
-    </p:tnLst>
-  </p:timing>
 </p:sld>
 </file>
 
@@ -18477,6 +18446,11 @@
           </p:cNvGraphicFramePr>
           <p:nvPr>
             <p:ph idx="1"/>
+            <p:extLst>
+              <p:ext uri="{D42A27DB-BD31-4B8C-83A1-F6EECF244321}">
+                <p14:modId xmlns:p14="http://schemas.microsoft.com/office/powerpoint/2010/main" val="3523325714"/>
+              </p:ext>
+            </p:extLst>
           </p:nvPr>
         </p:nvGraphicFramePr>
         <p:xfrm>
@@ -18526,7 +18500,7 @@
                     <a:p>
                       <a:r>
                         <a:rPr lang="es-CO" sz="1400" dirty="0"/>
-                        <a:t>RF02</a:t>
+                        <a:t>RF002</a:t>
                       </a:r>
                     </a:p>
                   </a:txBody>
@@ -18815,6 +18789,11 @@
           </p:cNvGraphicFramePr>
           <p:nvPr>
             <p:ph idx="1"/>
+            <p:extLst>
+              <p:ext uri="{D42A27DB-BD31-4B8C-83A1-F6EECF244321}">
+                <p14:modId xmlns:p14="http://schemas.microsoft.com/office/powerpoint/2010/main" val="3249710834"/>
+              </p:ext>
+            </p:extLst>
           </p:nvPr>
         </p:nvGraphicFramePr>
         <p:xfrm>
@@ -18864,7 +18843,7 @@
                     <a:p>
                       <a:r>
                         <a:rPr lang="es-CO" sz="1400" dirty="0"/>
-                        <a:t>RF03</a:t>
+                        <a:t>RF003</a:t>
                       </a:r>
                     </a:p>
                   </a:txBody>
@@ -19165,6 +19144,11 @@
           </p:cNvGraphicFramePr>
           <p:nvPr>
             <p:ph idx="1"/>
+            <p:extLst>
+              <p:ext uri="{D42A27DB-BD31-4B8C-83A1-F6EECF244321}">
+                <p14:modId xmlns:p14="http://schemas.microsoft.com/office/powerpoint/2010/main" val="3214936071"/>
+              </p:ext>
+            </p:extLst>
           </p:nvPr>
         </p:nvGraphicFramePr>
         <p:xfrm>
@@ -19214,7 +19198,7 @@
                     <a:p>
                       <a:r>
                         <a:rPr lang="es-CO" sz="1400" dirty="0"/>
-                        <a:t>RF04</a:t>
+                        <a:t>RF004</a:t>
                       </a:r>
                     </a:p>
                   </a:txBody>
@@ -19503,6 +19487,11 @@
           </p:cNvGraphicFramePr>
           <p:nvPr>
             <p:ph idx="1"/>
+            <p:extLst>
+              <p:ext uri="{D42A27DB-BD31-4B8C-83A1-F6EECF244321}">
+                <p14:modId xmlns:p14="http://schemas.microsoft.com/office/powerpoint/2010/main" val="3014549437"/>
+              </p:ext>
+            </p:extLst>
           </p:nvPr>
         </p:nvGraphicFramePr>
         <p:xfrm>
@@ -19552,7 +19541,7 @@
                     <a:p>
                       <a:r>
                         <a:rPr lang="es-CO" sz="1400" dirty="0"/>
-                        <a:t>RF05</a:t>
+                        <a:t>RF005</a:t>
                       </a:r>
                     </a:p>
                   </a:txBody>
@@ -19816,7 +19805,7 @@
           <p:cNvPr id="2" name="Título 1">
             <a:extLst>
               <a:ext uri="{FF2B5EF4-FFF2-40B4-BE49-F238E27FC236}">
-                <a16:creationId xmlns:a16="http://schemas.microsoft.com/office/drawing/2014/main" id="{A544CF25-2F8F-BC45-9D5E-B7214CD84D05}"/>
+                <a16:creationId xmlns:a16="http://schemas.microsoft.com/office/drawing/2014/main" id="{ADA63A5C-3352-984D-AACB-2159402FE71B}"/>
               </a:ext>
             </a:extLst>
           </p:cNvPr>
@@ -19844,7 +19833,7 @@
           <p:cNvPr id="4" name="Tabla 4">
             <a:extLst>
               <a:ext uri="{FF2B5EF4-FFF2-40B4-BE49-F238E27FC236}">
-                <a16:creationId xmlns:a16="http://schemas.microsoft.com/office/drawing/2014/main" id="{104B1BC5-C194-6A4D-BF36-86B68BC29C6E}"/>
+                <a16:creationId xmlns:a16="http://schemas.microsoft.com/office/drawing/2014/main" id="{7000E52E-6886-8F43-A5E4-226AD35C6346}"/>
               </a:ext>
             </a:extLst>
           </p:cNvPr>
@@ -19853,6 +19842,354 @@
           </p:cNvGraphicFramePr>
           <p:nvPr>
             <p:ph idx="1"/>
+            <p:extLst>
+              <p:ext uri="{D42A27DB-BD31-4B8C-83A1-F6EECF244321}">
+                <p14:modId xmlns:p14="http://schemas.microsoft.com/office/powerpoint/2010/main" val="3461044718"/>
+              </p:ext>
+            </p:extLst>
+          </p:nvPr>
+        </p:nvGraphicFramePr>
+        <p:xfrm>
+          <a:off x="5118100" y="803275"/>
+          <a:ext cx="6281738" cy="3947160"/>
+        </p:xfrm>
+        <a:graphic>
+          <a:graphicData uri="http://schemas.openxmlformats.org/drawingml/2006/table">
+            <a:tbl>
+              <a:tblPr firstRow="1" bandRow="1">
+                <a:tableStyleId>{5C22544A-7EE6-4342-B048-85BDC9FD1C3A}</a:tableStyleId>
+              </a:tblPr>
+              <a:tblGrid>
+                <a:gridCol w="3140869">
+                  <a:extLst>
+                    <a:ext uri="{9D8B030D-6E8A-4147-A177-3AD203B41FA5}">
+                      <a16:colId xmlns:a16="http://schemas.microsoft.com/office/drawing/2014/main" val="4051387547"/>
+                    </a:ext>
+                  </a:extLst>
+                </a:gridCol>
+                <a:gridCol w="3140869">
+                  <a:extLst>
+                    <a:ext uri="{9D8B030D-6E8A-4147-A177-3AD203B41FA5}">
+                      <a16:colId xmlns:a16="http://schemas.microsoft.com/office/drawing/2014/main" val="4188552159"/>
+                    </a:ext>
+                  </a:extLst>
+                </a:gridCol>
+              </a:tblGrid>
+              <a:tr h="370840">
+                <a:tc>
+                  <a:txBody>
+                    <a:bodyPr/>
+                    <a:lstStyle/>
+                    <a:p>
+                      <a:r>
+                        <a:rPr lang="es-CO" sz="1400" dirty="0"/>
+                        <a:t>Identificación del requerimiento</a:t>
+                      </a:r>
+                    </a:p>
+                  </a:txBody>
+                  <a:tcPr/>
+                </a:tc>
+                <a:tc>
+                  <a:txBody>
+                    <a:bodyPr/>
+                    <a:lstStyle/>
+                    <a:p>
+                      <a:r>
+                        <a:rPr lang="es-CO" sz="1400" dirty="0"/>
+                        <a:t>RF006</a:t>
+                      </a:r>
+                    </a:p>
+                  </a:txBody>
+                  <a:tcPr/>
+                </a:tc>
+                <a:extLst>
+                  <a:ext uri="{0D108BD9-81ED-4DB2-BD59-A6C34878D82A}">
+                    <a16:rowId xmlns:a16="http://schemas.microsoft.com/office/drawing/2014/main" val="637406872"/>
+                  </a:ext>
+                </a:extLst>
+              </a:tr>
+              <a:tr h="370840">
+                <a:tc>
+                  <a:txBody>
+                    <a:bodyPr/>
+                    <a:lstStyle/>
+                    <a:p>
+                      <a:r>
+                        <a:rPr lang="es-CO" sz="1400" dirty="0"/>
+                        <a:t>Nombre del requerimiento</a:t>
+                      </a:r>
+                    </a:p>
+                  </a:txBody>
+                  <a:tcPr/>
+                </a:tc>
+                <a:tc>
+                  <a:txBody>
+                    <a:bodyPr/>
+                    <a:lstStyle/>
+                    <a:p>
+                      <a:r>
+                        <a:rPr lang="es-CO" sz="1400" dirty="0"/>
+                        <a:t>Gestionar cursos</a:t>
+                      </a:r>
+                    </a:p>
+                  </a:txBody>
+                  <a:tcPr/>
+                </a:tc>
+                <a:extLst>
+                  <a:ext uri="{0D108BD9-81ED-4DB2-BD59-A6C34878D82A}">
+                    <a16:rowId xmlns:a16="http://schemas.microsoft.com/office/drawing/2014/main" val="185286241"/>
+                  </a:ext>
+                </a:extLst>
+              </a:tr>
+              <a:tr h="370840">
+                <a:tc>
+                  <a:txBody>
+                    <a:bodyPr/>
+                    <a:lstStyle/>
+                    <a:p>
+                      <a:r>
+                        <a:rPr lang="es-CO" sz="1400" dirty="0"/>
+                        <a:t>Características</a:t>
+                      </a:r>
+                    </a:p>
+                  </a:txBody>
+                  <a:tcPr/>
+                </a:tc>
+                <a:tc>
+                  <a:txBody>
+                    <a:bodyPr/>
+                    <a:lstStyle/>
+                    <a:p>
+                      <a:r>
+                        <a:rPr lang="es-CO" sz="1400" dirty="0"/>
+                        <a:t>El usuario administrador puede crear los cursos.</a:t>
+                      </a:r>
+                    </a:p>
+                  </a:txBody>
+                  <a:tcPr/>
+                </a:tc>
+                <a:extLst>
+                  <a:ext uri="{0D108BD9-81ED-4DB2-BD59-A6C34878D82A}">
+                    <a16:rowId xmlns:a16="http://schemas.microsoft.com/office/drawing/2014/main" val="4023864318"/>
+                  </a:ext>
+                </a:extLst>
+              </a:tr>
+              <a:tr h="370840">
+                <a:tc>
+                  <a:txBody>
+                    <a:bodyPr/>
+                    <a:lstStyle/>
+                    <a:p>
+                      <a:r>
+                        <a:rPr lang="es-CO" sz="1400" dirty="0"/>
+                        <a:t>Descripción del requerimiento</a:t>
+                      </a:r>
+                    </a:p>
+                  </a:txBody>
+                  <a:tcPr/>
+                </a:tc>
+                <a:tc>
+                  <a:txBody>
+                    <a:bodyPr/>
+                    <a:lstStyle/>
+                    <a:p>
+                      <a:r>
+                        <a:rPr lang="es-CO" sz="1400" dirty="0"/>
+                        <a:t>El sistema permitirá al usuario administrador la creación de los cursos.</a:t>
+                      </a:r>
+                    </a:p>
+                  </a:txBody>
+                  <a:tcPr/>
+                </a:tc>
+                <a:extLst>
+                  <a:ext uri="{0D108BD9-81ED-4DB2-BD59-A6C34878D82A}">
+                    <a16:rowId xmlns:a16="http://schemas.microsoft.com/office/drawing/2014/main" val="821924514"/>
+                  </a:ext>
+                </a:extLst>
+              </a:tr>
+              <a:tr h="370840">
+                <a:tc>
+                  <a:txBody>
+                    <a:bodyPr/>
+                    <a:lstStyle/>
+                    <a:p>
+                      <a:r>
+                        <a:rPr lang="es-CO" sz="1400" dirty="0"/>
+                        <a:t>Requerimientos no funcionales</a:t>
+                      </a:r>
+                    </a:p>
+                  </a:txBody>
+                  <a:tcPr/>
+                </a:tc>
+                <a:tc>
+                  <a:txBody>
+                    <a:bodyPr/>
+                    <a:lstStyle/>
+                    <a:p>
+                      <a:r>
+                        <a:rPr lang="es-CO" sz="1400" dirty="0"/>
+                        <a:t>RNF06</a:t>
+                      </a:r>
+                    </a:p>
+                    <a:p>
+                      <a:r>
+                        <a:rPr lang="es-CO" sz="1400" dirty="0"/>
+                        <a:t>RNF08</a:t>
+                      </a:r>
+                    </a:p>
+                    <a:p>
+                      <a:r>
+                        <a:rPr lang="es-CO" sz="1400" dirty="0"/>
+                        <a:t>RNF09</a:t>
+                      </a:r>
+                    </a:p>
+                    <a:p>
+                      <a:r>
+                        <a:rPr lang="es-CO" sz="1400" dirty="0"/>
+                        <a:t>RNF13</a:t>
+                      </a:r>
+                    </a:p>
+                    <a:p>
+                      <a:r>
+                        <a:rPr lang="es-CO" sz="1400" dirty="0"/>
+                        <a:t>RNF14</a:t>
+                      </a:r>
+                    </a:p>
+                    <a:p>
+                      <a:r>
+                        <a:rPr lang="es-CO" sz="1400" dirty="0"/>
+                        <a:t>RNF15</a:t>
+                      </a:r>
+                    </a:p>
+                    <a:p>
+                      <a:r>
+                        <a:rPr lang="es-CO" sz="1400" dirty="0"/>
+                        <a:t>RNF16</a:t>
+                      </a:r>
+                    </a:p>
+                  </a:txBody>
+                  <a:tcPr/>
+                </a:tc>
+                <a:extLst>
+                  <a:ext uri="{0D108BD9-81ED-4DB2-BD59-A6C34878D82A}">
+                    <a16:rowId xmlns:a16="http://schemas.microsoft.com/office/drawing/2014/main" val="2890632905"/>
+                  </a:ext>
+                </a:extLst>
+              </a:tr>
+              <a:tr h="370840">
+                <a:tc>
+                  <a:txBody>
+                    <a:bodyPr/>
+                    <a:lstStyle/>
+                    <a:p>
+                      <a:r>
+                        <a:rPr lang="es-CO" sz="1400" dirty="0"/>
+                        <a:t>Prioridad del requerimiento</a:t>
+                      </a:r>
+                    </a:p>
+                  </a:txBody>
+                  <a:tcPr/>
+                </a:tc>
+                <a:tc>
+                  <a:txBody>
+                    <a:bodyPr/>
+                    <a:lstStyle/>
+                    <a:p>
+                      <a:r>
+                        <a:rPr lang="es-CO" sz="1400" dirty="0"/>
+                        <a:t>Alta</a:t>
+                      </a:r>
+                    </a:p>
+                  </a:txBody>
+                  <a:tcPr/>
+                </a:tc>
+                <a:extLst>
+                  <a:ext uri="{0D108BD9-81ED-4DB2-BD59-A6C34878D82A}">
+                    <a16:rowId xmlns:a16="http://schemas.microsoft.com/office/drawing/2014/main" val="1092200181"/>
+                  </a:ext>
+                </a:extLst>
+              </a:tr>
+            </a:tbl>
+          </a:graphicData>
+        </a:graphic>
+      </p:graphicFrame>
+    </p:spTree>
+    <p:extLst>
+      <p:ext uri="{BB962C8B-B14F-4D97-AF65-F5344CB8AC3E}">
+        <p14:creationId xmlns:p14="http://schemas.microsoft.com/office/powerpoint/2010/main" val="3527941286"/>
+      </p:ext>
+    </p:extLst>
+  </p:cSld>
+  <p:clrMapOvr>
+    <a:masterClrMapping/>
+  </p:clrMapOvr>
+</p:sld>
+</file>
+
+<file path=ppt/slides/slide38.xml><?xml version="1.0" encoding="utf-8"?>
+<p:sld xmlns:a="http://schemas.openxmlformats.org/drawingml/2006/main" xmlns:r="http://schemas.openxmlformats.org/officeDocument/2006/relationships" xmlns:p="http://schemas.openxmlformats.org/presentationml/2006/main">
+  <p:cSld>
+    <p:spTree>
+      <p:nvGrpSpPr>
+        <p:cNvPr id="1" name=""/>
+        <p:cNvGrpSpPr/>
+        <p:nvPr/>
+      </p:nvGrpSpPr>
+      <p:grpSpPr>
+        <a:xfrm>
+          <a:off x="0" y="0"/>
+          <a:ext cx="0" cy="0"/>
+          <a:chOff x="0" y="0"/>
+          <a:chExt cx="0" cy="0"/>
+        </a:xfrm>
+      </p:grpSpPr>
+      <p:sp>
+        <p:nvSpPr>
+          <p:cNvPr id="2" name="Título 1">
+            <a:extLst>
+              <a:ext uri="{FF2B5EF4-FFF2-40B4-BE49-F238E27FC236}">
+                <a16:creationId xmlns:a16="http://schemas.microsoft.com/office/drawing/2014/main" id="{A544CF25-2F8F-BC45-9D5E-B7214CD84D05}"/>
+              </a:ext>
+            </a:extLst>
+          </p:cNvPr>
+          <p:cNvSpPr>
+            <a:spLocks noGrp="1"/>
+          </p:cNvSpPr>
+          <p:nvPr>
+            <p:ph type="title"/>
+          </p:nvPr>
+        </p:nvSpPr>
+        <p:spPr/>
+        <p:txBody>
+          <a:bodyPr/>
+          <a:lstStyle/>
+          <a:p>
+            <a:r>
+              <a:rPr lang="es-CO" dirty="0"/>
+              <a:t>Requerimientos funcionales</a:t>
+            </a:r>
+          </a:p>
+        </p:txBody>
+      </p:sp>
+      <p:graphicFrame>
+        <p:nvGraphicFramePr>
+          <p:cNvPr id="4" name="Tabla 4">
+            <a:extLst>
+              <a:ext uri="{FF2B5EF4-FFF2-40B4-BE49-F238E27FC236}">
+                <a16:creationId xmlns:a16="http://schemas.microsoft.com/office/drawing/2014/main" id="{104B1BC5-C194-6A4D-BF36-86B68BC29C6E}"/>
+              </a:ext>
+            </a:extLst>
+          </p:cNvPr>
+          <p:cNvGraphicFramePr>
+            <a:graphicFrameLocks noGrp="1"/>
+          </p:cNvGraphicFramePr>
+          <p:nvPr>
+            <p:ph idx="1"/>
+            <p:extLst>
+              <p:ext uri="{D42A27DB-BD31-4B8C-83A1-F6EECF244321}">
+                <p14:modId xmlns:p14="http://schemas.microsoft.com/office/powerpoint/2010/main" val="4293041513"/>
+              </p:ext>
+            </p:extLst>
           </p:nvPr>
         </p:nvGraphicFramePr>
         <p:xfrm>
@@ -19902,7 +20239,7 @@
                     <a:p>
                       <a:r>
                         <a:rPr lang="es-CO" sz="1400" dirty="0"/>
-                        <a:t>RF06</a:t>
+                        <a:t>RF007</a:t>
                       </a:r>
                     </a:p>
                   </a:txBody>
@@ -20164,7 +20501,7 @@
 </p:sld>
 </file>
 
-<file path=ppt/slides/slide38.xml><?xml version="1.0" encoding="utf-8"?>
+<file path=ppt/slides/slide39.xml><?xml version="1.0" encoding="utf-8"?>
 <p:sld xmlns:a="http://schemas.openxmlformats.org/drawingml/2006/main" xmlns:r="http://schemas.openxmlformats.org/officeDocument/2006/relationships" xmlns:p="http://schemas.openxmlformats.org/presentationml/2006/main">
   <p:cSld>
     <p:spTree>
@@ -20223,6 +20560,11 @@
           </p:cNvGraphicFramePr>
           <p:nvPr>
             <p:ph idx="1"/>
+            <p:extLst>
+              <p:ext uri="{D42A27DB-BD31-4B8C-83A1-F6EECF244321}">
+                <p14:modId xmlns:p14="http://schemas.microsoft.com/office/powerpoint/2010/main" val="3090622858"/>
+              </p:ext>
+            </p:extLst>
           </p:nvPr>
         </p:nvGraphicFramePr>
         <p:xfrm>
@@ -20272,7 +20614,7 @@
                     <a:p>
                       <a:r>
                         <a:rPr lang="es-CO" sz="1400" dirty="0"/>
-                        <a:t>RF07</a:t>
+                        <a:t>RF008</a:t>
                       </a:r>
                     </a:p>
                   </a:txBody>
@@ -20525,376 +20867,6 @@
     <p:extLst>
       <p:ext uri="{BB962C8B-B14F-4D97-AF65-F5344CB8AC3E}">
         <p14:creationId xmlns:p14="http://schemas.microsoft.com/office/powerpoint/2010/main" val="3573408142"/>
-      </p:ext>
-    </p:extLst>
-  </p:cSld>
-  <p:clrMapOvr>
-    <a:masterClrMapping/>
-  </p:clrMapOvr>
-</p:sld>
-</file>
-
-<file path=ppt/slides/slide39.xml><?xml version="1.0" encoding="utf-8"?>
-<p:sld xmlns:a="http://schemas.openxmlformats.org/drawingml/2006/main" xmlns:r="http://schemas.openxmlformats.org/officeDocument/2006/relationships" xmlns:p="http://schemas.openxmlformats.org/presentationml/2006/main">
-  <p:cSld>
-    <p:spTree>
-      <p:nvGrpSpPr>
-        <p:cNvPr id="1" name=""/>
-        <p:cNvGrpSpPr/>
-        <p:nvPr/>
-      </p:nvGrpSpPr>
-      <p:grpSpPr>
-        <a:xfrm>
-          <a:off x="0" y="0"/>
-          <a:ext cx="0" cy="0"/>
-          <a:chOff x="0" y="0"/>
-          <a:chExt cx="0" cy="0"/>
-        </a:xfrm>
-      </p:grpSpPr>
-      <p:sp>
-        <p:nvSpPr>
-          <p:cNvPr id="2" name="Título 1">
-            <a:extLst>
-              <a:ext uri="{FF2B5EF4-FFF2-40B4-BE49-F238E27FC236}">
-                <a16:creationId xmlns:a16="http://schemas.microsoft.com/office/drawing/2014/main" id="{A544CF25-2F8F-BC45-9D5E-B7214CD84D05}"/>
-              </a:ext>
-            </a:extLst>
-          </p:cNvPr>
-          <p:cNvSpPr>
-            <a:spLocks noGrp="1"/>
-          </p:cNvSpPr>
-          <p:nvPr>
-            <p:ph type="title"/>
-          </p:nvPr>
-        </p:nvSpPr>
-        <p:spPr/>
-        <p:txBody>
-          <a:bodyPr/>
-          <a:lstStyle/>
-          <a:p>
-            <a:r>
-              <a:rPr lang="es-CO" dirty="0"/>
-              <a:t>Requerimientos funcionales</a:t>
-            </a:r>
-          </a:p>
-        </p:txBody>
-      </p:sp>
-      <p:graphicFrame>
-        <p:nvGraphicFramePr>
-          <p:cNvPr id="4" name="Tabla 4">
-            <a:extLst>
-              <a:ext uri="{FF2B5EF4-FFF2-40B4-BE49-F238E27FC236}">
-                <a16:creationId xmlns:a16="http://schemas.microsoft.com/office/drawing/2014/main" id="{104B1BC5-C194-6A4D-BF36-86B68BC29C6E}"/>
-              </a:ext>
-            </a:extLst>
-          </p:cNvPr>
-          <p:cNvGraphicFramePr>
-            <a:graphicFrameLocks noGrp="1"/>
-          </p:cNvGraphicFramePr>
-          <p:nvPr>
-            <p:ph idx="1"/>
-          </p:nvPr>
-        </p:nvGraphicFramePr>
-        <p:xfrm>
-          <a:off x="5118100" y="803275"/>
-          <a:ext cx="6281738" cy="4800600"/>
-        </p:xfrm>
-        <a:graphic>
-          <a:graphicData uri="http://schemas.openxmlformats.org/drawingml/2006/table">
-            <a:tbl>
-              <a:tblPr firstRow="1" bandRow="1">
-                <a:tableStyleId>{5C22544A-7EE6-4342-B048-85BDC9FD1C3A}</a:tableStyleId>
-              </a:tblPr>
-              <a:tblGrid>
-                <a:gridCol w="3140869">
-                  <a:extLst>
-                    <a:ext uri="{9D8B030D-6E8A-4147-A177-3AD203B41FA5}">
-                      <a16:colId xmlns:a16="http://schemas.microsoft.com/office/drawing/2014/main" val="1589146686"/>
-                    </a:ext>
-                  </a:extLst>
-                </a:gridCol>
-                <a:gridCol w="3140869">
-                  <a:extLst>
-                    <a:ext uri="{9D8B030D-6E8A-4147-A177-3AD203B41FA5}">
-                      <a16:colId xmlns:a16="http://schemas.microsoft.com/office/drawing/2014/main" val="1463651238"/>
-                    </a:ext>
-                  </a:extLst>
-                </a:gridCol>
-              </a:tblGrid>
-              <a:tr h="370840">
-                <a:tc>
-                  <a:txBody>
-                    <a:bodyPr/>
-                    <a:lstStyle/>
-                    <a:p>
-                      <a:r>
-                        <a:rPr lang="es-CO" sz="1400" dirty="0"/>
-                        <a:t>Identificación del requerimiento</a:t>
-                      </a:r>
-                    </a:p>
-                  </a:txBody>
-                  <a:tcPr/>
-                </a:tc>
-                <a:tc>
-                  <a:txBody>
-                    <a:bodyPr/>
-                    <a:lstStyle/>
-                    <a:p>
-                      <a:r>
-                        <a:rPr lang="es-CO" sz="1400" dirty="0"/>
-                        <a:t>RF08</a:t>
-                      </a:r>
-                    </a:p>
-                  </a:txBody>
-                  <a:tcPr/>
-                </a:tc>
-                <a:extLst>
-                  <a:ext uri="{0D108BD9-81ED-4DB2-BD59-A6C34878D82A}">
-                    <a16:rowId xmlns:a16="http://schemas.microsoft.com/office/drawing/2014/main" val="3568786682"/>
-                  </a:ext>
-                </a:extLst>
-              </a:tr>
-              <a:tr h="370840">
-                <a:tc>
-                  <a:txBody>
-                    <a:bodyPr/>
-                    <a:lstStyle/>
-                    <a:p>
-                      <a:r>
-                        <a:rPr lang="es-CO" sz="1400" dirty="0"/>
-                        <a:t>Nombre del requerimiento</a:t>
-                      </a:r>
-                    </a:p>
-                  </a:txBody>
-                  <a:tcPr/>
-                </a:tc>
-                <a:tc>
-                  <a:txBody>
-                    <a:bodyPr/>
-                    <a:lstStyle/>
-                    <a:p>
-                      <a:r>
-                        <a:rPr lang="es-CO" sz="1400" dirty="0"/>
-                        <a:t>Filtrar información</a:t>
-                      </a:r>
-                    </a:p>
-                  </a:txBody>
-                  <a:tcPr/>
-                </a:tc>
-                <a:extLst>
-                  <a:ext uri="{0D108BD9-81ED-4DB2-BD59-A6C34878D82A}">
-                    <a16:rowId xmlns:a16="http://schemas.microsoft.com/office/drawing/2014/main" val="2616514354"/>
-                  </a:ext>
-                </a:extLst>
-              </a:tr>
-              <a:tr h="370840">
-                <a:tc>
-                  <a:txBody>
-                    <a:bodyPr/>
-                    <a:lstStyle/>
-                    <a:p>
-                      <a:r>
-                        <a:rPr lang="es-CO" sz="1400" dirty="0"/>
-                        <a:t>Características</a:t>
-                      </a:r>
-                    </a:p>
-                  </a:txBody>
-                  <a:tcPr/>
-                </a:tc>
-                <a:tc>
-                  <a:txBody>
-                    <a:bodyPr/>
-                    <a:lstStyle/>
-                    <a:p>
-                      <a:r>
-                        <a:rPr lang="es-CO" sz="1400" dirty="0"/>
-                        <a:t>El usuario especificar el tipo de información a la cual quiere acceder.</a:t>
-                      </a:r>
-                    </a:p>
-                  </a:txBody>
-                  <a:tcPr/>
-                </a:tc>
-                <a:extLst>
-                  <a:ext uri="{0D108BD9-81ED-4DB2-BD59-A6C34878D82A}">
-                    <a16:rowId xmlns:a16="http://schemas.microsoft.com/office/drawing/2014/main" val="1942680024"/>
-                  </a:ext>
-                </a:extLst>
-              </a:tr>
-              <a:tr h="370840">
-                <a:tc>
-                  <a:txBody>
-                    <a:bodyPr/>
-                    <a:lstStyle/>
-                    <a:p>
-                      <a:r>
-                        <a:rPr lang="es-CO" sz="1400" dirty="0"/>
-                        <a:t>Descripción del requerimiento</a:t>
-                      </a:r>
-                    </a:p>
-                  </a:txBody>
-                  <a:tcPr/>
-                </a:tc>
-                <a:tc>
-                  <a:txBody>
-                    <a:bodyPr/>
-                    <a:lstStyle/>
-                    <a:p>
-                      <a:pPr marL="0" marR="0" lvl="0" indent="0" algn="l" defTabSz="914400" rtl="0" eaLnBrk="1" fontAlgn="auto" latinLnBrk="0" hangingPunct="1">
-                        <a:lnSpc>
-                          <a:spcPct val="100000"/>
-                        </a:lnSpc>
-                        <a:spcBef>
-                          <a:spcPts val="0"/>
-                        </a:spcBef>
-                        <a:spcAft>
-                          <a:spcPts val="0"/>
-                        </a:spcAft>
-                        <a:buClrTx/>
-                        <a:buSzTx/>
-                        <a:buFontTx/>
-                        <a:buNone/>
-                        <a:tabLst/>
-                        <a:defRPr/>
-                      </a:pPr>
-                      <a:r>
-                        <a:rPr lang="es-CO" sz="1400" dirty="0"/>
-                        <a:t>El sistema permite al usuario la búsqueda de información específica según el interés de este.</a:t>
-                      </a:r>
-                    </a:p>
-                    <a:p>
-                      <a:endParaRPr lang="es-CO" sz="1400" dirty="0"/>
-                    </a:p>
-                  </a:txBody>
-                  <a:tcPr/>
-                </a:tc>
-                <a:extLst>
-                  <a:ext uri="{0D108BD9-81ED-4DB2-BD59-A6C34878D82A}">
-                    <a16:rowId xmlns:a16="http://schemas.microsoft.com/office/drawing/2014/main" val="2968710298"/>
-                  </a:ext>
-                </a:extLst>
-              </a:tr>
-              <a:tr h="370840">
-                <a:tc>
-                  <a:txBody>
-                    <a:bodyPr/>
-                    <a:lstStyle/>
-                    <a:p>
-                      <a:r>
-                        <a:rPr lang="es-CO" sz="1400" dirty="0"/>
-                        <a:t>Requerimientos no funcionales</a:t>
-                      </a:r>
-                    </a:p>
-                  </a:txBody>
-                  <a:tcPr/>
-                </a:tc>
-                <a:tc>
-                  <a:txBody>
-                    <a:bodyPr/>
-                    <a:lstStyle/>
-                    <a:p>
-                      <a:r>
-                        <a:rPr lang="es-CO" sz="1400" dirty="0"/>
-                        <a:t>RNF01</a:t>
-                      </a:r>
-                    </a:p>
-                    <a:p>
-                      <a:r>
-                        <a:rPr lang="es-CO" sz="1400" dirty="0"/>
-                        <a:t>RNF08</a:t>
-                      </a:r>
-                    </a:p>
-                    <a:p>
-                      <a:r>
-                        <a:rPr lang="es-CO" sz="1400" dirty="0"/>
-                        <a:t>RNF09</a:t>
-                      </a:r>
-                    </a:p>
-                    <a:p>
-                      <a:r>
-                        <a:rPr lang="es-CO" sz="1400" dirty="0"/>
-                        <a:t>RNF10</a:t>
-                      </a:r>
-                    </a:p>
-                    <a:p>
-                      <a:r>
-                        <a:rPr lang="es-CO" sz="1400" dirty="0"/>
-                        <a:t>RNF11</a:t>
-                      </a:r>
-                    </a:p>
-                    <a:p>
-                      <a:r>
-                        <a:rPr lang="es-CO" sz="1400" dirty="0"/>
-                        <a:t>RNF13</a:t>
-                      </a:r>
-                    </a:p>
-                    <a:p>
-                      <a:r>
-                        <a:rPr lang="es-CO" sz="1400" dirty="0"/>
-                        <a:t>RNF14</a:t>
-                      </a:r>
-                    </a:p>
-                    <a:p>
-                      <a:r>
-                        <a:rPr lang="es-CO" sz="1400" dirty="0"/>
-                        <a:t>RNF15</a:t>
-                      </a:r>
-                    </a:p>
-                    <a:p>
-                      <a:r>
-                        <a:rPr lang="es-CO" sz="1400" dirty="0"/>
-                        <a:t>RNF16</a:t>
-                      </a:r>
-                    </a:p>
-                  </a:txBody>
-                  <a:tcPr/>
-                </a:tc>
-                <a:extLst>
-                  <a:ext uri="{0D108BD9-81ED-4DB2-BD59-A6C34878D82A}">
-                    <a16:rowId xmlns:a16="http://schemas.microsoft.com/office/drawing/2014/main" val="302045704"/>
-                  </a:ext>
-                </a:extLst>
-              </a:tr>
-              <a:tr h="370840">
-                <a:tc>
-                  <a:txBody>
-                    <a:bodyPr/>
-                    <a:lstStyle/>
-                    <a:p>
-                      <a:r>
-                        <a:rPr lang="es-CO" sz="1400" dirty="0"/>
-                        <a:t>Prioridad del requerimiento</a:t>
-                      </a:r>
-                    </a:p>
-                  </a:txBody>
-                  <a:tcPr/>
-                </a:tc>
-                <a:tc>
-                  <a:txBody>
-                    <a:bodyPr/>
-                    <a:lstStyle/>
-                    <a:p>
-                      <a:r>
-                        <a:rPr lang="es-CO" sz="1400" dirty="0"/>
-                        <a:t>Alta</a:t>
-                      </a:r>
-                    </a:p>
-                  </a:txBody>
-                  <a:tcPr/>
-                </a:tc>
-                <a:extLst>
-                  <a:ext uri="{0D108BD9-81ED-4DB2-BD59-A6C34878D82A}">
-                    <a16:rowId xmlns:a16="http://schemas.microsoft.com/office/drawing/2014/main" val="2916724385"/>
-                  </a:ext>
-                </a:extLst>
-              </a:tr>
-            </a:tbl>
-          </a:graphicData>
-        </a:graphic>
-      </p:graphicFrame>
-    </p:spTree>
-    <p:extLst>
-      <p:ext uri="{BB962C8B-B14F-4D97-AF65-F5344CB8AC3E}">
-        <p14:creationId xmlns:p14="http://schemas.microsoft.com/office/powerpoint/2010/main" val="2645603914"/>
       </p:ext>
     </p:extLst>
   </p:cSld>
@@ -21072,6 +21044,386 @@
           </p:cNvGraphicFramePr>
           <p:nvPr>
             <p:ph idx="1"/>
+            <p:extLst>
+              <p:ext uri="{D42A27DB-BD31-4B8C-83A1-F6EECF244321}">
+                <p14:modId xmlns:p14="http://schemas.microsoft.com/office/powerpoint/2010/main" val="942110947"/>
+              </p:ext>
+            </p:extLst>
+          </p:nvPr>
+        </p:nvGraphicFramePr>
+        <p:xfrm>
+          <a:off x="5118100" y="803275"/>
+          <a:ext cx="6281738" cy="4800600"/>
+        </p:xfrm>
+        <a:graphic>
+          <a:graphicData uri="http://schemas.openxmlformats.org/drawingml/2006/table">
+            <a:tbl>
+              <a:tblPr firstRow="1" bandRow="1">
+                <a:tableStyleId>{5C22544A-7EE6-4342-B048-85BDC9FD1C3A}</a:tableStyleId>
+              </a:tblPr>
+              <a:tblGrid>
+                <a:gridCol w="3140869">
+                  <a:extLst>
+                    <a:ext uri="{9D8B030D-6E8A-4147-A177-3AD203B41FA5}">
+                      <a16:colId xmlns:a16="http://schemas.microsoft.com/office/drawing/2014/main" val="1589146686"/>
+                    </a:ext>
+                  </a:extLst>
+                </a:gridCol>
+                <a:gridCol w="3140869">
+                  <a:extLst>
+                    <a:ext uri="{9D8B030D-6E8A-4147-A177-3AD203B41FA5}">
+                      <a16:colId xmlns:a16="http://schemas.microsoft.com/office/drawing/2014/main" val="1463651238"/>
+                    </a:ext>
+                  </a:extLst>
+                </a:gridCol>
+              </a:tblGrid>
+              <a:tr h="370840">
+                <a:tc>
+                  <a:txBody>
+                    <a:bodyPr/>
+                    <a:lstStyle/>
+                    <a:p>
+                      <a:r>
+                        <a:rPr lang="es-CO" sz="1400" dirty="0"/>
+                        <a:t>Identificación del requerimiento</a:t>
+                      </a:r>
+                    </a:p>
+                  </a:txBody>
+                  <a:tcPr/>
+                </a:tc>
+                <a:tc>
+                  <a:txBody>
+                    <a:bodyPr/>
+                    <a:lstStyle/>
+                    <a:p>
+                      <a:r>
+                        <a:rPr lang="es-CO" sz="1400" dirty="0"/>
+                        <a:t>RF009</a:t>
+                      </a:r>
+                    </a:p>
+                  </a:txBody>
+                  <a:tcPr/>
+                </a:tc>
+                <a:extLst>
+                  <a:ext uri="{0D108BD9-81ED-4DB2-BD59-A6C34878D82A}">
+                    <a16:rowId xmlns:a16="http://schemas.microsoft.com/office/drawing/2014/main" val="3568786682"/>
+                  </a:ext>
+                </a:extLst>
+              </a:tr>
+              <a:tr h="370840">
+                <a:tc>
+                  <a:txBody>
+                    <a:bodyPr/>
+                    <a:lstStyle/>
+                    <a:p>
+                      <a:r>
+                        <a:rPr lang="es-CO" sz="1400" dirty="0"/>
+                        <a:t>Nombre del requerimiento</a:t>
+                      </a:r>
+                    </a:p>
+                  </a:txBody>
+                  <a:tcPr/>
+                </a:tc>
+                <a:tc>
+                  <a:txBody>
+                    <a:bodyPr/>
+                    <a:lstStyle/>
+                    <a:p>
+                      <a:r>
+                        <a:rPr lang="es-CO" sz="1400" dirty="0"/>
+                        <a:t>Filtrar información</a:t>
+                      </a:r>
+                    </a:p>
+                  </a:txBody>
+                  <a:tcPr/>
+                </a:tc>
+                <a:extLst>
+                  <a:ext uri="{0D108BD9-81ED-4DB2-BD59-A6C34878D82A}">
+                    <a16:rowId xmlns:a16="http://schemas.microsoft.com/office/drawing/2014/main" val="2616514354"/>
+                  </a:ext>
+                </a:extLst>
+              </a:tr>
+              <a:tr h="370840">
+                <a:tc>
+                  <a:txBody>
+                    <a:bodyPr/>
+                    <a:lstStyle/>
+                    <a:p>
+                      <a:r>
+                        <a:rPr lang="es-CO" sz="1400" dirty="0"/>
+                        <a:t>Características</a:t>
+                      </a:r>
+                    </a:p>
+                  </a:txBody>
+                  <a:tcPr/>
+                </a:tc>
+                <a:tc>
+                  <a:txBody>
+                    <a:bodyPr/>
+                    <a:lstStyle/>
+                    <a:p>
+                      <a:r>
+                        <a:rPr lang="es-CO" sz="1400" dirty="0"/>
+                        <a:t>El usuario especificar el tipo de información a la cual quiere acceder.</a:t>
+                      </a:r>
+                    </a:p>
+                  </a:txBody>
+                  <a:tcPr/>
+                </a:tc>
+                <a:extLst>
+                  <a:ext uri="{0D108BD9-81ED-4DB2-BD59-A6C34878D82A}">
+                    <a16:rowId xmlns:a16="http://schemas.microsoft.com/office/drawing/2014/main" val="1942680024"/>
+                  </a:ext>
+                </a:extLst>
+              </a:tr>
+              <a:tr h="370840">
+                <a:tc>
+                  <a:txBody>
+                    <a:bodyPr/>
+                    <a:lstStyle/>
+                    <a:p>
+                      <a:r>
+                        <a:rPr lang="es-CO" sz="1400" dirty="0"/>
+                        <a:t>Descripción del requerimiento</a:t>
+                      </a:r>
+                    </a:p>
+                  </a:txBody>
+                  <a:tcPr/>
+                </a:tc>
+                <a:tc>
+                  <a:txBody>
+                    <a:bodyPr/>
+                    <a:lstStyle/>
+                    <a:p>
+                      <a:pPr marL="0" marR="0" lvl="0" indent="0" algn="l" defTabSz="914400" rtl="0" eaLnBrk="1" fontAlgn="auto" latinLnBrk="0" hangingPunct="1">
+                        <a:lnSpc>
+                          <a:spcPct val="100000"/>
+                        </a:lnSpc>
+                        <a:spcBef>
+                          <a:spcPts val="0"/>
+                        </a:spcBef>
+                        <a:spcAft>
+                          <a:spcPts val="0"/>
+                        </a:spcAft>
+                        <a:buClrTx/>
+                        <a:buSzTx/>
+                        <a:buFontTx/>
+                        <a:buNone/>
+                        <a:tabLst/>
+                        <a:defRPr/>
+                      </a:pPr>
+                      <a:r>
+                        <a:rPr lang="es-CO" sz="1400" dirty="0"/>
+                        <a:t>El sistema permite al usuario la búsqueda de información específica según el interés de este.</a:t>
+                      </a:r>
+                    </a:p>
+                    <a:p>
+                      <a:endParaRPr lang="es-CO" sz="1400" dirty="0"/>
+                    </a:p>
+                  </a:txBody>
+                  <a:tcPr/>
+                </a:tc>
+                <a:extLst>
+                  <a:ext uri="{0D108BD9-81ED-4DB2-BD59-A6C34878D82A}">
+                    <a16:rowId xmlns:a16="http://schemas.microsoft.com/office/drawing/2014/main" val="2968710298"/>
+                  </a:ext>
+                </a:extLst>
+              </a:tr>
+              <a:tr h="370840">
+                <a:tc>
+                  <a:txBody>
+                    <a:bodyPr/>
+                    <a:lstStyle/>
+                    <a:p>
+                      <a:r>
+                        <a:rPr lang="es-CO" sz="1400" dirty="0"/>
+                        <a:t>Requerimientos no funcionales</a:t>
+                      </a:r>
+                    </a:p>
+                  </a:txBody>
+                  <a:tcPr/>
+                </a:tc>
+                <a:tc>
+                  <a:txBody>
+                    <a:bodyPr/>
+                    <a:lstStyle/>
+                    <a:p>
+                      <a:r>
+                        <a:rPr lang="es-CO" sz="1400" dirty="0"/>
+                        <a:t>RNF01</a:t>
+                      </a:r>
+                    </a:p>
+                    <a:p>
+                      <a:r>
+                        <a:rPr lang="es-CO" sz="1400" dirty="0"/>
+                        <a:t>RNF08</a:t>
+                      </a:r>
+                    </a:p>
+                    <a:p>
+                      <a:r>
+                        <a:rPr lang="es-CO" sz="1400" dirty="0"/>
+                        <a:t>RNF09</a:t>
+                      </a:r>
+                    </a:p>
+                    <a:p>
+                      <a:r>
+                        <a:rPr lang="es-CO" sz="1400" dirty="0"/>
+                        <a:t>RNF10</a:t>
+                      </a:r>
+                    </a:p>
+                    <a:p>
+                      <a:r>
+                        <a:rPr lang="es-CO" sz="1400" dirty="0"/>
+                        <a:t>RNF11</a:t>
+                      </a:r>
+                    </a:p>
+                    <a:p>
+                      <a:r>
+                        <a:rPr lang="es-CO" sz="1400" dirty="0"/>
+                        <a:t>RNF13</a:t>
+                      </a:r>
+                    </a:p>
+                    <a:p>
+                      <a:r>
+                        <a:rPr lang="es-CO" sz="1400" dirty="0"/>
+                        <a:t>RNF14</a:t>
+                      </a:r>
+                    </a:p>
+                    <a:p>
+                      <a:r>
+                        <a:rPr lang="es-CO" sz="1400" dirty="0"/>
+                        <a:t>RNF15</a:t>
+                      </a:r>
+                    </a:p>
+                    <a:p>
+                      <a:r>
+                        <a:rPr lang="es-CO" sz="1400" dirty="0"/>
+                        <a:t>RNF16</a:t>
+                      </a:r>
+                    </a:p>
+                  </a:txBody>
+                  <a:tcPr/>
+                </a:tc>
+                <a:extLst>
+                  <a:ext uri="{0D108BD9-81ED-4DB2-BD59-A6C34878D82A}">
+                    <a16:rowId xmlns:a16="http://schemas.microsoft.com/office/drawing/2014/main" val="302045704"/>
+                  </a:ext>
+                </a:extLst>
+              </a:tr>
+              <a:tr h="370840">
+                <a:tc>
+                  <a:txBody>
+                    <a:bodyPr/>
+                    <a:lstStyle/>
+                    <a:p>
+                      <a:r>
+                        <a:rPr lang="es-CO" sz="1400" dirty="0"/>
+                        <a:t>Prioridad del requerimiento</a:t>
+                      </a:r>
+                    </a:p>
+                  </a:txBody>
+                  <a:tcPr/>
+                </a:tc>
+                <a:tc>
+                  <a:txBody>
+                    <a:bodyPr/>
+                    <a:lstStyle/>
+                    <a:p>
+                      <a:r>
+                        <a:rPr lang="es-CO" sz="1400" dirty="0"/>
+                        <a:t>Alta</a:t>
+                      </a:r>
+                    </a:p>
+                  </a:txBody>
+                  <a:tcPr/>
+                </a:tc>
+                <a:extLst>
+                  <a:ext uri="{0D108BD9-81ED-4DB2-BD59-A6C34878D82A}">
+                    <a16:rowId xmlns:a16="http://schemas.microsoft.com/office/drawing/2014/main" val="2916724385"/>
+                  </a:ext>
+                </a:extLst>
+              </a:tr>
+            </a:tbl>
+          </a:graphicData>
+        </a:graphic>
+      </p:graphicFrame>
+    </p:spTree>
+    <p:extLst>
+      <p:ext uri="{BB962C8B-B14F-4D97-AF65-F5344CB8AC3E}">
+        <p14:creationId xmlns:p14="http://schemas.microsoft.com/office/powerpoint/2010/main" val="2645603914"/>
+      </p:ext>
+    </p:extLst>
+  </p:cSld>
+  <p:clrMapOvr>
+    <a:masterClrMapping/>
+  </p:clrMapOvr>
+</p:sld>
+</file>
+
+<file path=ppt/slides/slide41.xml><?xml version="1.0" encoding="utf-8"?>
+<p:sld xmlns:a="http://schemas.openxmlformats.org/drawingml/2006/main" xmlns:r="http://schemas.openxmlformats.org/officeDocument/2006/relationships" xmlns:p="http://schemas.openxmlformats.org/presentationml/2006/main">
+  <p:cSld>
+    <p:spTree>
+      <p:nvGrpSpPr>
+        <p:cNvPr id="1" name=""/>
+        <p:cNvGrpSpPr/>
+        <p:nvPr/>
+      </p:nvGrpSpPr>
+      <p:grpSpPr>
+        <a:xfrm>
+          <a:off x="0" y="0"/>
+          <a:ext cx="0" cy="0"/>
+          <a:chOff x="0" y="0"/>
+          <a:chExt cx="0" cy="0"/>
+        </a:xfrm>
+      </p:grpSpPr>
+      <p:sp>
+        <p:nvSpPr>
+          <p:cNvPr id="2" name="Título 1">
+            <a:extLst>
+              <a:ext uri="{FF2B5EF4-FFF2-40B4-BE49-F238E27FC236}">
+                <a16:creationId xmlns:a16="http://schemas.microsoft.com/office/drawing/2014/main" id="{A544CF25-2F8F-BC45-9D5E-B7214CD84D05}"/>
+              </a:ext>
+            </a:extLst>
+          </p:cNvPr>
+          <p:cNvSpPr>
+            <a:spLocks noGrp="1"/>
+          </p:cNvSpPr>
+          <p:nvPr>
+            <p:ph type="title"/>
+          </p:nvPr>
+        </p:nvSpPr>
+        <p:spPr/>
+        <p:txBody>
+          <a:bodyPr/>
+          <a:lstStyle/>
+          <a:p>
+            <a:r>
+              <a:rPr lang="es-CO" dirty="0"/>
+              <a:t>Requerimientos funcionales</a:t>
+            </a:r>
+          </a:p>
+        </p:txBody>
+      </p:sp>
+      <p:graphicFrame>
+        <p:nvGraphicFramePr>
+          <p:cNvPr id="4" name="Tabla 4">
+            <a:extLst>
+              <a:ext uri="{FF2B5EF4-FFF2-40B4-BE49-F238E27FC236}">
+                <a16:creationId xmlns:a16="http://schemas.microsoft.com/office/drawing/2014/main" id="{104B1BC5-C194-6A4D-BF36-86B68BC29C6E}"/>
+              </a:ext>
+            </a:extLst>
+          </p:cNvPr>
+          <p:cNvGraphicFramePr>
+            <a:graphicFrameLocks noGrp="1"/>
+          </p:cNvGraphicFramePr>
+          <p:nvPr>
+            <p:ph idx="1"/>
+            <p:extLst>
+              <p:ext uri="{D42A27DB-BD31-4B8C-83A1-F6EECF244321}">
+                <p14:modId xmlns:p14="http://schemas.microsoft.com/office/powerpoint/2010/main" val="2594450083"/>
+              </p:ext>
+            </p:extLst>
           </p:nvPr>
         </p:nvGraphicFramePr>
         <p:xfrm>
@@ -21121,7 +21473,7 @@
                     <a:p>
                       <a:r>
                         <a:rPr lang="es-CO" sz="1400" dirty="0"/>
-                        <a:t>RF09</a:t>
+                        <a:t>RF010</a:t>
                       </a:r>
                     </a:p>
                   </a:txBody>
@@ -21383,7 +21735,7 @@
 </p:sld>
 </file>
 
-<file path=ppt/slides/slide41.xml><?xml version="1.0" encoding="utf-8"?>
+<file path=ppt/slides/slide42.xml><?xml version="1.0" encoding="utf-8"?>
 <p:sld xmlns:a="http://schemas.openxmlformats.org/drawingml/2006/main" xmlns:r="http://schemas.openxmlformats.org/officeDocument/2006/relationships" xmlns:p="http://schemas.openxmlformats.org/presentationml/2006/main">
   <p:cSld>
     <p:spTree>
@@ -21442,6 +21794,11 @@
           </p:cNvGraphicFramePr>
           <p:nvPr>
             <p:ph idx="1"/>
+            <p:extLst>
+              <p:ext uri="{D42A27DB-BD31-4B8C-83A1-F6EECF244321}">
+                <p14:modId xmlns:p14="http://schemas.microsoft.com/office/powerpoint/2010/main" val="1156093661"/>
+              </p:ext>
+            </p:extLst>
           </p:nvPr>
         </p:nvGraphicFramePr>
         <p:xfrm>
@@ -21491,7 +21848,7 @@
                     <a:p>
                       <a:r>
                         <a:rPr lang="es-CO" sz="1400" dirty="0"/>
-                        <a:t>RF10</a:t>
+                        <a:t>RF011</a:t>
                       </a:r>
                     </a:p>
                   </a:txBody>
@@ -21753,7 +22110,7 @@
 </p:sld>
 </file>
 
-<file path=ppt/slides/slide42.xml><?xml version="1.0" encoding="utf-8"?>
+<file path=ppt/slides/slide43.xml><?xml version="1.0" encoding="utf-8"?>
 <p:sld xmlns:a="http://schemas.openxmlformats.org/drawingml/2006/main" xmlns:r="http://schemas.openxmlformats.org/officeDocument/2006/relationships" xmlns:p="http://schemas.openxmlformats.org/presentationml/2006/main">
   <p:cSld>
     <p:spTree>
@@ -21812,6 +22169,11 @@
           </p:cNvGraphicFramePr>
           <p:nvPr>
             <p:ph idx="1"/>
+            <p:extLst>
+              <p:ext uri="{D42A27DB-BD31-4B8C-83A1-F6EECF244321}">
+                <p14:modId xmlns:p14="http://schemas.microsoft.com/office/powerpoint/2010/main" val="1392332237"/>
+              </p:ext>
+            </p:extLst>
           </p:nvPr>
         </p:nvGraphicFramePr>
         <p:xfrm>
@@ -21861,7 +22223,7 @@
                     <a:p>
                       <a:r>
                         <a:rPr lang="es-CO" sz="1400" dirty="0"/>
-                        <a:t>RF11</a:t>
+                        <a:t>RF012</a:t>
                       </a:r>
                     </a:p>
                   </a:txBody>
@@ -22123,7 +22485,7 @@
 </p:sld>
 </file>
 
-<file path=ppt/slides/slide43.xml><?xml version="1.0" encoding="utf-8"?>
+<file path=ppt/slides/slide44.xml><?xml version="1.0" encoding="utf-8"?>
 <p:sld xmlns:a="http://schemas.openxmlformats.org/drawingml/2006/main" xmlns:r="http://schemas.openxmlformats.org/officeDocument/2006/relationships" xmlns:p="http://schemas.openxmlformats.org/presentationml/2006/main">
   <p:cSld>
     <p:spTree>
@@ -22182,6 +22544,11 @@
           </p:cNvGraphicFramePr>
           <p:nvPr>
             <p:ph idx="1"/>
+            <p:extLst>
+              <p:ext uri="{D42A27DB-BD31-4B8C-83A1-F6EECF244321}">
+                <p14:modId xmlns:p14="http://schemas.microsoft.com/office/powerpoint/2010/main" val="42865537"/>
+              </p:ext>
+            </p:extLst>
           </p:nvPr>
         </p:nvGraphicFramePr>
         <p:xfrm>
@@ -22231,7 +22598,7 @@
                     <a:p>
                       <a:r>
                         <a:rPr lang="es-CO" sz="1400" dirty="0"/>
-                        <a:t>RF12</a:t>
+                        <a:t>RF013</a:t>
                       </a:r>
                     </a:p>
                   </a:txBody>
@@ -22493,7 +22860,7 @@
 </p:sld>
 </file>
 
-<file path=ppt/slides/slide44.xml><?xml version="1.0" encoding="utf-8"?>
+<file path=ppt/slides/slide45.xml><?xml version="1.0" encoding="utf-8"?>
 <p:sld xmlns:a="http://schemas.openxmlformats.org/drawingml/2006/main" xmlns:r="http://schemas.openxmlformats.org/officeDocument/2006/relationships" xmlns:p="http://schemas.openxmlformats.org/presentationml/2006/main">
   <p:cSld>
     <p:spTree>
@@ -22552,6 +22919,11 @@
           </p:cNvGraphicFramePr>
           <p:nvPr>
             <p:ph idx="1"/>
+            <p:extLst>
+              <p:ext uri="{D42A27DB-BD31-4B8C-83A1-F6EECF244321}">
+                <p14:modId xmlns:p14="http://schemas.microsoft.com/office/powerpoint/2010/main" val="1826061499"/>
+              </p:ext>
+            </p:extLst>
           </p:nvPr>
         </p:nvGraphicFramePr>
         <p:xfrm>
@@ -22601,7 +22973,7 @@
                     <a:p>
                       <a:r>
                         <a:rPr lang="es-CO" sz="1400" dirty="0"/>
-                        <a:t>RF13</a:t>
+                        <a:t>RF014</a:t>
                       </a:r>
                     </a:p>
                   </a:txBody>
@@ -22887,7 +23259,7 @@
 </p:sld>
 </file>
 
-<file path=ppt/slides/slide45.xml><?xml version="1.0" encoding="utf-8"?>
+<file path=ppt/slides/slide46.xml><?xml version="1.0" encoding="utf-8"?>
 <p:sld xmlns:a="http://schemas.openxmlformats.org/drawingml/2006/main" xmlns:r="http://schemas.openxmlformats.org/officeDocument/2006/relationships" xmlns:p="http://schemas.openxmlformats.org/presentationml/2006/main">
   <p:cSld>
     <p:spTree>
@@ -22946,6 +23318,11 @@
           </p:cNvGraphicFramePr>
           <p:nvPr>
             <p:ph idx="1"/>
+            <p:extLst>
+              <p:ext uri="{D42A27DB-BD31-4B8C-83A1-F6EECF244321}">
+                <p14:modId xmlns:p14="http://schemas.microsoft.com/office/powerpoint/2010/main" val="3263001146"/>
+              </p:ext>
+            </p:extLst>
           </p:nvPr>
         </p:nvGraphicFramePr>
         <p:xfrm>
@@ -22995,7 +23372,7 @@
                     <a:p>
                       <a:r>
                         <a:rPr lang="es-CO" sz="1400" dirty="0"/>
-                        <a:t>RF14</a:t>
+                        <a:t>RF015</a:t>
                       </a:r>
                     </a:p>
                   </a:txBody>
@@ -23257,7 +23634,7 @@
 </p:sld>
 </file>
 
-<file path=ppt/slides/slide46.xml><?xml version="1.0" encoding="utf-8"?>
+<file path=ppt/slides/slide47.xml><?xml version="1.0" encoding="utf-8"?>
 <p:sld xmlns:a="http://schemas.openxmlformats.org/drawingml/2006/main" xmlns:r="http://schemas.openxmlformats.org/officeDocument/2006/relationships" xmlns:p="http://schemas.openxmlformats.org/presentationml/2006/main">
   <p:cSld>
     <p:spTree>
@@ -23316,6 +23693,11 @@
           </p:cNvGraphicFramePr>
           <p:nvPr>
             <p:ph idx="1"/>
+            <p:extLst>
+              <p:ext uri="{D42A27DB-BD31-4B8C-83A1-F6EECF244321}">
+                <p14:modId xmlns:p14="http://schemas.microsoft.com/office/powerpoint/2010/main" val="3922815373"/>
+              </p:ext>
+            </p:extLst>
           </p:nvPr>
         </p:nvGraphicFramePr>
         <p:xfrm>
@@ -23365,7 +23747,7 @@
                     <a:p>
                       <a:r>
                         <a:rPr lang="es-CO" sz="1400" dirty="0"/>
-                        <a:t>RF15</a:t>
+                        <a:t>RF016</a:t>
                       </a:r>
                     </a:p>
                   </a:txBody>
@@ -23627,7 +24009,7 @@
 </p:sld>
 </file>
 
-<file path=ppt/slides/slide47.xml><?xml version="1.0" encoding="utf-8"?>
+<file path=ppt/slides/slide48.xml><?xml version="1.0" encoding="utf-8"?>
 <p:sld xmlns:a="http://schemas.openxmlformats.org/drawingml/2006/main" xmlns:r="http://schemas.openxmlformats.org/officeDocument/2006/relationships" xmlns:p="http://schemas.openxmlformats.org/presentationml/2006/main">
   <p:cSld>
     <p:spTree>
@@ -23729,7 +24111,7 @@
 </p:sld>
 </file>
 
-<file path=ppt/slides/slide48.xml><?xml version="1.0" encoding="utf-8"?>
+<file path=ppt/slides/slide49.xml><?xml version="1.0" encoding="utf-8"?>
 <p:sld xmlns:a="http://schemas.openxmlformats.org/drawingml/2006/main" xmlns:r="http://schemas.openxmlformats.org/officeDocument/2006/relationships" xmlns:p="http://schemas.openxmlformats.org/presentationml/2006/main">
   <p:cSld>
     <p:spTree>
@@ -23989,275 +24371,6 @@
     <p:extLst>
       <p:ext uri="{BB962C8B-B14F-4D97-AF65-F5344CB8AC3E}">
         <p14:creationId xmlns:p14="http://schemas.microsoft.com/office/powerpoint/2010/main" val="3765484493"/>
-      </p:ext>
-    </p:extLst>
-  </p:cSld>
-  <p:clrMapOvr>
-    <a:masterClrMapping/>
-  </p:clrMapOvr>
-</p:sld>
-</file>
-
-<file path=ppt/slides/slide49.xml><?xml version="1.0" encoding="utf-8"?>
-<p:sld xmlns:a="http://schemas.openxmlformats.org/drawingml/2006/main" xmlns:r="http://schemas.openxmlformats.org/officeDocument/2006/relationships" xmlns:p="http://schemas.openxmlformats.org/presentationml/2006/main">
-  <p:cSld>
-    <p:spTree>
-      <p:nvGrpSpPr>
-        <p:cNvPr id="1" name=""/>
-        <p:cNvGrpSpPr/>
-        <p:nvPr/>
-      </p:nvGrpSpPr>
-      <p:grpSpPr>
-        <a:xfrm>
-          <a:off x="0" y="0"/>
-          <a:ext cx="0" cy="0"/>
-          <a:chOff x="0" y="0"/>
-          <a:chExt cx="0" cy="0"/>
-        </a:xfrm>
-      </p:grpSpPr>
-      <p:sp>
-        <p:nvSpPr>
-          <p:cNvPr id="2" name="Título 1">
-            <a:extLst>
-              <a:ext uri="{FF2B5EF4-FFF2-40B4-BE49-F238E27FC236}">
-                <a16:creationId xmlns:a16="http://schemas.microsoft.com/office/drawing/2014/main" id="{0DF8FDDE-7FF6-114B-95BB-26E67991BA49}"/>
-              </a:ext>
-            </a:extLst>
-          </p:cNvPr>
-          <p:cNvSpPr>
-            <a:spLocks noGrp="1"/>
-          </p:cNvSpPr>
-          <p:nvPr>
-            <p:ph type="title"/>
-          </p:nvPr>
-        </p:nvSpPr>
-        <p:spPr/>
-        <p:txBody>
-          <a:bodyPr/>
-          <a:lstStyle/>
-          <a:p>
-            <a:r>
-              <a:rPr lang="es-CO" dirty="0"/>
-              <a:t>Requerimientos no funcionales</a:t>
-            </a:r>
-          </a:p>
-        </p:txBody>
-      </p:sp>
-      <p:graphicFrame>
-        <p:nvGraphicFramePr>
-          <p:cNvPr id="4" name="Tabla 4">
-            <a:extLst>
-              <a:ext uri="{FF2B5EF4-FFF2-40B4-BE49-F238E27FC236}">
-                <a16:creationId xmlns:a16="http://schemas.microsoft.com/office/drawing/2014/main" id="{3275B20B-304D-3645-A6E7-687160D9B56D}"/>
-              </a:ext>
-            </a:extLst>
-          </p:cNvPr>
-          <p:cNvGraphicFramePr>
-            <a:graphicFrameLocks noGrp="1"/>
-          </p:cNvGraphicFramePr>
-          <p:nvPr>
-            <p:ph idx="1"/>
-          </p:nvPr>
-        </p:nvGraphicFramePr>
-        <p:xfrm>
-          <a:off x="5118100" y="803275"/>
-          <a:ext cx="6281738" cy="3205480"/>
-        </p:xfrm>
-        <a:graphic>
-          <a:graphicData uri="http://schemas.openxmlformats.org/drawingml/2006/table">
-            <a:tbl>
-              <a:tblPr firstRow="1" bandRow="1">
-                <a:tableStyleId>{5C22544A-7EE6-4342-B048-85BDC9FD1C3A}</a:tableStyleId>
-              </a:tblPr>
-              <a:tblGrid>
-                <a:gridCol w="3140869">
-                  <a:extLst>
-                    <a:ext uri="{9D8B030D-6E8A-4147-A177-3AD203B41FA5}">
-                      <a16:colId xmlns:a16="http://schemas.microsoft.com/office/drawing/2014/main" val="2405063638"/>
-                    </a:ext>
-                  </a:extLst>
-                </a:gridCol>
-                <a:gridCol w="3140869">
-                  <a:extLst>
-                    <a:ext uri="{9D8B030D-6E8A-4147-A177-3AD203B41FA5}">
-                      <a16:colId xmlns:a16="http://schemas.microsoft.com/office/drawing/2014/main" val="3099478781"/>
-                    </a:ext>
-                  </a:extLst>
-                </a:gridCol>
-              </a:tblGrid>
-              <a:tr h="370840">
-                <a:tc>
-                  <a:txBody>
-                    <a:bodyPr/>
-                    <a:lstStyle/>
-                    <a:p>
-                      <a:r>
-                        <a:rPr lang="es-CO" dirty="0"/>
-                        <a:t>Identificación del requerimiento</a:t>
-                      </a:r>
-                    </a:p>
-                  </a:txBody>
-                  <a:tcPr/>
-                </a:tc>
-                <a:tc>
-                  <a:txBody>
-                    <a:bodyPr/>
-                    <a:lstStyle/>
-                    <a:p>
-                      <a:r>
-                        <a:rPr lang="es-CO" dirty="0"/>
-                        <a:t>RNF02</a:t>
-                      </a:r>
-                    </a:p>
-                  </a:txBody>
-                  <a:tcPr/>
-                </a:tc>
-                <a:extLst>
-                  <a:ext uri="{0D108BD9-81ED-4DB2-BD59-A6C34878D82A}">
-                    <a16:rowId xmlns:a16="http://schemas.microsoft.com/office/drawing/2014/main" val="3120795479"/>
-                  </a:ext>
-                </a:extLst>
-              </a:tr>
-              <a:tr h="370840">
-                <a:tc>
-                  <a:txBody>
-                    <a:bodyPr/>
-                    <a:lstStyle/>
-                    <a:p>
-                      <a:r>
-                        <a:rPr lang="es-CO" dirty="0"/>
-                        <a:t>Nombre del requerimiento</a:t>
-                      </a:r>
-                    </a:p>
-                  </a:txBody>
-                  <a:tcPr/>
-                </a:tc>
-                <a:tc>
-                  <a:txBody>
-                    <a:bodyPr/>
-                    <a:lstStyle/>
-                    <a:p>
-                      <a:r>
-                        <a:rPr lang="es-CO" dirty="0"/>
-                        <a:t>Estilos de interfaz</a:t>
-                      </a:r>
-                    </a:p>
-                  </a:txBody>
-                  <a:tcPr/>
-                </a:tc>
-                <a:extLst>
-                  <a:ext uri="{0D108BD9-81ED-4DB2-BD59-A6C34878D82A}">
-                    <a16:rowId xmlns:a16="http://schemas.microsoft.com/office/drawing/2014/main" val="1343925762"/>
-                  </a:ext>
-                </a:extLst>
-              </a:tr>
-              <a:tr h="370840">
-                <a:tc>
-                  <a:txBody>
-                    <a:bodyPr/>
-                    <a:lstStyle/>
-                    <a:p>
-                      <a:r>
-                        <a:rPr lang="es-CO" dirty="0"/>
-                        <a:t>Caracterísitcas</a:t>
-                      </a:r>
-                    </a:p>
-                  </a:txBody>
-                  <a:tcPr/>
-                </a:tc>
-                <a:tc>
-                  <a:txBody>
-                    <a:bodyPr/>
-                    <a:lstStyle/>
-                    <a:p>
-                      <a:r>
-                        <a:rPr lang="es-CO" dirty="0"/>
-                        <a:t>La interfaz debe tener los colores y los logos de la Gobernación y del colegio.</a:t>
-                      </a:r>
-                    </a:p>
-                  </a:txBody>
-                  <a:tcPr/>
-                </a:tc>
-                <a:extLst>
-                  <a:ext uri="{0D108BD9-81ED-4DB2-BD59-A6C34878D82A}">
-                    <a16:rowId xmlns:a16="http://schemas.microsoft.com/office/drawing/2014/main" val="769886354"/>
-                  </a:ext>
-                </a:extLst>
-              </a:tr>
-              <a:tr h="370840">
-                <a:tc>
-                  <a:txBody>
-                    <a:bodyPr/>
-                    <a:lstStyle/>
-                    <a:p>
-                      <a:r>
-                        <a:rPr lang="es-CO" dirty="0"/>
-                        <a:t>Descripción del requerimiento</a:t>
-                      </a:r>
-                    </a:p>
-                  </a:txBody>
-                  <a:tcPr/>
-                </a:tc>
-                <a:tc>
-                  <a:txBody>
-                    <a:bodyPr/>
-                    <a:lstStyle/>
-                    <a:p>
-                      <a:r>
-                        <a:rPr lang="es-CO" dirty="0"/>
-                        <a:t>La interfaz debe presentar los estilos institucionales.</a:t>
-                      </a:r>
-                    </a:p>
-                  </a:txBody>
-                  <a:tcPr/>
-                </a:tc>
-                <a:extLst>
-                  <a:ext uri="{0D108BD9-81ED-4DB2-BD59-A6C34878D82A}">
-                    <a16:rowId xmlns:a16="http://schemas.microsoft.com/office/drawing/2014/main" val="2397840479"/>
-                  </a:ext>
-                </a:extLst>
-              </a:tr>
-              <a:tr h="370840">
-                <a:tc>
-                  <a:txBody>
-                    <a:bodyPr/>
-                    <a:lstStyle/>
-                    <a:p>
-                      <a:r>
-                        <a:rPr lang="es-CO" dirty="0"/>
-                        <a:t>Prioridad del requerimiento</a:t>
-                      </a:r>
-                    </a:p>
-                  </a:txBody>
-                  <a:tcPr/>
-                </a:tc>
-                <a:tc>
-                  <a:txBody>
-                    <a:bodyPr/>
-                    <a:lstStyle/>
-                    <a:p>
-                      <a:r>
-                        <a:rPr lang="es-CO" dirty="0"/>
-                        <a:t>Alta</a:t>
-                      </a:r>
-                    </a:p>
-                  </a:txBody>
-                  <a:tcPr/>
-                </a:tc>
-                <a:extLst>
-                  <a:ext uri="{0D108BD9-81ED-4DB2-BD59-A6C34878D82A}">
-                    <a16:rowId xmlns:a16="http://schemas.microsoft.com/office/drawing/2014/main" val="1876826554"/>
-                  </a:ext>
-                </a:extLst>
-              </a:tr>
-            </a:tbl>
-          </a:graphicData>
-        </a:graphic>
-      </p:graphicFrame>
-    </p:spTree>
-    <p:extLst>
-      <p:ext uri="{BB962C8B-B14F-4D97-AF65-F5344CB8AC3E}">
-        <p14:creationId xmlns:p14="http://schemas.microsoft.com/office/powerpoint/2010/main" val="1139138037"/>
       </p:ext>
     </p:extLst>
   </p:cSld>
@@ -24418,7 +24531,7 @@
         </p:nvGraphicFramePr>
         <p:xfrm>
           <a:off x="5118100" y="803275"/>
-          <a:ext cx="6281738" cy="3754120"/>
+          <a:ext cx="6281738" cy="3205480"/>
         </p:xfrm>
         <a:graphic>
           <a:graphicData uri="http://schemas.openxmlformats.org/drawingml/2006/table">
@@ -24463,7 +24576,7 @@
                     <a:p>
                       <a:r>
                         <a:rPr lang="es-CO" dirty="0"/>
-                        <a:t>RNF03</a:t>
+                        <a:t>RNF02</a:t>
                       </a:r>
                     </a:p>
                   </a:txBody>
@@ -24495,10 +24608,9 @@
                     <a:lstStyle/>
                     <a:p>
                       <a:r>
-                        <a:rPr lang="es-CO" dirty="0" err="1"/>
-                        <a:t>Frontend</a:t>
-                      </a:r>
-                      <a:endParaRPr lang="es-CO" dirty="0"/>
+                        <a:rPr lang="es-CO" dirty="0"/>
+                        <a:t>Estilos de interfaz</a:t>
+                      </a:r>
                     </a:p>
                   </a:txBody>
                   <a:tcPr/>
@@ -24530,23 +24642,7 @@
                     <a:p>
                       <a:r>
                         <a:rPr lang="es-CO" dirty="0"/>
-                        <a:t>El </a:t>
-                      </a:r>
-                      <a:r>
-                        <a:rPr lang="es-CO" dirty="0" err="1"/>
-                        <a:t>frontend</a:t>
-                      </a:r>
-                      <a:r>
-                        <a:rPr lang="es-CO" dirty="0"/>
-                        <a:t> debe estar escrito, al menos, en </a:t>
-                      </a:r>
-                      <a:r>
-                        <a:rPr lang="es-CO" dirty="0" err="1"/>
-                        <a:t>NoteJS</a:t>
-                      </a:r>
-                      <a:r>
-                        <a:rPr lang="es-CO" dirty="0"/>
-                        <a:t> y HTML.</a:t>
+                        <a:t>La interfaz debe tener los colores y los logos de la Gobernación y del colegio.</a:t>
                       </a:r>
                     </a:p>
                   </a:txBody>
@@ -24579,15 +24675,7 @@
                     <a:p>
                       <a:r>
                         <a:rPr lang="es-CO" dirty="0"/>
-                        <a:t>Se deben utilizar, al menos, los lenguajes </a:t>
-                      </a:r>
-                      <a:r>
-                        <a:rPr lang="es-CO" dirty="0" err="1"/>
-                        <a:t>NoteJS</a:t>
-                      </a:r>
-                      <a:r>
-                        <a:rPr lang="es-CO" dirty="0"/>
-                        <a:t>  y HTML para el diseño frontal del sistema.</a:t>
+                        <a:t>La interfaz debe presentar los estilos institucionales.</a:t>
                       </a:r>
                     </a:p>
                   </a:txBody>
@@ -24639,7 +24727,7 @@
     </p:spTree>
     <p:extLst>
       <p:ext uri="{BB962C8B-B14F-4D97-AF65-F5344CB8AC3E}">
-        <p14:creationId xmlns:p14="http://schemas.microsoft.com/office/powerpoint/2010/main" val="3274729353"/>
+        <p14:creationId xmlns:p14="http://schemas.microsoft.com/office/powerpoint/2010/main" val="1139138037"/>
       </p:ext>
     </p:extLst>
   </p:cSld>
@@ -24757,6 +24845,300 @@
                     <a:p>
                       <a:r>
                         <a:rPr lang="es-CO" dirty="0"/>
+                        <a:t>RNF03</a:t>
+                      </a:r>
+                    </a:p>
+                  </a:txBody>
+                  <a:tcPr/>
+                </a:tc>
+                <a:extLst>
+                  <a:ext uri="{0D108BD9-81ED-4DB2-BD59-A6C34878D82A}">
+                    <a16:rowId xmlns:a16="http://schemas.microsoft.com/office/drawing/2014/main" val="3120795479"/>
+                  </a:ext>
+                </a:extLst>
+              </a:tr>
+              <a:tr h="370840">
+                <a:tc>
+                  <a:txBody>
+                    <a:bodyPr/>
+                    <a:lstStyle/>
+                    <a:p>
+                      <a:r>
+                        <a:rPr lang="es-CO" dirty="0"/>
+                        <a:t>Nombre del requerimiento</a:t>
+                      </a:r>
+                    </a:p>
+                  </a:txBody>
+                  <a:tcPr/>
+                </a:tc>
+                <a:tc>
+                  <a:txBody>
+                    <a:bodyPr/>
+                    <a:lstStyle/>
+                    <a:p>
+                      <a:r>
+                        <a:rPr lang="es-CO" dirty="0" err="1"/>
+                        <a:t>Frontend</a:t>
+                      </a:r>
+                      <a:endParaRPr lang="es-CO" dirty="0"/>
+                    </a:p>
+                  </a:txBody>
+                  <a:tcPr/>
+                </a:tc>
+                <a:extLst>
+                  <a:ext uri="{0D108BD9-81ED-4DB2-BD59-A6C34878D82A}">
+                    <a16:rowId xmlns:a16="http://schemas.microsoft.com/office/drawing/2014/main" val="1343925762"/>
+                  </a:ext>
+                </a:extLst>
+              </a:tr>
+              <a:tr h="370840">
+                <a:tc>
+                  <a:txBody>
+                    <a:bodyPr/>
+                    <a:lstStyle/>
+                    <a:p>
+                      <a:r>
+                        <a:rPr lang="es-CO" dirty="0"/>
+                        <a:t>Caracterísitcas</a:t>
+                      </a:r>
+                    </a:p>
+                  </a:txBody>
+                  <a:tcPr/>
+                </a:tc>
+                <a:tc>
+                  <a:txBody>
+                    <a:bodyPr/>
+                    <a:lstStyle/>
+                    <a:p>
+                      <a:r>
+                        <a:rPr lang="es-CO" dirty="0"/>
+                        <a:t>El </a:t>
+                      </a:r>
+                      <a:r>
+                        <a:rPr lang="es-CO" dirty="0" err="1"/>
+                        <a:t>frontend</a:t>
+                      </a:r>
+                      <a:r>
+                        <a:rPr lang="es-CO" dirty="0"/>
+                        <a:t> debe estar escrito, al menos, en </a:t>
+                      </a:r>
+                      <a:r>
+                        <a:rPr lang="es-CO" dirty="0" err="1"/>
+                        <a:t>NoteJS</a:t>
+                      </a:r>
+                      <a:r>
+                        <a:rPr lang="es-CO" dirty="0"/>
+                        <a:t> y HTML.</a:t>
+                      </a:r>
+                    </a:p>
+                  </a:txBody>
+                  <a:tcPr/>
+                </a:tc>
+                <a:extLst>
+                  <a:ext uri="{0D108BD9-81ED-4DB2-BD59-A6C34878D82A}">
+                    <a16:rowId xmlns:a16="http://schemas.microsoft.com/office/drawing/2014/main" val="769886354"/>
+                  </a:ext>
+                </a:extLst>
+              </a:tr>
+              <a:tr h="370840">
+                <a:tc>
+                  <a:txBody>
+                    <a:bodyPr/>
+                    <a:lstStyle/>
+                    <a:p>
+                      <a:r>
+                        <a:rPr lang="es-CO" dirty="0"/>
+                        <a:t>Descripción del requerimiento</a:t>
+                      </a:r>
+                    </a:p>
+                  </a:txBody>
+                  <a:tcPr/>
+                </a:tc>
+                <a:tc>
+                  <a:txBody>
+                    <a:bodyPr/>
+                    <a:lstStyle/>
+                    <a:p>
+                      <a:r>
+                        <a:rPr lang="es-CO" dirty="0"/>
+                        <a:t>Se deben utilizar, al menos, los lenguajes </a:t>
+                      </a:r>
+                      <a:r>
+                        <a:rPr lang="es-CO" dirty="0" err="1"/>
+                        <a:t>NoteJS</a:t>
+                      </a:r>
+                      <a:r>
+                        <a:rPr lang="es-CO" dirty="0"/>
+                        <a:t>  y HTML para el diseño frontal del sistema.</a:t>
+                      </a:r>
+                    </a:p>
+                  </a:txBody>
+                  <a:tcPr/>
+                </a:tc>
+                <a:extLst>
+                  <a:ext uri="{0D108BD9-81ED-4DB2-BD59-A6C34878D82A}">
+                    <a16:rowId xmlns:a16="http://schemas.microsoft.com/office/drawing/2014/main" val="2397840479"/>
+                  </a:ext>
+                </a:extLst>
+              </a:tr>
+              <a:tr h="370840">
+                <a:tc>
+                  <a:txBody>
+                    <a:bodyPr/>
+                    <a:lstStyle/>
+                    <a:p>
+                      <a:r>
+                        <a:rPr lang="es-CO" dirty="0"/>
+                        <a:t>Prioridad del requerimiento</a:t>
+                      </a:r>
+                    </a:p>
+                  </a:txBody>
+                  <a:tcPr/>
+                </a:tc>
+                <a:tc>
+                  <a:txBody>
+                    <a:bodyPr/>
+                    <a:lstStyle/>
+                    <a:p>
+                      <a:r>
+                        <a:rPr lang="es-CO" dirty="0"/>
+                        <a:t>Alta</a:t>
+                      </a:r>
+                    </a:p>
+                  </a:txBody>
+                  <a:tcPr/>
+                </a:tc>
+                <a:extLst>
+                  <a:ext uri="{0D108BD9-81ED-4DB2-BD59-A6C34878D82A}">
+                    <a16:rowId xmlns:a16="http://schemas.microsoft.com/office/drawing/2014/main" val="1876826554"/>
+                  </a:ext>
+                </a:extLst>
+              </a:tr>
+            </a:tbl>
+          </a:graphicData>
+        </a:graphic>
+      </p:graphicFrame>
+    </p:spTree>
+    <p:extLst>
+      <p:ext uri="{BB962C8B-B14F-4D97-AF65-F5344CB8AC3E}">
+        <p14:creationId xmlns:p14="http://schemas.microsoft.com/office/powerpoint/2010/main" val="3274729353"/>
+      </p:ext>
+    </p:extLst>
+  </p:cSld>
+  <p:clrMapOvr>
+    <a:masterClrMapping/>
+  </p:clrMapOvr>
+</p:sld>
+</file>
+
+<file path=ppt/slides/slide52.xml><?xml version="1.0" encoding="utf-8"?>
+<p:sld xmlns:a="http://schemas.openxmlformats.org/drawingml/2006/main" xmlns:r="http://schemas.openxmlformats.org/officeDocument/2006/relationships" xmlns:p="http://schemas.openxmlformats.org/presentationml/2006/main">
+  <p:cSld>
+    <p:spTree>
+      <p:nvGrpSpPr>
+        <p:cNvPr id="1" name=""/>
+        <p:cNvGrpSpPr/>
+        <p:nvPr/>
+      </p:nvGrpSpPr>
+      <p:grpSpPr>
+        <a:xfrm>
+          <a:off x="0" y="0"/>
+          <a:ext cx="0" cy="0"/>
+          <a:chOff x="0" y="0"/>
+          <a:chExt cx="0" cy="0"/>
+        </a:xfrm>
+      </p:grpSpPr>
+      <p:sp>
+        <p:nvSpPr>
+          <p:cNvPr id="2" name="Título 1">
+            <a:extLst>
+              <a:ext uri="{FF2B5EF4-FFF2-40B4-BE49-F238E27FC236}">
+                <a16:creationId xmlns:a16="http://schemas.microsoft.com/office/drawing/2014/main" id="{0DF8FDDE-7FF6-114B-95BB-26E67991BA49}"/>
+              </a:ext>
+            </a:extLst>
+          </p:cNvPr>
+          <p:cNvSpPr>
+            <a:spLocks noGrp="1"/>
+          </p:cNvSpPr>
+          <p:nvPr>
+            <p:ph type="title"/>
+          </p:nvPr>
+        </p:nvSpPr>
+        <p:spPr/>
+        <p:txBody>
+          <a:bodyPr/>
+          <a:lstStyle/>
+          <a:p>
+            <a:r>
+              <a:rPr lang="es-CO" dirty="0"/>
+              <a:t>Requerimientos no funcionales</a:t>
+            </a:r>
+          </a:p>
+        </p:txBody>
+      </p:sp>
+      <p:graphicFrame>
+        <p:nvGraphicFramePr>
+          <p:cNvPr id="4" name="Tabla 4">
+            <a:extLst>
+              <a:ext uri="{FF2B5EF4-FFF2-40B4-BE49-F238E27FC236}">
+                <a16:creationId xmlns:a16="http://schemas.microsoft.com/office/drawing/2014/main" id="{3275B20B-304D-3645-A6E7-687160D9B56D}"/>
+              </a:ext>
+            </a:extLst>
+          </p:cNvPr>
+          <p:cNvGraphicFramePr>
+            <a:graphicFrameLocks noGrp="1"/>
+          </p:cNvGraphicFramePr>
+          <p:nvPr>
+            <p:ph idx="1"/>
+          </p:nvPr>
+        </p:nvGraphicFramePr>
+        <p:xfrm>
+          <a:off x="5118100" y="803275"/>
+          <a:ext cx="6281738" cy="3754120"/>
+        </p:xfrm>
+        <a:graphic>
+          <a:graphicData uri="http://schemas.openxmlformats.org/drawingml/2006/table">
+            <a:tbl>
+              <a:tblPr firstRow="1" bandRow="1">
+                <a:tableStyleId>{5C22544A-7EE6-4342-B048-85BDC9FD1C3A}</a:tableStyleId>
+              </a:tblPr>
+              <a:tblGrid>
+                <a:gridCol w="3140869">
+                  <a:extLst>
+                    <a:ext uri="{9D8B030D-6E8A-4147-A177-3AD203B41FA5}">
+                      <a16:colId xmlns:a16="http://schemas.microsoft.com/office/drawing/2014/main" val="2405063638"/>
+                    </a:ext>
+                  </a:extLst>
+                </a:gridCol>
+                <a:gridCol w="3140869">
+                  <a:extLst>
+                    <a:ext uri="{9D8B030D-6E8A-4147-A177-3AD203B41FA5}">
+                      <a16:colId xmlns:a16="http://schemas.microsoft.com/office/drawing/2014/main" val="3099478781"/>
+                    </a:ext>
+                  </a:extLst>
+                </a:gridCol>
+              </a:tblGrid>
+              <a:tr h="370840">
+                <a:tc>
+                  <a:txBody>
+                    <a:bodyPr/>
+                    <a:lstStyle/>
+                    <a:p>
+                      <a:r>
+                        <a:rPr lang="es-CO" dirty="0"/>
+                        <a:t>Identificación del requerimiento</a:t>
+                      </a:r>
+                    </a:p>
+                  </a:txBody>
+                  <a:tcPr/>
+                </a:tc>
+                <a:tc>
+                  <a:txBody>
+                    <a:bodyPr/>
+                    <a:lstStyle/>
+                    <a:p>
+                      <a:r>
+                        <a:rPr lang="es-CO" dirty="0"/>
                         <a:t>RNF04</a:t>
                       </a:r>
                     </a:p>
@@ -24959,7 +25341,7 @@
 </p:sld>
 </file>
 
-<file path=ppt/slides/slide52.xml><?xml version="1.0" encoding="utf-8"?>
+<file path=ppt/slides/slide53.xml><?xml version="1.0" encoding="utf-8"?>
 <p:sld xmlns:a="http://schemas.openxmlformats.org/drawingml/2006/main" xmlns:r="http://schemas.openxmlformats.org/officeDocument/2006/relationships" xmlns:p="http://schemas.openxmlformats.org/presentationml/2006/main">
   <p:cSld>
     <p:spTree>
@@ -25232,7 +25614,7 @@
 </p:sld>
 </file>
 
-<file path=ppt/slides/slide53.xml><?xml version="1.0" encoding="utf-8"?>
+<file path=ppt/slides/slide54.xml><?xml version="1.0" encoding="utf-8"?>
 <p:sld xmlns:a="http://schemas.openxmlformats.org/drawingml/2006/main" xmlns:r="http://schemas.openxmlformats.org/officeDocument/2006/relationships" xmlns:p="http://schemas.openxmlformats.org/presentationml/2006/main">
   <p:cSld>
     <p:spTree>
@@ -25505,7 +25887,7 @@
 </p:sld>
 </file>
 
-<file path=ppt/slides/slide54.xml><?xml version="1.0" encoding="utf-8"?>
+<file path=ppt/slides/slide55.xml><?xml version="1.0" encoding="utf-8"?>
 <p:sld xmlns:a="http://schemas.openxmlformats.org/drawingml/2006/main" xmlns:r="http://schemas.openxmlformats.org/officeDocument/2006/relationships" xmlns:p="http://schemas.openxmlformats.org/presentationml/2006/main">
   <p:cSld>
     <p:spTree>
@@ -25778,7 +26160,7 @@
 </p:sld>
 </file>
 
-<file path=ppt/slides/slide55.xml><?xml version="1.0" encoding="utf-8"?>
+<file path=ppt/slides/slide56.xml><?xml version="1.0" encoding="utf-8"?>
 <p:sld xmlns:a="http://schemas.openxmlformats.org/drawingml/2006/main" xmlns:r="http://schemas.openxmlformats.org/officeDocument/2006/relationships" xmlns:p="http://schemas.openxmlformats.org/presentationml/2006/main">
   <p:cSld>
     <p:spTree>
@@ -26068,7 +26450,7 @@
 </p:sld>
 </file>
 
-<file path=ppt/slides/slide56.xml><?xml version="1.0" encoding="utf-8"?>
+<file path=ppt/slides/slide57.xml><?xml version="1.0" encoding="utf-8"?>
 <p:sld xmlns:a="http://schemas.openxmlformats.org/drawingml/2006/main" xmlns:r="http://schemas.openxmlformats.org/officeDocument/2006/relationships" xmlns:p="http://schemas.openxmlformats.org/presentationml/2006/main">
   <p:cSld>
     <p:spTree>
@@ -26358,7 +26740,7 @@
 </p:sld>
 </file>
 
-<file path=ppt/slides/slide57.xml><?xml version="1.0" encoding="utf-8"?>
+<file path=ppt/slides/slide58.xml><?xml version="1.0" encoding="utf-8"?>
 <p:sld xmlns:a="http://schemas.openxmlformats.org/drawingml/2006/main" xmlns:r="http://schemas.openxmlformats.org/officeDocument/2006/relationships" xmlns:p="http://schemas.openxmlformats.org/presentationml/2006/main">
   <p:cSld>
     <p:spTree>
@@ -26631,7 +27013,7 @@
 </p:sld>
 </file>
 
-<file path=ppt/slides/slide58.xml><?xml version="1.0" encoding="utf-8"?>
+<file path=ppt/slides/slide59.xml><?xml version="1.0" encoding="utf-8"?>
 <p:sld xmlns:a="http://schemas.openxmlformats.org/drawingml/2006/main" xmlns:r="http://schemas.openxmlformats.org/officeDocument/2006/relationships" xmlns:p="http://schemas.openxmlformats.org/presentationml/2006/main">
   <p:cSld>
     <p:spTree>
@@ -26895,279 +27277,6 @@
     <p:extLst>
       <p:ext uri="{BB962C8B-B14F-4D97-AF65-F5344CB8AC3E}">
         <p14:creationId xmlns:p14="http://schemas.microsoft.com/office/powerpoint/2010/main" val="3469410659"/>
-      </p:ext>
-    </p:extLst>
-  </p:cSld>
-  <p:clrMapOvr>
-    <a:masterClrMapping/>
-  </p:clrMapOvr>
-</p:sld>
-</file>
-
-<file path=ppt/slides/slide59.xml><?xml version="1.0" encoding="utf-8"?>
-<p:sld xmlns:a="http://schemas.openxmlformats.org/drawingml/2006/main" xmlns:r="http://schemas.openxmlformats.org/officeDocument/2006/relationships" xmlns:p="http://schemas.openxmlformats.org/presentationml/2006/main">
-  <p:cSld>
-    <p:spTree>
-      <p:nvGrpSpPr>
-        <p:cNvPr id="1" name=""/>
-        <p:cNvGrpSpPr/>
-        <p:nvPr/>
-      </p:nvGrpSpPr>
-      <p:grpSpPr>
-        <a:xfrm>
-          <a:off x="0" y="0"/>
-          <a:ext cx="0" cy="0"/>
-          <a:chOff x="0" y="0"/>
-          <a:chExt cx="0" cy="0"/>
-        </a:xfrm>
-      </p:grpSpPr>
-      <p:sp>
-        <p:nvSpPr>
-          <p:cNvPr id="2" name="Título 1">
-            <a:extLst>
-              <a:ext uri="{FF2B5EF4-FFF2-40B4-BE49-F238E27FC236}">
-                <a16:creationId xmlns:a16="http://schemas.microsoft.com/office/drawing/2014/main" id="{0DF8FDDE-7FF6-114B-95BB-26E67991BA49}"/>
-              </a:ext>
-            </a:extLst>
-          </p:cNvPr>
-          <p:cNvSpPr>
-            <a:spLocks noGrp="1"/>
-          </p:cNvSpPr>
-          <p:nvPr>
-            <p:ph type="title"/>
-          </p:nvPr>
-        </p:nvSpPr>
-        <p:spPr/>
-        <p:txBody>
-          <a:bodyPr/>
-          <a:lstStyle/>
-          <a:p>
-            <a:r>
-              <a:rPr lang="es-CO"/>
-              <a:t>Requerimientos </a:t>
-            </a:r>
-            <a:r>
-              <a:rPr lang="es-CO" dirty="0"/>
-              <a:t>no funcionales</a:t>
-            </a:r>
-          </a:p>
-        </p:txBody>
-      </p:sp>
-      <p:graphicFrame>
-        <p:nvGraphicFramePr>
-          <p:cNvPr id="4" name="Tabla 4">
-            <a:extLst>
-              <a:ext uri="{FF2B5EF4-FFF2-40B4-BE49-F238E27FC236}">
-                <a16:creationId xmlns:a16="http://schemas.microsoft.com/office/drawing/2014/main" id="{3275B20B-304D-3645-A6E7-687160D9B56D}"/>
-              </a:ext>
-            </a:extLst>
-          </p:cNvPr>
-          <p:cNvGraphicFramePr>
-            <a:graphicFrameLocks noGrp="1"/>
-          </p:cNvGraphicFramePr>
-          <p:nvPr>
-            <p:ph idx="1"/>
-          </p:nvPr>
-        </p:nvGraphicFramePr>
-        <p:xfrm>
-          <a:off x="5118100" y="803275"/>
-          <a:ext cx="6281738" cy="3754120"/>
-        </p:xfrm>
-        <a:graphic>
-          <a:graphicData uri="http://schemas.openxmlformats.org/drawingml/2006/table">
-            <a:tbl>
-              <a:tblPr firstRow="1" bandRow="1">
-                <a:tableStyleId>{5C22544A-7EE6-4342-B048-85BDC9FD1C3A}</a:tableStyleId>
-              </a:tblPr>
-              <a:tblGrid>
-                <a:gridCol w="3140869">
-                  <a:extLst>
-                    <a:ext uri="{9D8B030D-6E8A-4147-A177-3AD203B41FA5}">
-                      <a16:colId xmlns:a16="http://schemas.microsoft.com/office/drawing/2014/main" val="2405063638"/>
-                    </a:ext>
-                  </a:extLst>
-                </a:gridCol>
-                <a:gridCol w="3140869">
-                  <a:extLst>
-                    <a:ext uri="{9D8B030D-6E8A-4147-A177-3AD203B41FA5}">
-                      <a16:colId xmlns:a16="http://schemas.microsoft.com/office/drawing/2014/main" val="3099478781"/>
-                    </a:ext>
-                  </a:extLst>
-                </a:gridCol>
-              </a:tblGrid>
-              <a:tr h="370840">
-                <a:tc>
-                  <a:txBody>
-                    <a:bodyPr/>
-                    <a:lstStyle/>
-                    <a:p>
-                      <a:r>
-                        <a:rPr lang="es-CO" dirty="0"/>
-                        <a:t>Identificación del requerimiento</a:t>
-                      </a:r>
-                    </a:p>
-                  </a:txBody>
-                  <a:tcPr/>
-                </a:tc>
-                <a:tc>
-                  <a:txBody>
-                    <a:bodyPr/>
-                    <a:lstStyle/>
-                    <a:p>
-                      <a:r>
-                        <a:rPr lang="es-CO" dirty="0"/>
-                        <a:t>RNF12</a:t>
-                      </a:r>
-                    </a:p>
-                  </a:txBody>
-                  <a:tcPr/>
-                </a:tc>
-                <a:extLst>
-                  <a:ext uri="{0D108BD9-81ED-4DB2-BD59-A6C34878D82A}">
-                    <a16:rowId xmlns:a16="http://schemas.microsoft.com/office/drawing/2014/main" val="3120795479"/>
-                  </a:ext>
-                </a:extLst>
-              </a:tr>
-              <a:tr h="370840">
-                <a:tc>
-                  <a:txBody>
-                    <a:bodyPr/>
-                    <a:lstStyle/>
-                    <a:p>
-                      <a:r>
-                        <a:rPr lang="es-CO" dirty="0"/>
-                        <a:t>Nombre del requerimiento</a:t>
-                      </a:r>
-                    </a:p>
-                  </a:txBody>
-                  <a:tcPr/>
-                </a:tc>
-                <a:tc>
-                  <a:txBody>
-                    <a:bodyPr/>
-                    <a:lstStyle/>
-                    <a:p>
-                      <a:r>
-                        <a:rPr lang="es-CO" dirty="0"/>
-                        <a:t>Privacidad</a:t>
-                      </a:r>
-                    </a:p>
-                  </a:txBody>
-                  <a:tcPr/>
-                </a:tc>
-                <a:extLst>
-                  <a:ext uri="{0D108BD9-81ED-4DB2-BD59-A6C34878D82A}">
-                    <a16:rowId xmlns:a16="http://schemas.microsoft.com/office/drawing/2014/main" val="1343925762"/>
-                  </a:ext>
-                </a:extLst>
-              </a:tr>
-              <a:tr h="370840">
-                <a:tc>
-                  <a:txBody>
-                    <a:bodyPr/>
-                    <a:lstStyle/>
-                    <a:p>
-                      <a:r>
-                        <a:rPr lang="es-CO" dirty="0"/>
-                        <a:t>Caracterísitcas</a:t>
-                      </a:r>
-                    </a:p>
-                  </a:txBody>
-                  <a:tcPr/>
-                </a:tc>
-                <a:tc>
-                  <a:txBody>
-                    <a:bodyPr/>
-                    <a:lstStyle/>
-                    <a:p>
-                      <a:r>
-                        <a:rPr lang="es-CO" dirty="0"/>
-                        <a:t>El sistema permitirá a cada usuario ver sólo la información pertinente para él.</a:t>
-                      </a:r>
-                    </a:p>
-                  </a:txBody>
-                  <a:tcPr/>
-                </a:tc>
-                <a:extLst>
-                  <a:ext uri="{0D108BD9-81ED-4DB2-BD59-A6C34878D82A}">
-                    <a16:rowId xmlns:a16="http://schemas.microsoft.com/office/drawing/2014/main" val="769886354"/>
-                  </a:ext>
-                </a:extLst>
-              </a:tr>
-              <a:tr h="370840">
-                <a:tc>
-                  <a:txBody>
-                    <a:bodyPr/>
-                    <a:lstStyle/>
-                    <a:p>
-                      <a:r>
-                        <a:rPr lang="es-CO" dirty="0"/>
-                        <a:t>Descripción del requerimiento</a:t>
-                      </a:r>
-                    </a:p>
-                  </a:txBody>
-                  <a:tcPr/>
-                </a:tc>
-                <a:tc>
-                  <a:txBody>
-                    <a:bodyPr/>
-                    <a:lstStyle/>
-                    <a:p>
-                      <a:r>
-                        <a:rPr lang="es-CO" dirty="0"/>
-                        <a:t>Cada usuario sólo podrá consultar la información de interés según su rol.</a:t>
-                      </a:r>
-                    </a:p>
-                  </a:txBody>
-                  <a:tcPr/>
-                </a:tc>
-                <a:extLst>
-                  <a:ext uri="{0D108BD9-81ED-4DB2-BD59-A6C34878D82A}">
-                    <a16:rowId xmlns:a16="http://schemas.microsoft.com/office/drawing/2014/main" val="2397840479"/>
-                  </a:ext>
-                </a:extLst>
-              </a:tr>
-              <a:tr h="370840">
-                <a:tc>
-                  <a:txBody>
-                    <a:bodyPr/>
-                    <a:lstStyle/>
-                    <a:p>
-                      <a:r>
-                        <a:rPr lang="es-CO" dirty="0"/>
-                        <a:t>Prioridad del requerimiento</a:t>
-                      </a:r>
-                    </a:p>
-                  </a:txBody>
-                  <a:tcPr/>
-                </a:tc>
-                <a:tc>
-                  <a:txBody>
-                    <a:bodyPr/>
-                    <a:lstStyle/>
-                    <a:p>
-                      <a:r>
-                        <a:rPr lang="es-CO" dirty="0"/>
-                        <a:t>Alta</a:t>
-                      </a:r>
-                    </a:p>
-                  </a:txBody>
-                  <a:tcPr/>
-                </a:tc>
-                <a:extLst>
-                  <a:ext uri="{0D108BD9-81ED-4DB2-BD59-A6C34878D82A}">
-                    <a16:rowId xmlns:a16="http://schemas.microsoft.com/office/drawing/2014/main" val="1876826554"/>
-                  </a:ext>
-                </a:extLst>
-              </a:tr>
-            </a:tbl>
-          </a:graphicData>
-        </a:graphic>
-      </p:graphicFrame>
-    </p:spTree>
-    <p:extLst>
-      <p:ext uri="{BB962C8B-B14F-4D97-AF65-F5344CB8AC3E}">
-        <p14:creationId xmlns:p14="http://schemas.microsoft.com/office/powerpoint/2010/main" val="1915646667"/>
       </p:ext>
     </p:extLst>
   </p:cSld>
@@ -27332,6 +27441,279 @@
         </p:nvGraphicFramePr>
         <p:xfrm>
           <a:off x="5118100" y="803275"/>
+          <a:ext cx="6281738" cy="3754120"/>
+        </p:xfrm>
+        <a:graphic>
+          <a:graphicData uri="http://schemas.openxmlformats.org/drawingml/2006/table">
+            <a:tbl>
+              <a:tblPr firstRow="1" bandRow="1">
+                <a:tableStyleId>{5C22544A-7EE6-4342-B048-85BDC9FD1C3A}</a:tableStyleId>
+              </a:tblPr>
+              <a:tblGrid>
+                <a:gridCol w="3140869">
+                  <a:extLst>
+                    <a:ext uri="{9D8B030D-6E8A-4147-A177-3AD203B41FA5}">
+                      <a16:colId xmlns:a16="http://schemas.microsoft.com/office/drawing/2014/main" val="2405063638"/>
+                    </a:ext>
+                  </a:extLst>
+                </a:gridCol>
+                <a:gridCol w="3140869">
+                  <a:extLst>
+                    <a:ext uri="{9D8B030D-6E8A-4147-A177-3AD203B41FA5}">
+                      <a16:colId xmlns:a16="http://schemas.microsoft.com/office/drawing/2014/main" val="3099478781"/>
+                    </a:ext>
+                  </a:extLst>
+                </a:gridCol>
+              </a:tblGrid>
+              <a:tr h="370840">
+                <a:tc>
+                  <a:txBody>
+                    <a:bodyPr/>
+                    <a:lstStyle/>
+                    <a:p>
+                      <a:r>
+                        <a:rPr lang="es-CO" dirty="0"/>
+                        <a:t>Identificación del requerimiento</a:t>
+                      </a:r>
+                    </a:p>
+                  </a:txBody>
+                  <a:tcPr/>
+                </a:tc>
+                <a:tc>
+                  <a:txBody>
+                    <a:bodyPr/>
+                    <a:lstStyle/>
+                    <a:p>
+                      <a:r>
+                        <a:rPr lang="es-CO" dirty="0"/>
+                        <a:t>RNF12</a:t>
+                      </a:r>
+                    </a:p>
+                  </a:txBody>
+                  <a:tcPr/>
+                </a:tc>
+                <a:extLst>
+                  <a:ext uri="{0D108BD9-81ED-4DB2-BD59-A6C34878D82A}">
+                    <a16:rowId xmlns:a16="http://schemas.microsoft.com/office/drawing/2014/main" val="3120795479"/>
+                  </a:ext>
+                </a:extLst>
+              </a:tr>
+              <a:tr h="370840">
+                <a:tc>
+                  <a:txBody>
+                    <a:bodyPr/>
+                    <a:lstStyle/>
+                    <a:p>
+                      <a:r>
+                        <a:rPr lang="es-CO" dirty="0"/>
+                        <a:t>Nombre del requerimiento</a:t>
+                      </a:r>
+                    </a:p>
+                  </a:txBody>
+                  <a:tcPr/>
+                </a:tc>
+                <a:tc>
+                  <a:txBody>
+                    <a:bodyPr/>
+                    <a:lstStyle/>
+                    <a:p>
+                      <a:r>
+                        <a:rPr lang="es-CO" dirty="0"/>
+                        <a:t>Privacidad</a:t>
+                      </a:r>
+                    </a:p>
+                  </a:txBody>
+                  <a:tcPr/>
+                </a:tc>
+                <a:extLst>
+                  <a:ext uri="{0D108BD9-81ED-4DB2-BD59-A6C34878D82A}">
+                    <a16:rowId xmlns:a16="http://schemas.microsoft.com/office/drawing/2014/main" val="1343925762"/>
+                  </a:ext>
+                </a:extLst>
+              </a:tr>
+              <a:tr h="370840">
+                <a:tc>
+                  <a:txBody>
+                    <a:bodyPr/>
+                    <a:lstStyle/>
+                    <a:p>
+                      <a:r>
+                        <a:rPr lang="es-CO" dirty="0"/>
+                        <a:t>Caracterísitcas</a:t>
+                      </a:r>
+                    </a:p>
+                  </a:txBody>
+                  <a:tcPr/>
+                </a:tc>
+                <a:tc>
+                  <a:txBody>
+                    <a:bodyPr/>
+                    <a:lstStyle/>
+                    <a:p>
+                      <a:r>
+                        <a:rPr lang="es-CO" dirty="0"/>
+                        <a:t>El sistema permitirá a cada usuario ver sólo la información pertinente para él.</a:t>
+                      </a:r>
+                    </a:p>
+                  </a:txBody>
+                  <a:tcPr/>
+                </a:tc>
+                <a:extLst>
+                  <a:ext uri="{0D108BD9-81ED-4DB2-BD59-A6C34878D82A}">
+                    <a16:rowId xmlns:a16="http://schemas.microsoft.com/office/drawing/2014/main" val="769886354"/>
+                  </a:ext>
+                </a:extLst>
+              </a:tr>
+              <a:tr h="370840">
+                <a:tc>
+                  <a:txBody>
+                    <a:bodyPr/>
+                    <a:lstStyle/>
+                    <a:p>
+                      <a:r>
+                        <a:rPr lang="es-CO" dirty="0"/>
+                        <a:t>Descripción del requerimiento</a:t>
+                      </a:r>
+                    </a:p>
+                  </a:txBody>
+                  <a:tcPr/>
+                </a:tc>
+                <a:tc>
+                  <a:txBody>
+                    <a:bodyPr/>
+                    <a:lstStyle/>
+                    <a:p>
+                      <a:r>
+                        <a:rPr lang="es-CO" dirty="0"/>
+                        <a:t>Cada usuario sólo podrá consultar la información de interés según su rol.</a:t>
+                      </a:r>
+                    </a:p>
+                  </a:txBody>
+                  <a:tcPr/>
+                </a:tc>
+                <a:extLst>
+                  <a:ext uri="{0D108BD9-81ED-4DB2-BD59-A6C34878D82A}">
+                    <a16:rowId xmlns:a16="http://schemas.microsoft.com/office/drawing/2014/main" val="2397840479"/>
+                  </a:ext>
+                </a:extLst>
+              </a:tr>
+              <a:tr h="370840">
+                <a:tc>
+                  <a:txBody>
+                    <a:bodyPr/>
+                    <a:lstStyle/>
+                    <a:p>
+                      <a:r>
+                        <a:rPr lang="es-CO" dirty="0"/>
+                        <a:t>Prioridad del requerimiento</a:t>
+                      </a:r>
+                    </a:p>
+                  </a:txBody>
+                  <a:tcPr/>
+                </a:tc>
+                <a:tc>
+                  <a:txBody>
+                    <a:bodyPr/>
+                    <a:lstStyle/>
+                    <a:p>
+                      <a:r>
+                        <a:rPr lang="es-CO" dirty="0"/>
+                        <a:t>Alta</a:t>
+                      </a:r>
+                    </a:p>
+                  </a:txBody>
+                  <a:tcPr/>
+                </a:tc>
+                <a:extLst>
+                  <a:ext uri="{0D108BD9-81ED-4DB2-BD59-A6C34878D82A}">
+                    <a16:rowId xmlns:a16="http://schemas.microsoft.com/office/drawing/2014/main" val="1876826554"/>
+                  </a:ext>
+                </a:extLst>
+              </a:tr>
+            </a:tbl>
+          </a:graphicData>
+        </a:graphic>
+      </p:graphicFrame>
+    </p:spTree>
+    <p:extLst>
+      <p:ext uri="{BB962C8B-B14F-4D97-AF65-F5344CB8AC3E}">
+        <p14:creationId xmlns:p14="http://schemas.microsoft.com/office/powerpoint/2010/main" val="1915646667"/>
+      </p:ext>
+    </p:extLst>
+  </p:cSld>
+  <p:clrMapOvr>
+    <a:masterClrMapping/>
+  </p:clrMapOvr>
+</p:sld>
+</file>
+
+<file path=ppt/slides/slide61.xml><?xml version="1.0" encoding="utf-8"?>
+<p:sld xmlns:a="http://schemas.openxmlformats.org/drawingml/2006/main" xmlns:r="http://schemas.openxmlformats.org/officeDocument/2006/relationships" xmlns:p="http://schemas.openxmlformats.org/presentationml/2006/main">
+  <p:cSld>
+    <p:spTree>
+      <p:nvGrpSpPr>
+        <p:cNvPr id="1" name=""/>
+        <p:cNvGrpSpPr/>
+        <p:nvPr/>
+      </p:nvGrpSpPr>
+      <p:grpSpPr>
+        <a:xfrm>
+          <a:off x="0" y="0"/>
+          <a:ext cx="0" cy="0"/>
+          <a:chOff x="0" y="0"/>
+          <a:chExt cx="0" cy="0"/>
+        </a:xfrm>
+      </p:grpSpPr>
+      <p:sp>
+        <p:nvSpPr>
+          <p:cNvPr id="2" name="Título 1">
+            <a:extLst>
+              <a:ext uri="{FF2B5EF4-FFF2-40B4-BE49-F238E27FC236}">
+                <a16:creationId xmlns:a16="http://schemas.microsoft.com/office/drawing/2014/main" id="{0DF8FDDE-7FF6-114B-95BB-26E67991BA49}"/>
+              </a:ext>
+            </a:extLst>
+          </p:cNvPr>
+          <p:cNvSpPr>
+            <a:spLocks noGrp="1"/>
+          </p:cNvSpPr>
+          <p:nvPr>
+            <p:ph type="title"/>
+          </p:nvPr>
+        </p:nvSpPr>
+        <p:spPr/>
+        <p:txBody>
+          <a:bodyPr/>
+          <a:lstStyle/>
+          <a:p>
+            <a:r>
+              <a:rPr lang="es-CO"/>
+              <a:t>Requerimientos </a:t>
+            </a:r>
+            <a:r>
+              <a:rPr lang="es-CO" dirty="0"/>
+              <a:t>no funcionales</a:t>
+            </a:r>
+          </a:p>
+        </p:txBody>
+      </p:sp>
+      <p:graphicFrame>
+        <p:nvGraphicFramePr>
+          <p:cNvPr id="4" name="Tabla 4">
+            <a:extLst>
+              <a:ext uri="{FF2B5EF4-FFF2-40B4-BE49-F238E27FC236}">
+                <a16:creationId xmlns:a16="http://schemas.microsoft.com/office/drawing/2014/main" id="{3275B20B-304D-3645-A6E7-687160D9B56D}"/>
+              </a:ext>
+            </a:extLst>
+          </p:cNvPr>
+          <p:cNvGraphicFramePr>
+            <a:graphicFrameLocks noGrp="1"/>
+          </p:cNvGraphicFramePr>
+          <p:nvPr>
+            <p:ph idx="1"/>
+          </p:nvPr>
+        </p:nvGraphicFramePr>
+        <p:xfrm>
+          <a:off x="5118100" y="803275"/>
           <a:ext cx="6281738" cy="3205480"/>
         </p:xfrm>
         <a:graphic>
@@ -27538,7 +27920,7 @@
 </p:sld>
 </file>
 
-<file path=ppt/slides/slide61.xml><?xml version="1.0" encoding="utf-8"?>
+<file path=ppt/slides/slide62.xml><?xml version="1.0" encoding="utf-8"?>
 <p:sld xmlns:a="http://schemas.openxmlformats.org/drawingml/2006/main" xmlns:r="http://schemas.openxmlformats.org/officeDocument/2006/relationships" xmlns:p="http://schemas.openxmlformats.org/presentationml/2006/main">
   <p:cSld>
     <p:spTree>
@@ -27811,7 +28193,7 @@
 </p:sld>
 </file>
 
-<file path=ppt/slides/slide62.xml><?xml version="1.0" encoding="utf-8"?>
+<file path=ppt/slides/slide63.xml><?xml version="1.0" encoding="utf-8"?>
 <p:sld xmlns:a="http://schemas.openxmlformats.org/drawingml/2006/main" xmlns:r="http://schemas.openxmlformats.org/officeDocument/2006/relationships" xmlns:p="http://schemas.openxmlformats.org/presentationml/2006/main">
   <p:cSld>
     <p:spTree>
@@ -28084,7 +28466,7 @@
 </p:sld>
 </file>
 
-<file path=ppt/slides/slide63.xml><?xml version="1.0" encoding="utf-8"?>
+<file path=ppt/slides/slide64.xml><?xml version="1.0" encoding="utf-8"?>
 <p:sld xmlns:a="http://schemas.openxmlformats.org/drawingml/2006/main" xmlns:r="http://schemas.openxmlformats.org/officeDocument/2006/relationships" xmlns:p="http://schemas.openxmlformats.org/presentationml/2006/main">
   <p:cSld>
     <p:spTree>
@@ -28137,7 +28519,7 @@
 </p:sld>
 </file>
 
-<file path=ppt/slides/slide64.xml><?xml version="1.0" encoding="utf-8"?>
+<file path=ppt/slides/slide65.xml><?xml version="1.0" encoding="utf-8"?>
 <p:sld xmlns:a="http://schemas.openxmlformats.org/drawingml/2006/main" xmlns:r="http://schemas.openxmlformats.org/officeDocument/2006/relationships" xmlns:p="http://schemas.openxmlformats.org/presentationml/2006/main">
   <p:cSld>
     <p:spTree>
@@ -28190,7 +28572,7 @@
 </p:sld>
 </file>
 
-<file path=ppt/slides/slide65.xml><?xml version="1.0" encoding="utf-8"?>
+<file path=ppt/slides/slide66.xml><?xml version="1.0" encoding="utf-8"?>
 <p:sld xmlns:a="http://schemas.openxmlformats.org/drawingml/2006/main" xmlns:r="http://schemas.openxmlformats.org/officeDocument/2006/relationships" xmlns:p="http://schemas.openxmlformats.org/presentationml/2006/main">
   <p:cSld>
     <p:spTree>

</xml_diff>

<commit_message>
DOC: Pagina web V2
Creacion de nueva pagina web
</commit_message>
<xml_diff>
--- a/PLANTEAMIENTO_DEL_PROBLEMA.pptx
+++ b/PLANTEAMIENTO_DEL_PROBLEMA.pptx
@@ -194,10 +194,55 @@
   <pc:docChgLst>
     <pc:chgData name="Santiago Rojas" userId="6f1404c97ad8162e" providerId="LiveId" clId="{E62E924F-0D6E-49BB-BBAC-E95CB330623F}"/>
     <pc:docChg chg="custSel addSld delSld modSld sldOrd">
-      <pc:chgData name="Santiago Rojas" userId="6f1404c97ad8162e" providerId="LiveId" clId="{E62E924F-0D6E-49BB-BBAC-E95CB330623F}" dt="2021-07-29T02:10:32.055" v="407" actId="20577"/>
+      <pc:chgData name="Santiago Rojas" userId="6f1404c97ad8162e" providerId="LiveId" clId="{E62E924F-0D6E-49BB-BBAC-E95CB330623F}" dt="2021-08-03T21:34:30.418" v="410" actId="14734"/>
       <pc:docMkLst>
         <pc:docMk/>
       </pc:docMkLst>
+      <pc:sldChg chg="modSp mod">
+        <pc:chgData name="Santiago Rojas" userId="6f1404c97ad8162e" providerId="LiveId" clId="{E62E924F-0D6E-49BB-BBAC-E95CB330623F}" dt="2021-08-03T21:33:09.423" v="408" actId="20577"/>
+        <pc:sldMkLst>
+          <pc:docMk/>
+          <pc:sldMk cId="1357425855" sldId="297"/>
+        </pc:sldMkLst>
+        <pc:graphicFrameChg chg="modGraphic">
+          <ac:chgData name="Santiago Rojas" userId="6f1404c97ad8162e" providerId="LiveId" clId="{E62E924F-0D6E-49BB-BBAC-E95CB330623F}" dt="2021-08-03T21:33:09.423" v="408" actId="20577"/>
+          <ac:graphicFrameMkLst>
+            <pc:docMk/>
+            <pc:sldMk cId="1357425855" sldId="297"/>
+            <ac:graphicFrameMk id="4" creationId="{3275B20B-304D-3645-A6E7-687160D9B56D}"/>
+          </ac:graphicFrameMkLst>
+        </pc:graphicFrameChg>
+      </pc:sldChg>
+      <pc:sldChg chg="modSp mod">
+        <pc:chgData name="Santiago Rojas" userId="6f1404c97ad8162e" providerId="LiveId" clId="{E62E924F-0D6E-49BB-BBAC-E95CB330623F}" dt="2021-08-03T21:33:33.933" v="409" actId="14734"/>
+        <pc:sldMkLst>
+          <pc:docMk/>
+          <pc:sldMk cId="2937608903" sldId="299"/>
+        </pc:sldMkLst>
+        <pc:graphicFrameChg chg="modGraphic">
+          <ac:chgData name="Santiago Rojas" userId="6f1404c97ad8162e" providerId="LiveId" clId="{E62E924F-0D6E-49BB-BBAC-E95CB330623F}" dt="2021-08-03T21:33:33.933" v="409" actId="14734"/>
+          <ac:graphicFrameMkLst>
+            <pc:docMk/>
+            <pc:sldMk cId="2937608903" sldId="299"/>
+            <ac:graphicFrameMk id="4" creationId="{3275B20B-304D-3645-A6E7-687160D9B56D}"/>
+          </ac:graphicFrameMkLst>
+        </pc:graphicFrameChg>
+      </pc:sldChg>
+      <pc:sldChg chg="modSp mod">
+        <pc:chgData name="Santiago Rojas" userId="6f1404c97ad8162e" providerId="LiveId" clId="{E62E924F-0D6E-49BB-BBAC-E95CB330623F}" dt="2021-08-03T21:34:30.418" v="410" actId="14734"/>
+        <pc:sldMkLst>
+          <pc:docMk/>
+          <pc:sldMk cId="966399419" sldId="343"/>
+        </pc:sldMkLst>
+        <pc:graphicFrameChg chg="modGraphic">
+          <ac:chgData name="Santiago Rojas" userId="6f1404c97ad8162e" providerId="LiveId" clId="{E62E924F-0D6E-49BB-BBAC-E95CB330623F}" dt="2021-08-03T21:34:30.418" v="410" actId="14734"/>
+          <ac:graphicFrameMkLst>
+            <pc:docMk/>
+            <pc:sldMk cId="966399419" sldId="343"/>
+            <ac:graphicFrameMk id="4" creationId="{3275B20B-304D-3645-A6E7-687160D9B56D}"/>
+          </ac:graphicFrameMkLst>
+        </pc:graphicFrameChg>
+      </pc:sldChg>
       <pc:sldChg chg="new del">
         <pc:chgData name="Santiago Rojas" userId="6f1404c97ad8162e" providerId="LiveId" clId="{E62E924F-0D6E-49BB-BBAC-E95CB330623F}" dt="2021-07-29T02:05:37.177" v="2" actId="47"/>
         <pc:sldMkLst>
@@ -1726,7 +1771,7 @@
           <a:p>
             <a:fld id="{D253BB75-C9F5-8342-9D8A-C2F31092015F}" type="datetimeFigureOut">
               <a:rPr lang="es-CO" smtClean="0"/>
-              <a:t>28/07/2021</a:t>
+              <a:t>3/08/2021</a:t>
             </a:fld>
             <a:endParaRPr lang="es-CO"/>
           </a:p>
@@ -3185,7 +3230,7 @@
           <a:p>
             <a:fld id="{D253BB75-C9F5-8342-9D8A-C2F31092015F}" type="datetimeFigureOut">
               <a:rPr lang="es-CO" smtClean="0"/>
-              <a:t>28/07/2021</a:t>
+              <a:t>3/08/2021</a:t>
             </a:fld>
             <a:endParaRPr lang="es-CO"/>
           </a:p>
@@ -4638,7 +4683,7 @@
           <a:p>
             <a:fld id="{D253BB75-C9F5-8342-9D8A-C2F31092015F}" type="datetimeFigureOut">
               <a:rPr lang="es-CO" smtClean="0"/>
-              <a:t>28/07/2021</a:t>
+              <a:t>3/08/2021</a:t>
             </a:fld>
             <a:endParaRPr lang="es-CO"/>
           </a:p>
@@ -6093,7 +6138,7 @@
           <a:p>
             <a:fld id="{D253BB75-C9F5-8342-9D8A-C2F31092015F}" type="datetimeFigureOut">
               <a:rPr lang="es-CO" smtClean="0"/>
-              <a:t>28/07/2021</a:t>
+              <a:t>3/08/2021</a:t>
             </a:fld>
             <a:endParaRPr lang="es-CO"/>
           </a:p>
@@ -7601,7 +7646,7 @@
           <a:p>
             <a:fld id="{D253BB75-C9F5-8342-9D8A-C2F31092015F}" type="datetimeFigureOut">
               <a:rPr lang="es-CO" smtClean="0"/>
-              <a:t>28/07/2021</a:t>
+              <a:t>3/08/2021</a:t>
             </a:fld>
             <a:endParaRPr lang="es-CO"/>
           </a:p>
@@ -9122,7 +9167,7 @@
           <a:p>
             <a:fld id="{D253BB75-C9F5-8342-9D8A-C2F31092015F}" type="datetimeFigureOut">
               <a:rPr lang="es-CO" smtClean="0"/>
-              <a:t>28/07/2021</a:t>
+              <a:t>3/08/2021</a:t>
             </a:fld>
             <a:endParaRPr lang="es-CO"/>
           </a:p>
@@ -10787,7 +10832,7 @@
           <a:p>
             <a:fld id="{D253BB75-C9F5-8342-9D8A-C2F31092015F}" type="datetimeFigureOut">
               <a:rPr lang="es-CO" smtClean="0"/>
-              <a:t>28/07/2021</a:t>
+              <a:t>3/08/2021</a:t>
             </a:fld>
             <a:endParaRPr lang="es-CO"/>
           </a:p>
@@ -12185,7 +12230,7 @@
           <a:p>
             <a:fld id="{D253BB75-C9F5-8342-9D8A-C2F31092015F}" type="datetimeFigureOut">
               <a:rPr lang="es-CO" smtClean="0"/>
-              <a:t>28/07/2021</a:t>
+              <a:t>3/08/2021</a:t>
             </a:fld>
             <a:endParaRPr lang="es-CO"/>
           </a:p>
@@ -12285,7 +12330,7 @@
           <a:p>
             <a:fld id="{D253BB75-C9F5-8342-9D8A-C2F31092015F}" type="datetimeFigureOut">
               <a:rPr lang="es-CO" smtClean="0"/>
-              <a:t>28/07/2021</a:t>
+              <a:t>3/08/2021</a:t>
             </a:fld>
             <a:endParaRPr lang="es-CO"/>
           </a:p>
@@ -13811,7 +13856,7 @@
           <a:p>
             <a:fld id="{D253BB75-C9F5-8342-9D8A-C2F31092015F}" type="datetimeFigureOut">
               <a:rPr lang="es-CO" smtClean="0"/>
-              <a:t>28/07/2021</a:t>
+              <a:t>3/08/2021</a:t>
             </a:fld>
             <a:endParaRPr lang="es-CO"/>
           </a:p>
@@ -15347,7 +15392,7 @@
           <a:p>
             <a:fld id="{D253BB75-C9F5-8342-9D8A-C2F31092015F}" type="datetimeFigureOut">
               <a:rPr lang="es-CO" smtClean="0"/>
-              <a:t>28/07/2021</a:t>
+              <a:t>3/08/2021</a:t>
             </a:fld>
             <a:endParaRPr lang="es-CO"/>
           </a:p>
@@ -15570,7 +15615,7 @@
           <a:p>
             <a:fld id="{D253BB75-C9F5-8342-9D8A-C2F31092015F}" type="datetimeFigureOut">
               <a:rPr lang="es-CO" smtClean="0"/>
-              <a:t>28/07/2021</a:t>
+              <a:t>3/08/2021</a:t>
             </a:fld>
             <a:endParaRPr lang="es-CO"/>
           </a:p>
@@ -18261,11 +18306,11 @@
           <a:lstStyle/>
           <a:p>
             <a:r>
-              <a:rPr lang="es-CO" dirty="0" smtClean="0"/>
+              <a:rPr lang="es-CO" dirty="0"/>
               <a:t>Visual </a:t>
             </a:r>
             <a:r>
-              <a:rPr lang="es-CO" dirty="0" err="1" smtClean="0"/>
+              <a:rPr lang="es-CO" dirty="0" err="1"/>
               <a:t>Paradimg</a:t>
             </a:r>
             <a:endParaRPr lang="es-CO" dirty="0"/>
@@ -26474,6 +26519,11 @@
           </p:cNvGraphicFramePr>
           <p:nvPr>
             <p:ph idx="1"/>
+            <p:extLst>
+              <p:ext uri="{D42A27DB-BD31-4B8C-83A1-F6EECF244321}">
+                <p14:modId xmlns:p14="http://schemas.microsoft.com/office/powerpoint/2010/main" val="3402266356"/>
+              </p:ext>
+            </p:extLst>
           </p:nvPr>
         </p:nvGraphicFramePr>
         <p:xfrm>
@@ -26556,7 +26606,7 @@
                     <a:p>
                       <a:r>
                         <a:rPr lang="es-CO" dirty="0"/>
-                        <a:t>Compatibilidad</a:t>
+                        <a:t>v</a:t>
                       </a:r>
                     </a:p>
                   </a:txBody>
@@ -26747,6 +26797,11 @@
           </p:cNvGraphicFramePr>
           <p:nvPr>
             <p:ph idx="1"/>
+            <p:extLst>
+              <p:ext uri="{D42A27DB-BD31-4B8C-83A1-F6EECF244321}">
+                <p14:modId xmlns:p14="http://schemas.microsoft.com/office/powerpoint/2010/main" val="2019669238"/>
+              </p:ext>
+            </p:extLst>
           </p:nvPr>
         </p:nvGraphicFramePr>
         <p:xfrm>
@@ -26775,7 +26830,7 @@
                   </a:extLst>
                 </a:gridCol>
               </a:tblGrid>
-              <a:tr h="370840">
+              <a:tr h="504825">
                 <a:tc>
                   <a:txBody>
                     <a:bodyPr/>
@@ -27961,6 +28016,11 @@
           </p:cNvGraphicFramePr>
           <p:nvPr>
             <p:ph idx="1"/>
+            <p:extLst>
+              <p:ext uri="{D42A27DB-BD31-4B8C-83A1-F6EECF244321}">
+                <p14:modId xmlns:p14="http://schemas.microsoft.com/office/powerpoint/2010/main" val="2861535692"/>
+              </p:ext>
+            </p:extLst>
           </p:nvPr>
         </p:nvGraphicFramePr>
         <p:xfrm>
@@ -27989,7 +28049,7 @@
                   </a:extLst>
                 </a:gridCol>
               </a:tblGrid>
-              <a:tr h="370840">
+              <a:tr h="550545">
                 <a:tc>
                   <a:txBody>
                     <a:bodyPr/>

</xml_diff>